<commit_message>
additional fixes and tidy up of html and css
</commit_message>
<xml_diff>
--- a/Michael-Dart_T1A2 Slidedeck.pptx
+++ b/Michael-Dart_T1A2 Slidedeck.pptx
@@ -107,6 +107,11 @@
       </a:defRPr>
     </a:lvl9pPr>
   </p:defaultTextStyle>
+  <p:extLst>
+    <p:ext uri="{EFAFB233-063F-42B5-8137-9DF3F51BA10A}">
+      <p15:sldGuideLst xmlns:p15="http://schemas.microsoft.com/office/powerpoint/2012/main"/>
+    </p:ext>
+  </p:extLst>
 </p:presentation>
 </file>
 
@@ -5818,7 +5823,7 @@
         </p:nvSpPr>
         <p:spPr>
           <a:xfrm>
-            <a:off x="955829" y="420658"/>
+            <a:off x="955828" y="1109309"/>
             <a:ext cx="10280342" cy="1720850"/>
           </a:xfrm>
         </p:spPr>
@@ -5860,7 +5865,7 @@
         </p:nvSpPr>
         <p:spPr>
           <a:xfrm>
-            <a:off x="3267083" y="2576514"/>
+            <a:off x="3157545" y="3095147"/>
             <a:ext cx="5876909" cy="1720850"/>
           </a:xfrm>
         </p:spPr>

</xml_diff>

<commit_message>
slidedeck completion and finishing touches on html and css
</commit_message>
<xml_diff>
--- a/Michael-Dart_T1A2 Slidedeck.pptx
+++ b/Michael-Dart_T1A2 Slidedeck.pptx
@@ -6,9 +6,15 @@
   </p:sldMasterIdLst>
   <p:sldIdLst>
     <p:sldId id="256" r:id="rId2"/>
-    <p:sldId id="257" r:id="rId3"/>
-    <p:sldId id="258" r:id="rId4"/>
-    <p:sldId id="259" r:id="rId5"/>
+    <p:sldId id="261" r:id="rId3"/>
+    <p:sldId id="264" r:id="rId4"/>
+    <p:sldId id="260" r:id="rId5"/>
+    <p:sldId id="262" r:id="rId6"/>
+    <p:sldId id="263" r:id="rId7"/>
+    <p:sldId id="257" r:id="rId8"/>
+    <p:sldId id="258" r:id="rId9"/>
+    <p:sldId id="259" r:id="rId10"/>
+    <p:sldId id="265" r:id="rId11"/>
   </p:sldIdLst>
   <p:sldSz cx="12192000" cy="6858000"/>
   <p:notesSz cx="6858000" cy="9144000"/>
@@ -5835,14 +5841,22 @@
           <a:p>
             <a:r>
               <a:rPr lang="en-AU" sz="4000" dirty="0"/>
-              <a:t>Michael Dart | Portfolio</a:t>
+              <a:t>Michael </a:t>
+            </a:r>
+            <a:r>
+              <a:rPr lang="en-AU" sz="4000" dirty="0" err="1"/>
+              <a:t>DarT</a:t>
+            </a:r>
+            <a:r>
+              <a:rPr lang="en-AU" sz="4000" dirty="0"/>
+              <a:t> </a:t>
             </a:r>
             <a:br>
               <a:rPr lang="en-AU" sz="4000" dirty="0"/>
             </a:br>
             <a:r>
               <a:rPr lang="en-AU" sz="4000" dirty="0"/>
-              <a:t>T1A2</a:t>
+              <a:t>T1A2 – PORTFOLIO</a:t>
             </a:r>
           </a:p>
         </p:txBody>
@@ -5938,6 +5952,147 @@
     <p:extLst>
       <p:ext uri="{BB962C8B-B14F-4D97-AF65-F5344CB8AC3E}">
         <p14:creationId xmlns:p14="http://schemas.microsoft.com/office/powerpoint/2010/main" val="859769802"/>
+      </p:ext>
+    </p:extLst>
+  </p:cSld>
+  <p:clrMapOvr>
+    <a:masterClrMapping/>
+  </p:clrMapOvr>
+</p:sld>
+</file>
+
+<file path=ppt/slides/slide10.xml><?xml version="1.0" encoding="utf-8"?>
+<p:sld xmlns:a="http://schemas.openxmlformats.org/drawingml/2006/main" xmlns:r="http://schemas.openxmlformats.org/officeDocument/2006/relationships" xmlns:p="http://schemas.openxmlformats.org/presentationml/2006/main">
+  <p:cSld>
+    <p:spTree>
+      <p:nvGrpSpPr>
+        <p:cNvPr id="1" name=""/>
+        <p:cNvGrpSpPr/>
+        <p:nvPr/>
+      </p:nvGrpSpPr>
+      <p:grpSpPr>
+        <a:xfrm>
+          <a:off x="0" y="0"/>
+          <a:ext cx="0" cy="0"/>
+          <a:chOff x="0" y="0"/>
+          <a:chExt cx="0" cy="0"/>
+        </a:xfrm>
+      </p:grpSpPr>
+      <p:sp>
+        <p:nvSpPr>
+          <p:cNvPr id="2" name="Rectangle 1">
+            <a:extLst>
+              <a:ext uri="{FF2B5EF4-FFF2-40B4-BE49-F238E27FC236}">
+                <a16:creationId xmlns:a16="http://schemas.microsoft.com/office/drawing/2014/main" id="{EE390A35-4454-430E-8EEC-F93BA37EDE82}"/>
+              </a:ext>
+            </a:extLst>
+          </p:cNvPr>
+          <p:cNvSpPr/>
+          <p:nvPr/>
+        </p:nvSpPr>
+        <p:spPr>
+          <a:xfrm>
+            <a:off x="5317295" y="115241"/>
+            <a:ext cx="1557414" cy="369332"/>
+          </a:xfrm>
+          <a:prstGeom prst="rect">
+            <a:avLst/>
+          </a:prstGeom>
+        </p:spPr>
+        <p:txBody>
+          <a:bodyPr wrap="none">
+            <a:spAutoFit/>
+          </a:bodyPr>
+          <a:lstStyle/>
+          <a:p>
+            <a:pPr algn="ctr"/>
+            <a:r>
+              <a:rPr lang="en-AU" dirty="0"/>
+              <a:t>THANK YOU</a:t>
+            </a:r>
+          </a:p>
+        </p:txBody>
+      </p:sp>
+      <p:cxnSp>
+        <p:nvCxnSpPr>
+          <p:cNvPr id="4" name="Straight Connector 3">
+            <a:extLst>
+              <a:ext uri="{FF2B5EF4-FFF2-40B4-BE49-F238E27FC236}">
+                <a16:creationId xmlns:a16="http://schemas.microsoft.com/office/drawing/2014/main" id="{F8CD6906-24C0-4403-9898-FCF146CF8A02}"/>
+              </a:ext>
+            </a:extLst>
+          </p:cNvPr>
+          <p:cNvCxnSpPr/>
+          <p:nvPr/>
+        </p:nvCxnSpPr>
+        <p:spPr>
+          <a:xfrm>
+            <a:off x="2210791" y="551392"/>
+            <a:ext cx="8127218" cy="0"/>
+          </a:xfrm>
+          <a:prstGeom prst="line">
+            <a:avLst/>
+          </a:prstGeom>
+          <a:ln w="76200"/>
+        </p:spPr>
+        <p:style>
+          <a:lnRef idx="1">
+            <a:schemeClr val="accent1"/>
+          </a:lnRef>
+          <a:fillRef idx="0">
+            <a:schemeClr val="accent1"/>
+          </a:fillRef>
+          <a:effectRef idx="0">
+            <a:schemeClr val="accent1"/>
+          </a:effectRef>
+          <a:fontRef idx="minor">
+            <a:schemeClr val="tx1"/>
+          </a:fontRef>
+        </p:style>
+      </p:cxnSp>
+      <p:sp>
+        <p:nvSpPr>
+          <p:cNvPr id="6" name="TextBox 5">
+            <a:extLst>
+              <a:ext uri="{FF2B5EF4-FFF2-40B4-BE49-F238E27FC236}">
+                <a16:creationId xmlns:a16="http://schemas.microsoft.com/office/drawing/2014/main" id="{14FA2289-710D-47F5-9ED4-33D0904F5092}"/>
+              </a:ext>
+            </a:extLst>
+          </p:cNvPr>
+          <p:cNvSpPr txBox="1"/>
+          <p:nvPr/>
+        </p:nvSpPr>
+        <p:spPr>
+          <a:xfrm>
+            <a:off x="2130803" y="1249743"/>
+            <a:ext cx="1867499" cy="400110"/>
+          </a:xfrm>
+          <a:prstGeom prst="rect">
+            <a:avLst/>
+          </a:prstGeom>
+          <a:noFill/>
+        </p:spPr>
+        <p:txBody>
+          <a:bodyPr wrap="none" rtlCol="0">
+            <a:spAutoFit/>
+          </a:bodyPr>
+          <a:lstStyle/>
+          <a:p>
+            <a:r>
+              <a:rPr lang="en-AU" sz="2000" dirty="0"/>
+              <a:t>Favourite </a:t>
+            </a:r>
+            <a:r>
+              <a:rPr lang="en-AU" sz="2000" b="1" dirty="0"/>
+              <a:t>Parts</a:t>
+            </a:r>
+          </a:p>
+        </p:txBody>
+      </p:sp>
+    </p:spTree>
+    <p:extLst>
+      <p:ext uri="{BB962C8B-B14F-4D97-AF65-F5344CB8AC3E}">
+        <p14:creationId xmlns:p14="http://schemas.microsoft.com/office/powerpoint/2010/main" val="1457322996"/>
       </p:ext>
     </p:extLst>
   </p:cSld>
@@ -5964,12 +6119,84 @@
           <a:chExt cx="0" cy="0"/>
         </a:xfrm>
       </p:grpSpPr>
+      <p:sp>
+        <p:nvSpPr>
+          <p:cNvPr id="2" name="TextBox 1">
+            <a:extLst>
+              <a:ext uri="{FF2B5EF4-FFF2-40B4-BE49-F238E27FC236}">
+                <a16:creationId xmlns:a16="http://schemas.microsoft.com/office/drawing/2014/main" id="{8FCDD9F8-60ED-4AD8-AF38-CD868206D8D0}"/>
+              </a:ext>
+            </a:extLst>
+          </p:cNvPr>
+          <p:cNvSpPr txBox="1"/>
+          <p:nvPr/>
+        </p:nvSpPr>
+        <p:spPr>
+          <a:xfrm>
+            <a:off x="5706776" y="170359"/>
+            <a:ext cx="1135247" cy="369332"/>
+          </a:xfrm>
+          <a:prstGeom prst="rect">
+            <a:avLst/>
+          </a:prstGeom>
+          <a:noFill/>
+        </p:spPr>
+        <p:txBody>
+          <a:bodyPr wrap="none" rtlCol="0">
+            <a:spAutoFit/>
+          </a:bodyPr>
+          <a:lstStyle/>
+          <a:p>
+            <a:r>
+              <a:rPr lang="en-AU" dirty="0"/>
+              <a:t>SITEMAP</a:t>
+            </a:r>
+          </a:p>
+        </p:txBody>
+      </p:sp>
+      <p:cxnSp>
+        <p:nvCxnSpPr>
+          <p:cNvPr id="9" name="Straight Connector 8">
+            <a:extLst>
+              <a:ext uri="{FF2B5EF4-FFF2-40B4-BE49-F238E27FC236}">
+                <a16:creationId xmlns:a16="http://schemas.microsoft.com/office/drawing/2014/main" id="{6344369A-827B-4D77-AF0C-915C9A536EE4}"/>
+              </a:ext>
+            </a:extLst>
+          </p:cNvPr>
+          <p:cNvCxnSpPr/>
+          <p:nvPr/>
+        </p:nvCxnSpPr>
+        <p:spPr>
+          <a:xfrm>
+            <a:off x="2210791" y="539691"/>
+            <a:ext cx="8127218" cy="0"/>
+          </a:xfrm>
+          <a:prstGeom prst="line">
+            <a:avLst/>
+          </a:prstGeom>
+          <a:ln w="76200"/>
+        </p:spPr>
+        <p:style>
+          <a:lnRef idx="1">
+            <a:schemeClr val="accent1"/>
+          </a:lnRef>
+          <a:fillRef idx="0">
+            <a:schemeClr val="accent1"/>
+          </a:fillRef>
+          <a:effectRef idx="0">
+            <a:schemeClr val="accent1"/>
+          </a:effectRef>
+          <a:fontRef idx="minor">
+            <a:schemeClr val="tx1"/>
+          </a:fontRef>
+        </p:style>
+      </p:cxnSp>
       <p:pic>
         <p:nvPicPr>
-          <p:cNvPr id="2" name="Picture 1">
-            <a:extLst>
-              <a:ext uri="{FF2B5EF4-FFF2-40B4-BE49-F238E27FC236}">
-                <a16:creationId xmlns:a16="http://schemas.microsoft.com/office/drawing/2014/main" id="{A6E1BA26-738A-485A-824F-DA61B88B8EAB}"/>
+          <p:cNvPr id="10" name="Picture 9">
+            <a:extLst>
+              <a:ext uri="{FF2B5EF4-FFF2-40B4-BE49-F238E27FC236}">
+                <a16:creationId xmlns:a16="http://schemas.microsoft.com/office/drawing/2014/main" id="{92B1CC67-8726-424E-9C33-D1A132C52224}"/>
               </a:ext>
             </a:extLst>
           </p:cNvPr>
@@ -5986,144 +6213,18 @@
         </p:blipFill>
         <p:spPr>
           <a:xfrm>
-            <a:off x="575746" y="1377401"/>
-            <a:ext cx="2551550" cy="5052323"/>
+            <a:off x="2967875" y="815616"/>
+            <a:ext cx="6613047" cy="5502693"/>
           </a:xfrm>
           <a:prstGeom prst="rect">
             <a:avLst/>
           </a:prstGeom>
         </p:spPr>
       </p:pic>
-      <p:pic>
-        <p:nvPicPr>
-          <p:cNvPr id="3" name="Picture 2">
-            <a:extLst>
-              <a:ext uri="{FF2B5EF4-FFF2-40B4-BE49-F238E27FC236}">
-                <a16:creationId xmlns:a16="http://schemas.microsoft.com/office/drawing/2014/main" id="{64C807C7-016F-42B4-8DD1-F185349ABCC8}"/>
-              </a:ext>
-            </a:extLst>
-          </p:cNvPr>
-          <p:cNvPicPr>
-            <a:picLocks noChangeAspect="1"/>
-          </p:cNvPicPr>
-          <p:nvPr/>
-        </p:nvPicPr>
-        <p:blipFill>
-          <a:blip r:embed="rId3"/>
-          <a:stretch>
-            <a:fillRect/>
-          </a:stretch>
-        </p:blipFill>
-        <p:spPr>
-          <a:xfrm>
-            <a:off x="3474045" y="1377402"/>
-            <a:ext cx="2545348" cy="5052323"/>
-          </a:xfrm>
-          <a:prstGeom prst="rect">
-            <a:avLst/>
-          </a:prstGeom>
-        </p:spPr>
-      </p:pic>
-      <p:pic>
-        <p:nvPicPr>
-          <p:cNvPr id="4" name="Picture 3">
-            <a:extLst>
-              <a:ext uri="{FF2B5EF4-FFF2-40B4-BE49-F238E27FC236}">
-                <a16:creationId xmlns:a16="http://schemas.microsoft.com/office/drawing/2014/main" id="{70565E3B-A28C-4E20-B2DC-599EFB4D8134}"/>
-              </a:ext>
-            </a:extLst>
-          </p:cNvPr>
-          <p:cNvPicPr>
-            <a:picLocks noChangeAspect="1"/>
-          </p:cNvPicPr>
-          <p:nvPr/>
-        </p:nvPicPr>
-        <p:blipFill>
-          <a:blip r:embed="rId4"/>
-          <a:stretch>
-            <a:fillRect/>
-          </a:stretch>
-        </p:blipFill>
-        <p:spPr>
-          <a:xfrm>
-            <a:off x="6366142" y="1377402"/>
-            <a:ext cx="2532540" cy="5052322"/>
-          </a:xfrm>
-          <a:prstGeom prst="rect">
-            <a:avLst/>
-          </a:prstGeom>
-        </p:spPr>
-      </p:pic>
-      <p:pic>
-        <p:nvPicPr>
-          <p:cNvPr id="7" name="Picture 6">
-            <a:extLst>
-              <a:ext uri="{FF2B5EF4-FFF2-40B4-BE49-F238E27FC236}">
-                <a16:creationId xmlns:a16="http://schemas.microsoft.com/office/drawing/2014/main" id="{B573715D-48EE-42FC-AA91-6206982A2929}"/>
-              </a:ext>
-            </a:extLst>
-          </p:cNvPr>
-          <p:cNvPicPr>
-            <a:picLocks noChangeAspect="1"/>
-          </p:cNvPicPr>
-          <p:nvPr/>
-        </p:nvPicPr>
-        <p:blipFill>
-          <a:blip r:embed="rId5"/>
-          <a:stretch>
-            <a:fillRect/>
-          </a:stretch>
-        </p:blipFill>
-        <p:spPr>
-          <a:xfrm>
-            <a:off x="9245431" y="1377400"/>
-            <a:ext cx="2545299" cy="5052323"/>
-          </a:xfrm>
-          <a:prstGeom prst="rect">
-            <a:avLst/>
-          </a:prstGeom>
-        </p:spPr>
-      </p:pic>
-      <p:sp>
-        <p:nvSpPr>
-          <p:cNvPr id="8" name="TextBox 7">
-            <a:extLst>
-              <a:ext uri="{FF2B5EF4-FFF2-40B4-BE49-F238E27FC236}">
-                <a16:creationId xmlns:a16="http://schemas.microsoft.com/office/drawing/2014/main" id="{54739FDC-EDB9-4DAE-A9F2-9B0AB3568C85}"/>
-              </a:ext>
-            </a:extLst>
-          </p:cNvPr>
-          <p:cNvSpPr txBox="1"/>
-          <p:nvPr/>
-        </p:nvSpPr>
-        <p:spPr>
-          <a:xfrm>
-            <a:off x="3293318" y="171450"/>
-            <a:ext cx="5605364" cy="954107"/>
-          </a:xfrm>
-          <a:prstGeom prst="rect">
-            <a:avLst/>
-          </a:prstGeom>
-          <a:noFill/>
-        </p:spPr>
-        <p:txBody>
-          <a:bodyPr wrap="square" rtlCol="0">
-            <a:spAutoFit/>
-          </a:bodyPr>
-          <a:lstStyle/>
-          <a:p>
-            <a:pPr algn="ctr"/>
-            <a:r>
-              <a:rPr lang="en-AU" sz="2800" dirty="0"/>
-              <a:t>Michael Dart | Portfolio                 MOBILE VIEW</a:t>
-            </a:r>
-          </a:p>
-        </p:txBody>
-      </p:sp>
     </p:spTree>
     <p:extLst>
       <p:ext uri="{BB962C8B-B14F-4D97-AF65-F5344CB8AC3E}">
-        <p14:creationId xmlns:p14="http://schemas.microsoft.com/office/powerpoint/2010/main" val="1930449683"/>
+        <p14:creationId xmlns:p14="http://schemas.microsoft.com/office/powerpoint/2010/main" val="97249713"/>
       </p:ext>
     </p:extLst>
   </p:cSld>
@@ -6152,10 +6253,10 @@
       </p:grpSpPr>
       <p:sp>
         <p:nvSpPr>
-          <p:cNvPr id="2" name="Rectangle 1">
-            <a:extLst>
-              <a:ext uri="{FF2B5EF4-FFF2-40B4-BE49-F238E27FC236}">
-                <a16:creationId xmlns:a16="http://schemas.microsoft.com/office/drawing/2014/main" id="{024115E3-FC26-4983-A935-06F6329EF481}"/>
+          <p:cNvPr id="23" name="Rectangle: Rounded Corners 22">
+            <a:extLst>
+              <a:ext uri="{FF2B5EF4-FFF2-40B4-BE49-F238E27FC236}">
+                <a16:creationId xmlns:a16="http://schemas.microsoft.com/office/drawing/2014/main" id="{915CDFCD-E62C-4A81-83BD-8ADCB03B986F}"/>
               </a:ext>
             </a:extLst>
           </p:cNvPr>
@@ -6164,8 +6265,100 @@
         </p:nvSpPr>
         <p:spPr>
           <a:xfrm>
-            <a:off x="933450" y="16471"/>
-            <a:ext cx="10325099" cy="523220"/>
+            <a:off x="6098772" y="4627692"/>
+            <a:ext cx="5340032" cy="1877437"/>
+          </a:xfrm>
+          <a:prstGeom prst="roundRect">
+            <a:avLst/>
+          </a:prstGeom>
+        </p:spPr>
+        <p:style>
+          <a:lnRef idx="2">
+            <a:schemeClr val="accent1">
+              <a:shade val="50000"/>
+            </a:schemeClr>
+          </a:lnRef>
+          <a:fillRef idx="1">
+            <a:schemeClr val="accent1"/>
+          </a:fillRef>
+          <a:effectRef idx="0">
+            <a:schemeClr val="accent1"/>
+          </a:effectRef>
+          <a:fontRef idx="minor">
+            <a:schemeClr val="lt1"/>
+          </a:fontRef>
+        </p:style>
+        <p:txBody>
+          <a:bodyPr rtlCol="0" anchor="ctr"/>
+          <a:lstStyle/>
+          <a:p>
+            <a:pPr algn="ctr"/>
+            <a:endParaRPr lang="en-AU" dirty="0"/>
+          </a:p>
+        </p:txBody>
+      </p:sp>
+      <p:sp>
+        <p:nvSpPr>
+          <p:cNvPr id="18" name="Rectangle: Rounded Corners 17">
+            <a:extLst>
+              <a:ext uri="{FF2B5EF4-FFF2-40B4-BE49-F238E27FC236}">
+                <a16:creationId xmlns:a16="http://schemas.microsoft.com/office/drawing/2014/main" id="{E65B2E9D-6E84-4B8D-8365-D4EFBC5A7F36}"/>
+              </a:ext>
+            </a:extLst>
+          </p:cNvPr>
+          <p:cNvSpPr/>
+          <p:nvPr/>
+        </p:nvSpPr>
+        <p:spPr>
+          <a:xfrm>
+            <a:off x="910205" y="812827"/>
+            <a:ext cx="4834635" cy="1342020"/>
+          </a:xfrm>
+          <a:prstGeom prst="roundRect">
+            <a:avLst/>
+          </a:prstGeom>
+        </p:spPr>
+        <p:style>
+          <a:lnRef idx="2">
+            <a:schemeClr val="accent1">
+              <a:shade val="50000"/>
+            </a:schemeClr>
+          </a:lnRef>
+          <a:fillRef idx="1">
+            <a:schemeClr val="accent1"/>
+          </a:fillRef>
+          <a:effectRef idx="0">
+            <a:schemeClr val="accent1"/>
+          </a:effectRef>
+          <a:fontRef idx="minor">
+            <a:schemeClr val="lt1"/>
+          </a:fontRef>
+        </p:style>
+        <p:txBody>
+          <a:bodyPr rtlCol="0" anchor="ctr"/>
+          <a:lstStyle/>
+          <a:p>
+            <a:pPr algn="ctr"/>
+            <a:endParaRPr lang="en-AU" dirty="0"/>
+          </a:p>
+        </p:txBody>
+      </p:sp>
+      <p:sp>
+        <p:nvSpPr>
+          <p:cNvPr id="3" name="Rectangle 2">
+            <a:extLst>
+              <a:ext uri="{FF2B5EF4-FFF2-40B4-BE49-F238E27FC236}">
+                <a16:creationId xmlns:a16="http://schemas.microsoft.com/office/drawing/2014/main" id="{8B2E0707-5912-451D-A530-B076A5571FC4}"/>
+              </a:ext>
+            </a:extLst>
+          </p:cNvPr>
+          <p:cNvSpPr/>
+          <p:nvPr/>
+        </p:nvSpPr>
+        <p:spPr>
+          <a:xfrm>
+            <a:off x="453031" y="813183"/>
+            <a:ext cx="5640198" cy="1261884"/>
           </a:xfrm>
           <a:prstGeom prst="rect">
             <a:avLst/>
@@ -6179,136 +6372,617 @@
           <a:p>
             <a:pPr algn="ctr"/>
             <a:r>
-              <a:rPr lang="en-AU" sz="2800" dirty="0"/>
-              <a:t>Michael Dart | Portfolio | TABLET VIEW</a:t>
-            </a:r>
-          </a:p>
-        </p:txBody>
-      </p:sp>
-      <p:pic>
-        <p:nvPicPr>
-          <p:cNvPr id="3" name="Picture 2">
-            <a:extLst>
-              <a:ext uri="{FF2B5EF4-FFF2-40B4-BE49-F238E27FC236}">
-                <a16:creationId xmlns:a16="http://schemas.microsoft.com/office/drawing/2014/main" id="{30F90190-CA9A-48DD-8877-ABB9CF878DE7}"/>
-              </a:ext>
-            </a:extLst>
-          </p:cNvPr>
-          <p:cNvPicPr>
-            <a:picLocks noChangeAspect="1"/>
-          </p:cNvPicPr>
+              <a:rPr lang="en-AU" sz="2000" b="1" u="sng" dirty="0"/>
+              <a:t>Simplified Layout</a:t>
+            </a:r>
+            <a:endParaRPr lang="en-AU" sz="2000" u="sng" dirty="0"/>
+          </a:p>
+          <a:p>
+            <a:pPr algn="ctr"/>
+            <a:r>
+              <a:rPr lang="en-AU" sz="1400" b="1" dirty="0"/>
+              <a:t>Header</a:t>
+            </a:r>
+            <a:r>
+              <a:rPr lang="en-AU" sz="1200" dirty="0"/>
+              <a:t> – with text and image</a:t>
+            </a:r>
+          </a:p>
+          <a:p>
+            <a:pPr algn="ctr"/>
+            <a:r>
+              <a:rPr lang="en-AU" sz="1400" b="1" dirty="0"/>
+              <a:t>Nav Bar </a:t>
+            </a:r>
+            <a:r>
+              <a:rPr lang="en-AU" sz="1200" dirty="0"/>
+              <a:t>– to access other pages easily</a:t>
+            </a:r>
+          </a:p>
+          <a:p>
+            <a:pPr algn="ctr"/>
+            <a:r>
+              <a:rPr lang="en-AU" sz="1400" b="1" dirty="0"/>
+              <a:t>Body</a:t>
+            </a:r>
+            <a:r>
+              <a:rPr lang="en-AU" sz="1200" dirty="0"/>
+              <a:t> – Grid or Block layout </a:t>
+            </a:r>
+          </a:p>
+          <a:p>
+            <a:pPr algn="ctr"/>
+            <a:r>
+              <a:rPr lang="en-AU" sz="1400" b="1" dirty="0"/>
+              <a:t>Footer</a:t>
+            </a:r>
+            <a:r>
+              <a:rPr lang="en-AU" sz="1200" dirty="0"/>
+              <a:t> – Copyright Information and link to Sitemap</a:t>
+            </a:r>
+          </a:p>
+        </p:txBody>
+      </p:sp>
+      <p:cxnSp>
+        <p:nvCxnSpPr>
+          <p:cNvPr id="4" name="Straight Connector 3">
+            <a:extLst>
+              <a:ext uri="{FF2B5EF4-FFF2-40B4-BE49-F238E27FC236}">
+                <a16:creationId xmlns:a16="http://schemas.microsoft.com/office/drawing/2014/main" id="{F9C17560-7532-44C1-9480-0706AC4FA72B}"/>
+              </a:ext>
+            </a:extLst>
+          </p:cNvPr>
+          <p:cNvCxnSpPr/>
           <p:nvPr/>
-        </p:nvPicPr>
-        <p:blipFill>
-          <a:blip r:embed="rId2"/>
-          <a:stretch>
-            <a:fillRect/>
-          </a:stretch>
-        </p:blipFill>
-        <p:spPr>
-          <a:xfrm>
-            <a:off x="550668" y="677853"/>
-            <a:ext cx="3510497" cy="2885190"/>
+        </p:nvCxnSpPr>
+        <p:spPr>
+          <a:xfrm>
+            <a:off x="2210791" y="539691"/>
+            <a:ext cx="8127218" cy="0"/>
+          </a:xfrm>
+          <a:prstGeom prst="line">
+            <a:avLst/>
+          </a:prstGeom>
+          <a:ln w="76200"/>
+        </p:spPr>
+        <p:style>
+          <a:lnRef idx="1">
+            <a:schemeClr val="accent1"/>
+          </a:lnRef>
+          <a:fillRef idx="0">
+            <a:schemeClr val="accent1"/>
+          </a:fillRef>
+          <a:effectRef idx="0">
+            <a:schemeClr val="accent1"/>
+          </a:effectRef>
+          <a:fontRef idx="minor">
+            <a:schemeClr val="tx1"/>
+          </a:fontRef>
+        </p:style>
+      </p:cxnSp>
+      <p:sp>
+        <p:nvSpPr>
+          <p:cNvPr id="6" name="TextBox 5">
+            <a:extLst>
+              <a:ext uri="{FF2B5EF4-FFF2-40B4-BE49-F238E27FC236}">
+                <a16:creationId xmlns:a16="http://schemas.microsoft.com/office/drawing/2014/main" id="{B03CB523-A13D-4788-9710-602F5EBC54E8}"/>
+              </a:ext>
+            </a:extLst>
+          </p:cNvPr>
+          <p:cNvSpPr txBox="1"/>
+          <p:nvPr/>
+        </p:nvSpPr>
+        <p:spPr>
+          <a:xfrm>
+            <a:off x="4577892" y="135298"/>
+            <a:ext cx="3036216" cy="369332"/>
           </a:xfrm>
           <a:prstGeom prst="rect">
             <a:avLst/>
           </a:prstGeom>
-        </p:spPr>
-      </p:pic>
-      <p:pic>
-        <p:nvPicPr>
-          <p:cNvPr id="4" name="Picture 3">
-            <a:extLst>
-              <a:ext uri="{FF2B5EF4-FFF2-40B4-BE49-F238E27FC236}">
-                <a16:creationId xmlns:a16="http://schemas.microsoft.com/office/drawing/2014/main" id="{82F5F160-6CA1-4BC7-AD7E-B2A745164320}"/>
-              </a:ext>
-            </a:extLst>
-          </p:cNvPr>
-          <p:cNvPicPr>
-            <a:picLocks noChangeAspect="1"/>
-          </p:cNvPicPr>
+          <a:noFill/>
+        </p:spPr>
+        <p:txBody>
+          <a:bodyPr wrap="none" rtlCol="0">
+            <a:spAutoFit/>
+          </a:bodyPr>
+          <a:lstStyle/>
+          <a:p>
+            <a:r>
+              <a:rPr lang="en-AU" dirty="0"/>
+              <a:t>THE LAYOUT AND DESIGN</a:t>
+            </a:r>
+          </a:p>
+        </p:txBody>
+      </p:sp>
+      <p:sp>
+        <p:nvSpPr>
+          <p:cNvPr id="9" name="TextBox 8">
+            <a:extLst>
+              <a:ext uri="{FF2B5EF4-FFF2-40B4-BE49-F238E27FC236}">
+                <a16:creationId xmlns:a16="http://schemas.microsoft.com/office/drawing/2014/main" id="{6D786BA2-7789-4641-A9B4-1EB0637126F0}"/>
+              </a:ext>
+            </a:extLst>
+          </p:cNvPr>
+          <p:cNvSpPr txBox="1"/>
           <p:nvPr/>
-        </p:nvPicPr>
-        <p:blipFill>
-          <a:blip r:embed="rId3"/>
-          <a:stretch>
-            <a:fillRect/>
-          </a:stretch>
-        </p:blipFill>
-        <p:spPr>
-          <a:xfrm>
-            <a:off x="4354307" y="677853"/>
-            <a:ext cx="3483383" cy="2885190"/>
+        </p:nvSpPr>
+        <p:spPr>
+          <a:xfrm>
+            <a:off x="910205" y="2396670"/>
+            <a:ext cx="4834635" cy="3908762"/>
           </a:xfrm>
           <a:prstGeom prst="rect">
             <a:avLst/>
           </a:prstGeom>
-        </p:spPr>
-      </p:pic>
-      <p:pic>
-        <p:nvPicPr>
-          <p:cNvPr id="5" name="Picture 4">
-            <a:extLst>
-              <a:ext uri="{FF2B5EF4-FFF2-40B4-BE49-F238E27FC236}">
-                <a16:creationId xmlns:a16="http://schemas.microsoft.com/office/drawing/2014/main" id="{080EFB11-511F-410F-A70E-0B8FFAD34998}"/>
-              </a:ext>
-            </a:extLst>
-          </p:cNvPr>
-          <p:cNvPicPr>
-            <a:picLocks noChangeAspect="1"/>
-          </p:cNvPicPr>
+          <a:noFill/>
+        </p:spPr>
+        <p:txBody>
+          <a:bodyPr wrap="square" rtlCol="0">
+            <a:spAutoFit/>
+          </a:bodyPr>
+          <a:lstStyle/>
+          <a:p>
+            <a:pPr algn="ctr"/>
+            <a:r>
+              <a:rPr lang="en-AU" sz="2000" b="1" u="sng" dirty="0"/>
+              <a:t>Design</a:t>
+            </a:r>
+          </a:p>
+          <a:p>
+            <a:pPr algn="ctr"/>
+            <a:r>
+              <a:rPr lang="en-AU" sz="1400" b="1" dirty="0"/>
+              <a:t>Uniformed Layout </a:t>
+            </a:r>
+            <a:r>
+              <a:rPr lang="en-AU" sz="1200" dirty="0"/>
+              <a:t>– Header, Nav Bar and Footer are visible across all pages</a:t>
+            </a:r>
+          </a:p>
+          <a:p>
+            <a:pPr algn="ctr"/>
+            <a:endParaRPr lang="en-AU" sz="1200" dirty="0"/>
+          </a:p>
+          <a:p>
+            <a:pPr algn="ctr"/>
+            <a:r>
+              <a:rPr lang="en-AU" sz="1400" b="1" dirty="0"/>
+              <a:t>Navbar </a:t>
+            </a:r>
+            <a:r>
+              <a:rPr lang="en-AU" sz="1200" b="1" dirty="0"/>
+              <a:t>– </a:t>
+            </a:r>
+            <a:r>
+              <a:rPr lang="en-AU" sz="1200" dirty="0"/>
+              <a:t>Active Page identified with a different colour, font-weight and uppercase</a:t>
+            </a:r>
+          </a:p>
+          <a:p>
+            <a:pPr algn="ctr"/>
+            <a:endParaRPr lang="en-AU" sz="1200" b="1" dirty="0"/>
+          </a:p>
+          <a:p>
+            <a:pPr algn="ctr"/>
+            <a:r>
+              <a:rPr lang="en-AU" sz="1200" dirty="0"/>
+              <a:t>Hover feature to show the user what is being selected</a:t>
+            </a:r>
+          </a:p>
+          <a:p>
+            <a:pPr algn="ctr"/>
+            <a:endParaRPr lang="en-AU" sz="1200" dirty="0"/>
+          </a:p>
+          <a:p>
+            <a:pPr algn="ctr"/>
+            <a:r>
+              <a:rPr lang="en-AU" sz="1400" b="1" dirty="0"/>
+              <a:t>Body</a:t>
+            </a:r>
+            <a:r>
+              <a:rPr lang="en-AU" sz="1400" dirty="0"/>
+              <a:t> </a:t>
+            </a:r>
+            <a:r>
+              <a:rPr lang="en-AU" sz="1200" dirty="0"/>
+              <a:t>– lots of blank areas for a spacious feel</a:t>
+            </a:r>
+          </a:p>
+          <a:p>
+            <a:pPr algn="ctr"/>
+            <a:endParaRPr lang="en-AU" sz="1200" b="1" dirty="0"/>
+          </a:p>
+          <a:p>
+            <a:pPr algn="ctr"/>
+            <a:r>
+              <a:rPr lang="en-AU" sz="1400" b="1" dirty="0"/>
+              <a:t>Scroll Bar </a:t>
+            </a:r>
+            <a:r>
+              <a:rPr lang="en-AU" sz="1200" dirty="0"/>
+              <a:t>– for the About Me and Blog pages to scroll through content easily</a:t>
+            </a:r>
+            <a:endParaRPr lang="en-AU" sz="1200" b="1" dirty="0"/>
+          </a:p>
+          <a:p>
+            <a:pPr algn="ctr"/>
+            <a:endParaRPr lang="en-AU" sz="1200" dirty="0"/>
+          </a:p>
+          <a:p>
+            <a:pPr algn="ctr"/>
+            <a:r>
+              <a:rPr lang="en-AU" sz="1400" b="1" dirty="0"/>
+              <a:t>Curved Edges </a:t>
+            </a:r>
+            <a:r>
+              <a:rPr lang="en-AU" sz="1200" dirty="0"/>
+              <a:t>– easier on the eyes</a:t>
+            </a:r>
+          </a:p>
+          <a:p>
+            <a:pPr algn="ctr"/>
+            <a:endParaRPr lang="en-AU" sz="1200" dirty="0"/>
+          </a:p>
+          <a:p>
+            <a:pPr algn="ctr"/>
+            <a:r>
+              <a:rPr lang="en-AU" sz="1400" b="1" dirty="0"/>
+              <a:t>Form and Social Media Links </a:t>
+            </a:r>
+            <a:r>
+              <a:rPr lang="en-AU" sz="1200" dirty="0"/>
+              <a:t>– to connect with users</a:t>
+            </a:r>
+          </a:p>
+          <a:p>
+            <a:pPr algn="ctr"/>
+            <a:endParaRPr lang="en-AU" sz="1200" dirty="0"/>
+          </a:p>
+          <a:p>
+            <a:pPr algn="ctr"/>
+            <a:r>
+              <a:rPr lang="en-AU" sz="1400" b="1" dirty="0"/>
+              <a:t>Sitemap</a:t>
+            </a:r>
+            <a:r>
+              <a:rPr lang="en-AU" sz="1200" dirty="0"/>
+              <a:t> – to show users the layout of the website</a:t>
+            </a:r>
+          </a:p>
+        </p:txBody>
+      </p:sp>
+      <p:sp>
+        <p:nvSpPr>
+          <p:cNvPr id="10" name="TextBox 9">
+            <a:extLst>
+              <a:ext uri="{FF2B5EF4-FFF2-40B4-BE49-F238E27FC236}">
+                <a16:creationId xmlns:a16="http://schemas.microsoft.com/office/drawing/2014/main" id="{2A511ECC-04C0-44A3-81A8-C92A54591045}"/>
+              </a:ext>
+            </a:extLst>
+          </p:cNvPr>
+          <p:cNvSpPr txBox="1"/>
           <p:nvPr/>
-        </p:nvPicPr>
-        <p:blipFill>
-          <a:blip r:embed="rId4"/>
-          <a:stretch>
-            <a:fillRect/>
-          </a:stretch>
-        </p:blipFill>
-        <p:spPr>
-          <a:xfrm>
-            <a:off x="577782" y="3802053"/>
-            <a:ext cx="3483383" cy="2869957"/>
+        </p:nvSpPr>
+        <p:spPr>
+          <a:xfrm>
+            <a:off x="6093229" y="783548"/>
+            <a:ext cx="5342805" cy="3508653"/>
           </a:xfrm>
           <a:prstGeom prst="rect">
             <a:avLst/>
           </a:prstGeom>
-        </p:spPr>
-      </p:pic>
-      <p:pic>
-        <p:nvPicPr>
-          <p:cNvPr id="6" name="Picture 5">
-            <a:extLst>
-              <a:ext uri="{FF2B5EF4-FFF2-40B4-BE49-F238E27FC236}">
-                <a16:creationId xmlns:a16="http://schemas.microsoft.com/office/drawing/2014/main" id="{A7E2BDB9-92AD-4073-A2C2-5F51751559A9}"/>
-              </a:ext>
-            </a:extLst>
-          </p:cNvPr>
-          <p:cNvPicPr>
-            <a:picLocks noChangeAspect="1"/>
-          </p:cNvPicPr>
+          <a:noFill/>
+        </p:spPr>
+        <p:txBody>
+          <a:bodyPr wrap="square" rtlCol="0">
+            <a:spAutoFit/>
+          </a:bodyPr>
+          <a:lstStyle/>
+          <a:p>
+            <a:pPr algn="ctr"/>
+            <a:r>
+              <a:rPr lang="en-AU" sz="2000" b="1" u="sng" dirty="0"/>
+              <a:t>Changes</a:t>
+            </a:r>
+          </a:p>
+          <a:p>
+            <a:pPr algn="ctr"/>
+            <a:r>
+              <a:rPr lang="en-AU" sz="1400" b="1" dirty="0"/>
+              <a:t>Navbar</a:t>
+            </a:r>
+            <a:endParaRPr lang="en-AU" sz="1200" b="1" dirty="0"/>
+          </a:p>
+          <a:p>
+            <a:pPr algn="ctr"/>
+            <a:r>
+              <a:rPr lang="en-AU" sz="1200" dirty="0"/>
+              <a:t>Active page identified with bold text. </a:t>
+            </a:r>
+          </a:p>
+          <a:p>
+            <a:pPr algn="ctr"/>
+            <a:r>
+              <a:rPr lang="en-AU" sz="1200" dirty="0"/>
+              <a:t>With smaller page titles it made the hover colour </a:t>
+            </a:r>
+          </a:p>
+          <a:p>
+            <a:pPr algn="ctr"/>
+            <a:r>
+              <a:rPr lang="en-AU" sz="1200" dirty="0"/>
+              <a:t>only display over text instead of whole nav item as longer page titles were on two lines. Changed the font weight as a fix.</a:t>
+            </a:r>
+          </a:p>
+          <a:p>
+            <a:pPr algn="ctr"/>
+            <a:endParaRPr lang="en-AU" sz="1200" b="1" u="sng" dirty="0"/>
+          </a:p>
+          <a:p>
+            <a:pPr algn="ctr"/>
+            <a:r>
+              <a:rPr lang="en-AU" sz="1400" b="1" dirty="0"/>
+              <a:t>Scrollbar</a:t>
+            </a:r>
+            <a:endParaRPr lang="en-AU" sz="1200" b="1" dirty="0"/>
+          </a:p>
+          <a:p>
+            <a:pPr algn="ctr"/>
+            <a:r>
+              <a:rPr lang="en-AU" sz="1200" b="1" dirty="0"/>
+              <a:t>O</a:t>
+            </a:r>
+            <a:r>
+              <a:rPr lang="en-AU" sz="1200" dirty="0"/>
+              <a:t>nly planned for two pages to keep header and nav bar fixed but felt it was not necessary. Replaced with a “Back to Top” link in Footer</a:t>
+            </a:r>
+          </a:p>
+          <a:p>
+            <a:pPr algn="ctr"/>
+            <a:endParaRPr lang="en-AU" sz="1400" dirty="0"/>
+          </a:p>
+          <a:p>
+            <a:pPr algn="ctr"/>
+            <a:r>
+              <a:rPr lang="en-AU" sz="1400" b="1" dirty="0"/>
+              <a:t>Grid</a:t>
+            </a:r>
+            <a:r>
+              <a:rPr lang="en-AU" sz="1400" dirty="0"/>
+              <a:t> </a:t>
+            </a:r>
+          </a:p>
+          <a:p>
+            <a:pPr algn="ctr"/>
+            <a:r>
+              <a:rPr lang="en-AU" sz="1400" dirty="0"/>
+              <a:t>I</a:t>
+            </a:r>
+            <a:r>
+              <a:rPr lang="en-AU" sz="1200" dirty="0"/>
+              <a:t>nstead of using just flexbox, I used the Grid to control my “blog titles” so that they can wrap easily into a column in smaller screens</a:t>
+            </a:r>
+          </a:p>
+          <a:p>
+            <a:pPr algn="ctr"/>
+            <a:endParaRPr lang="en-AU" sz="1200" dirty="0"/>
+          </a:p>
+          <a:p>
+            <a:pPr algn="ctr"/>
+            <a:r>
+              <a:rPr lang="en-AU" sz="1200" b="1" dirty="0"/>
+              <a:t>Sitemap</a:t>
+            </a:r>
+            <a:r>
+              <a:rPr lang="en-AU" sz="1200" dirty="0"/>
+              <a:t> </a:t>
+            </a:r>
+          </a:p>
+          <a:p>
+            <a:pPr algn="ctr"/>
+            <a:r>
+              <a:rPr lang="en-AU" sz="1200" dirty="0"/>
+              <a:t>Removed sitemap from page as it wasn’t necessary for a 4 page site</a:t>
+            </a:r>
+            <a:endParaRPr lang="en-AU" sz="1400" dirty="0"/>
+          </a:p>
+        </p:txBody>
+      </p:sp>
+      <p:sp>
+        <p:nvSpPr>
+          <p:cNvPr id="20" name="Rectangle: Rounded Corners 19">
+            <a:extLst>
+              <a:ext uri="{FF2B5EF4-FFF2-40B4-BE49-F238E27FC236}">
+                <a16:creationId xmlns:a16="http://schemas.microsoft.com/office/drawing/2014/main" id="{B34F8FFC-C687-4FDD-9C9F-3B8EEC223D59}"/>
+              </a:ext>
+            </a:extLst>
+          </p:cNvPr>
+          <p:cNvSpPr/>
           <p:nvPr/>
-        </p:nvPicPr>
-        <p:blipFill>
-          <a:blip r:embed="rId5"/>
-          <a:stretch>
-            <a:fillRect/>
-          </a:stretch>
-        </p:blipFill>
-        <p:spPr>
-          <a:xfrm>
-            <a:off x="4354308" y="3802053"/>
-            <a:ext cx="3483382" cy="2869957"/>
+        </p:nvSpPr>
+        <p:spPr>
+          <a:xfrm>
+            <a:off x="910205" y="2412682"/>
+            <a:ext cx="4834635" cy="4092448"/>
+          </a:xfrm>
+          <a:prstGeom prst="roundRect">
+            <a:avLst/>
+          </a:prstGeom>
+          <a:noFill/>
+          <a:ln w="38100"/>
+        </p:spPr>
+        <p:style>
+          <a:lnRef idx="2">
+            <a:schemeClr val="accent1">
+              <a:shade val="50000"/>
+            </a:schemeClr>
+          </a:lnRef>
+          <a:fillRef idx="1">
+            <a:schemeClr val="accent1"/>
+          </a:fillRef>
+          <a:effectRef idx="0">
+            <a:schemeClr val="accent1"/>
+          </a:effectRef>
+          <a:fontRef idx="minor">
+            <a:schemeClr val="lt1"/>
+          </a:fontRef>
+        </p:style>
+        <p:txBody>
+          <a:bodyPr rtlCol="0" anchor="ctr"/>
+          <a:lstStyle/>
+          <a:p>
+            <a:pPr algn="ctr"/>
+            <a:endParaRPr lang="en-AU"/>
+          </a:p>
+        </p:txBody>
+      </p:sp>
+      <p:sp>
+        <p:nvSpPr>
+          <p:cNvPr id="21" name="Rectangle: Rounded Corners 20">
+            <a:extLst>
+              <a:ext uri="{FF2B5EF4-FFF2-40B4-BE49-F238E27FC236}">
+                <a16:creationId xmlns:a16="http://schemas.microsoft.com/office/drawing/2014/main" id="{F4E0B4CC-693C-4D53-95CA-1AFA3D5F8AC1}"/>
+              </a:ext>
+            </a:extLst>
+          </p:cNvPr>
+          <p:cNvSpPr/>
+          <p:nvPr/>
+        </p:nvSpPr>
+        <p:spPr>
+          <a:xfrm>
+            <a:off x="6098772" y="814161"/>
+            <a:ext cx="5340032" cy="3573281"/>
+          </a:xfrm>
+          <a:prstGeom prst="roundRect">
+            <a:avLst/>
+          </a:prstGeom>
+          <a:noFill/>
+          <a:ln w="38100"/>
+        </p:spPr>
+        <p:style>
+          <a:lnRef idx="2">
+            <a:schemeClr val="accent1">
+              <a:shade val="50000"/>
+            </a:schemeClr>
+          </a:lnRef>
+          <a:fillRef idx="1">
+            <a:schemeClr val="accent1"/>
+          </a:fillRef>
+          <a:effectRef idx="0">
+            <a:schemeClr val="accent1"/>
+          </a:effectRef>
+          <a:fontRef idx="minor">
+            <a:schemeClr val="lt1"/>
+          </a:fontRef>
+        </p:style>
+        <p:txBody>
+          <a:bodyPr rtlCol="0" anchor="ctr"/>
+          <a:lstStyle/>
+          <a:p>
+            <a:pPr algn="ctr"/>
+            <a:endParaRPr lang="en-AU"/>
+          </a:p>
+        </p:txBody>
+      </p:sp>
+      <p:sp>
+        <p:nvSpPr>
+          <p:cNvPr id="22" name="TextBox 21">
+            <a:extLst>
+              <a:ext uri="{FF2B5EF4-FFF2-40B4-BE49-F238E27FC236}">
+                <a16:creationId xmlns:a16="http://schemas.microsoft.com/office/drawing/2014/main" id="{CC2B4D98-AA81-4A81-920A-D75630E5C154}"/>
+              </a:ext>
+            </a:extLst>
+          </p:cNvPr>
+          <p:cNvSpPr txBox="1"/>
+          <p:nvPr/>
+        </p:nvSpPr>
+        <p:spPr>
+          <a:xfrm>
+            <a:off x="6247468" y="4627692"/>
+            <a:ext cx="5188566" cy="1877437"/>
           </a:xfrm>
           <a:prstGeom prst="rect">
             <a:avLst/>
           </a:prstGeom>
-        </p:spPr>
-      </p:pic>
+          <a:noFill/>
+        </p:spPr>
+        <p:txBody>
+          <a:bodyPr wrap="square" rtlCol="0">
+            <a:spAutoFit/>
+          </a:bodyPr>
+          <a:lstStyle/>
+          <a:p>
+            <a:pPr algn="ctr"/>
+            <a:r>
+              <a:rPr lang="en-AU" sz="2000" b="1" u="sng" dirty="0"/>
+              <a:t>Additions</a:t>
+            </a:r>
+          </a:p>
+          <a:p>
+            <a:pPr algn="ctr"/>
+            <a:r>
+              <a:rPr lang="en-AU" sz="1400" b="1" dirty="0"/>
+              <a:t>Backgrounds and Borders </a:t>
+            </a:r>
+            <a:r>
+              <a:rPr lang="en-AU" sz="1400" dirty="0"/>
+              <a:t> - </a:t>
+            </a:r>
+            <a:r>
+              <a:rPr lang="en-AU" sz="1200" dirty="0"/>
+              <a:t>To help differentiate content within some of the pages</a:t>
+            </a:r>
+          </a:p>
+          <a:p>
+            <a:pPr algn="ctr"/>
+            <a:endParaRPr lang="en-AU" sz="1400" dirty="0"/>
+          </a:p>
+          <a:p>
+            <a:pPr algn="ctr"/>
+            <a:r>
+              <a:rPr lang="en-AU" sz="1400" b="1" dirty="0"/>
+              <a:t>Captions - </a:t>
+            </a:r>
+            <a:r>
+              <a:rPr lang="en-AU" sz="1200" dirty="0"/>
+              <a:t>To explain the pictures</a:t>
+            </a:r>
+          </a:p>
+          <a:p>
+            <a:pPr algn="ctr"/>
+            <a:endParaRPr lang="en-AU" sz="1400" b="1" dirty="0"/>
+          </a:p>
+          <a:p>
+            <a:pPr algn="ctr"/>
+            <a:r>
+              <a:rPr lang="en-AU" sz="1400" b="1" dirty="0"/>
+              <a:t>Link to another page </a:t>
+            </a:r>
+            <a:r>
+              <a:rPr lang="en-AU" sz="1600" b="1" dirty="0"/>
+              <a:t>-</a:t>
+            </a:r>
+            <a:r>
+              <a:rPr lang="en-AU" sz="1600" dirty="0"/>
+              <a:t> </a:t>
+            </a:r>
+            <a:r>
+              <a:rPr lang="en-AU" sz="1200" dirty="0"/>
+              <a:t>To connect the user with my social media direct from a blog</a:t>
+            </a:r>
+            <a:r>
+              <a:rPr lang="en-AU" sz="1200" b="1" dirty="0"/>
+              <a:t> </a:t>
+            </a:r>
+            <a:endParaRPr lang="en-AU" b="1" u="sng" dirty="0"/>
+          </a:p>
+        </p:txBody>
+      </p:sp>
     </p:spTree>
     <p:extLst>
       <p:ext uri="{BB962C8B-B14F-4D97-AF65-F5344CB8AC3E}">
-        <p14:creationId xmlns:p14="http://schemas.microsoft.com/office/powerpoint/2010/main" val="4073871259"/>
+        <p14:creationId xmlns:p14="http://schemas.microsoft.com/office/powerpoint/2010/main" val="2425051922"/>
       </p:ext>
     </p:extLst>
   </p:cSld>
@@ -6335,47 +7009,12 @@
           <a:chExt cx="0" cy="0"/>
         </a:xfrm>
       </p:grpSpPr>
-      <p:sp>
-        <p:nvSpPr>
-          <p:cNvPr id="2" name="Rectangle 1">
-            <a:extLst>
-              <a:ext uri="{FF2B5EF4-FFF2-40B4-BE49-F238E27FC236}">
-                <a16:creationId xmlns:a16="http://schemas.microsoft.com/office/drawing/2014/main" id="{82D26F52-81ED-4752-A590-8FF6700695DF}"/>
-              </a:ext>
-            </a:extLst>
-          </p:cNvPr>
-          <p:cNvSpPr/>
-          <p:nvPr/>
-        </p:nvSpPr>
-        <p:spPr>
-          <a:xfrm>
-            <a:off x="3722436" y="154905"/>
-            <a:ext cx="4356514" cy="369332"/>
-          </a:xfrm>
-          <a:prstGeom prst="rect">
-            <a:avLst/>
-          </a:prstGeom>
-        </p:spPr>
-        <p:txBody>
-          <a:bodyPr wrap="none">
-            <a:spAutoFit/>
-          </a:bodyPr>
-          <a:lstStyle/>
-          <a:p>
-            <a:pPr algn="ctr"/>
-            <a:r>
-              <a:rPr lang="en-AU" dirty="0"/>
-              <a:t>Michael Dart | Portfolio | DESKTOP VIEW</a:t>
-            </a:r>
-          </a:p>
-        </p:txBody>
-      </p:sp>
       <p:pic>
         <p:nvPicPr>
-          <p:cNvPr id="3" name="Picture 2">
-            <a:extLst>
-              <a:ext uri="{FF2B5EF4-FFF2-40B4-BE49-F238E27FC236}">
-                <a16:creationId xmlns:a16="http://schemas.microsoft.com/office/drawing/2014/main" id="{8DB473C1-D2CD-427C-8F6D-BC22AF8970AC}"/>
+          <p:cNvPr id="5" name="Picture 4">
+            <a:extLst>
+              <a:ext uri="{FF2B5EF4-FFF2-40B4-BE49-F238E27FC236}">
+                <a16:creationId xmlns:a16="http://schemas.microsoft.com/office/drawing/2014/main" id="{2A9356DC-56B6-45D2-A4D4-520C100C729B}"/>
               </a:ext>
             </a:extLst>
           </p:cNvPr>
@@ -6392,8 +7031,271 @@
         </p:blipFill>
         <p:spPr>
           <a:xfrm>
-            <a:off x="5781501" y="4146754"/>
-            <a:ext cx="4828245" cy="1774940"/>
+            <a:off x="1329277" y="1442555"/>
+            <a:ext cx="9533446" cy="4359018"/>
+          </a:xfrm>
+          <a:prstGeom prst="rect">
+            <a:avLst/>
+          </a:prstGeom>
+        </p:spPr>
+      </p:pic>
+      <p:cxnSp>
+        <p:nvCxnSpPr>
+          <p:cNvPr id="7" name="Straight Connector 6">
+            <a:extLst>
+              <a:ext uri="{FF2B5EF4-FFF2-40B4-BE49-F238E27FC236}">
+                <a16:creationId xmlns:a16="http://schemas.microsoft.com/office/drawing/2014/main" id="{3C4FC3E2-6323-4932-B486-B2DC9E7F160D}"/>
+              </a:ext>
+            </a:extLst>
+          </p:cNvPr>
+          <p:cNvCxnSpPr/>
+          <p:nvPr/>
+        </p:nvCxnSpPr>
+        <p:spPr>
+          <a:xfrm>
+            <a:off x="2210791" y="539691"/>
+            <a:ext cx="8127218" cy="0"/>
+          </a:xfrm>
+          <a:prstGeom prst="line">
+            <a:avLst/>
+          </a:prstGeom>
+          <a:ln w="76200"/>
+        </p:spPr>
+        <p:style>
+          <a:lnRef idx="1">
+            <a:schemeClr val="accent1"/>
+          </a:lnRef>
+          <a:fillRef idx="0">
+            <a:schemeClr val="accent1"/>
+          </a:fillRef>
+          <a:effectRef idx="0">
+            <a:schemeClr val="accent1"/>
+          </a:effectRef>
+          <a:fontRef idx="minor">
+            <a:schemeClr val="tx1"/>
+          </a:fontRef>
+        </p:style>
+      </p:cxnSp>
+      <p:sp>
+        <p:nvSpPr>
+          <p:cNvPr id="8" name="TextBox 7">
+            <a:extLst>
+              <a:ext uri="{FF2B5EF4-FFF2-40B4-BE49-F238E27FC236}">
+                <a16:creationId xmlns:a16="http://schemas.microsoft.com/office/drawing/2014/main" id="{AA7FC98E-C3BE-4563-A0A6-CEDC84E4B66D}"/>
+              </a:ext>
+            </a:extLst>
+          </p:cNvPr>
+          <p:cNvSpPr txBox="1"/>
+          <p:nvPr/>
+        </p:nvSpPr>
+        <p:spPr>
+          <a:xfrm>
+            <a:off x="4496940" y="170359"/>
+            <a:ext cx="3087384" cy="369332"/>
+          </a:xfrm>
+          <a:prstGeom prst="rect">
+            <a:avLst/>
+          </a:prstGeom>
+          <a:noFill/>
+        </p:spPr>
+        <p:txBody>
+          <a:bodyPr wrap="none" rtlCol="0">
+            <a:spAutoFit/>
+          </a:bodyPr>
+          <a:lstStyle/>
+          <a:p>
+            <a:r>
+              <a:rPr lang="en-AU" dirty="0"/>
+              <a:t>WIREFRAMES | Mobile View</a:t>
+            </a:r>
+          </a:p>
+        </p:txBody>
+      </p:sp>
+    </p:spTree>
+    <p:extLst>
+      <p:ext uri="{BB962C8B-B14F-4D97-AF65-F5344CB8AC3E}">
+        <p14:creationId xmlns:p14="http://schemas.microsoft.com/office/powerpoint/2010/main" val="4096088193"/>
+      </p:ext>
+    </p:extLst>
+  </p:cSld>
+  <p:clrMapOvr>
+    <a:masterClrMapping/>
+  </p:clrMapOvr>
+</p:sld>
+</file>
+
+<file path=ppt/slides/slide5.xml><?xml version="1.0" encoding="utf-8"?>
+<p:sld xmlns:a="http://schemas.openxmlformats.org/drawingml/2006/main" xmlns:r="http://schemas.openxmlformats.org/officeDocument/2006/relationships" xmlns:p="http://schemas.openxmlformats.org/presentationml/2006/main">
+  <p:cSld>
+    <p:spTree>
+      <p:nvGrpSpPr>
+        <p:cNvPr id="1" name=""/>
+        <p:cNvGrpSpPr/>
+        <p:nvPr/>
+      </p:nvGrpSpPr>
+      <p:grpSpPr>
+        <a:xfrm>
+          <a:off x="0" y="0"/>
+          <a:ext cx="0" cy="0"/>
+          <a:chOff x="0" y="0"/>
+          <a:chExt cx="0" cy="0"/>
+        </a:xfrm>
+      </p:grpSpPr>
+      <p:cxnSp>
+        <p:nvCxnSpPr>
+          <p:cNvPr id="5" name="Straight Connector 4">
+            <a:extLst>
+              <a:ext uri="{FF2B5EF4-FFF2-40B4-BE49-F238E27FC236}">
+                <a16:creationId xmlns:a16="http://schemas.microsoft.com/office/drawing/2014/main" id="{E76222CB-12F4-460F-BDB7-75C57CD96B97}"/>
+              </a:ext>
+            </a:extLst>
+          </p:cNvPr>
+          <p:cNvCxnSpPr/>
+          <p:nvPr/>
+        </p:nvCxnSpPr>
+        <p:spPr>
+          <a:xfrm>
+            <a:off x="2210791" y="539691"/>
+            <a:ext cx="8127218" cy="0"/>
+          </a:xfrm>
+          <a:prstGeom prst="line">
+            <a:avLst/>
+          </a:prstGeom>
+          <a:ln w="76200"/>
+        </p:spPr>
+        <p:style>
+          <a:lnRef idx="1">
+            <a:schemeClr val="accent1"/>
+          </a:lnRef>
+          <a:fillRef idx="0">
+            <a:schemeClr val="accent1"/>
+          </a:fillRef>
+          <a:effectRef idx="0">
+            <a:schemeClr val="accent1"/>
+          </a:effectRef>
+          <a:fontRef idx="minor">
+            <a:schemeClr val="tx1"/>
+          </a:fontRef>
+        </p:style>
+      </p:cxnSp>
+      <p:sp>
+        <p:nvSpPr>
+          <p:cNvPr id="6" name="Rectangle 5">
+            <a:extLst>
+              <a:ext uri="{FF2B5EF4-FFF2-40B4-BE49-F238E27FC236}">
+                <a16:creationId xmlns:a16="http://schemas.microsoft.com/office/drawing/2014/main" id="{45FE33E0-8162-4CC8-913D-82069730F3D6}"/>
+              </a:ext>
+            </a:extLst>
+          </p:cNvPr>
+          <p:cNvSpPr/>
+          <p:nvPr/>
+        </p:nvSpPr>
+        <p:spPr>
+          <a:xfrm>
+            <a:off x="4552308" y="170359"/>
+            <a:ext cx="2981137" cy="369332"/>
+          </a:xfrm>
+          <a:prstGeom prst="rect">
+            <a:avLst/>
+          </a:prstGeom>
+        </p:spPr>
+        <p:txBody>
+          <a:bodyPr wrap="none">
+            <a:spAutoFit/>
+          </a:bodyPr>
+          <a:lstStyle/>
+          <a:p>
+            <a:r>
+              <a:rPr lang="en-AU" dirty="0"/>
+              <a:t>WIREFRAMES | Tablet View</a:t>
+            </a:r>
+          </a:p>
+        </p:txBody>
+      </p:sp>
+      <p:pic>
+        <p:nvPicPr>
+          <p:cNvPr id="10" name="Picture 9">
+            <a:extLst>
+              <a:ext uri="{FF2B5EF4-FFF2-40B4-BE49-F238E27FC236}">
+                <a16:creationId xmlns:a16="http://schemas.microsoft.com/office/drawing/2014/main" id="{6FF47C53-851A-46AC-9B4D-6ECD99040C61}"/>
+              </a:ext>
+            </a:extLst>
+          </p:cNvPr>
+          <p:cNvPicPr>
+            <a:picLocks noChangeAspect="1"/>
+          </p:cNvPicPr>
+          <p:nvPr/>
+        </p:nvPicPr>
+        <p:blipFill>
+          <a:blip r:embed="rId2"/>
+          <a:stretch>
+            <a:fillRect/>
+          </a:stretch>
+        </p:blipFill>
+        <p:spPr>
+          <a:xfrm>
+            <a:off x="577956" y="1333318"/>
+            <a:ext cx="11392887" cy="4191363"/>
+          </a:xfrm>
+          <a:prstGeom prst="rect">
+            <a:avLst/>
+          </a:prstGeom>
+        </p:spPr>
+      </p:pic>
+    </p:spTree>
+    <p:extLst>
+      <p:ext uri="{BB962C8B-B14F-4D97-AF65-F5344CB8AC3E}">
+        <p14:creationId xmlns:p14="http://schemas.microsoft.com/office/powerpoint/2010/main" val="2145596754"/>
+      </p:ext>
+    </p:extLst>
+  </p:cSld>
+  <p:clrMapOvr>
+    <a:masterClrMapping/>
+  </p:clrMapOvr>
+</p:sld>
+</file>
+
+<file path=ppt/slides/slide6.xml><?xml version="1.0" encoding="utf-8"?>
+<p:sld xmlns:a="http://schemas.openxmlformats.org/drawingml/2006/main" xmlns:r="http://schemas.openxmlformats.org/officeDocument/2006/relationships" xmlns:p="http://schemas.openxmlformats.org/presentationml/2006/main">
+  <p:cSld>
+    <p:spTree>
+      <p:nvGrpSpPr>
+        <p:cNvPr id="1" name=""/>
+        <p:cNvGrpSpPr/>
+        <p:nvPr/>
+      </p:nvGrpSpPr>
+      <p:grpSpPr>
+        <a:xfrm>
+          <a:off x="0" y="0"/>
+          <a:ext cx="0" cy="0"/>
+          <a:chOff x="0" y="0"/>
+          <a:chExt cx="0" cy="0"/>
+        </a:xfrm>
+      </p:grpSpPr>
+      <p:pic>
+        <p:nvPicPr>
+          <p:cNvPr id="2" name="Picture 1">
+            <a:extLst>
+              <a:ext uri="{FF2B5EF4-FFF2-40B4-BE49-F238E27FC236}">
+                <a16:creationId xmlns:a16="http://schemas.microsoft.com/office/drawing/2014/main" id="{2FE06A2F-9819-4B69-B0C8-432152D699C4}"/>
+              </a:ext>
+            </a:extLst>
+          </p:cNvPr>
+          <p:cNvPicPr>
+            <a:picLocks noChangeAspect="1"/>
+          </p:cNvPicPr>
+          <p:nvPr/>
+        </p:nvPicPr>
+        <p:blipFill>
+          <a:blip r:embed="rId2"/>
+          <a:stretch>
+            <a:fillRect/>
+          </a:stretch>
+        </p:blipFill>
+        <p:spPr>
+          <a:xfrm>
+            <a:off x="2622115" y="701263"/>
+            <a:ext cx="7295000" cy="2727737"/>
           </a:xfrm>
           <a:prstGeom prst="rect">
             <a:avLst/>
@@ -6402,10 +7304,10 @@
       </p:pic>
       <p:pic>
         <p:nvPicPr>
-          <p:cNvPr id="4" name="Picture 3">
-            <a:extLst>
-              <a:ext uri="{FF2B5EF4-FFF2-40B4-BE49-F238E27FC236}">
-                <a16:creationId xmlns:a16="http://schemas.microsoft.com/office/drawing/2014/main" id="{E0271F77-A91F-44BD-976E-F2CE6EB5231D}"/>
+          <p:cNvPr id="3" name="Picture 2">
+            <a:extLst>
+              <a:ext uri="{FF2B5EF4-FFF2-40B4-BE49-F238E27FC236}">
+                <a16:creationId xmlns:a16="http://schemas.microsoft.com/office/drawing/2014/main" id="{B9D6082E-1BCE-4CE1-9010-ED3BBA8085FC}"/>
               </a:ext>
             </a:extLst>
           </p:cNvPr>
@@ -6422,8 +7324,139 @@
         </p:blipFill>
         <p:spPr>
           <a:xfrm>
-            <a:off x="5781501" y="936306"/>
-            <a:ext cx="4828245" cy="1956799"/>
+            <a:off x="2622115" y="3805851"/>
+            <a:ext cx="7295000" cy="2593912"/>
+          </a:xfrm>
+          <a:prstGeom prst="rect">
+            <a:avLst/>
+          </a:prstGeom>
+        </p:spPr>
+      </p:pic>
+      <p:sp>
+        <p:nvSpPr>
+          <p:cNvPr id="5" name="Rectangle 4">
+            <a:extLst>
+              <a:ext uri="{FF2B5EF4-FFF2-40B4-BE49-F238E27FC236}">
+                <a16:creationId xmlns:a16="http://schemas.microsoft.com/office/drawing/2014/main" id="{0E21CF56-B18D-4674-B953-0F4690DE8A0B}"/>
+              </a:ext>
+            </a:extLst>
+          </p:cNvPr>
+          <p:cNvSpPr/>
+          <p:nvPr/>
+        </p:nvSpPr>
+        <p:spPr>
+          <a:xfrm>
+            <a:off x="4647376" y="88905"/>
+            <a:ext cx="3233257" cy="369332"/>
+          </a:xfrm>
+          <a:prstGeom prst="rect">
+            <a:avLst/>
+          </a:prstGeom>
+        </p:spPr>
+        <p:txBody>
+          <a:bodyPr wrap="none">
+            <a:spAutoFit/>
+          </a:bodyPr>
+          <a:lstStyle/>
+          <a:p>
+            <a:r>
+              <a:rPr lang="en-AU" dirty="0"/>
+              <a:t>WIREFRAMES | Desktop View</a:t>
+            </a:r>
+          </a:p>
+        </p:txBody>
+      </p:sp>
+      <p:cxnSp>
+        <p:nvCxnSpPr>
+          <p:cNvPr id="6" name="Straight Connector 5">
+            <a:extLst>
+              <a:ext uri="{FF2B5EF4-FFF2-40B4-BE49-F238E27FC236}">
+                <a16:creationId xmlns:a16="http://schemas.microsoft.com/office/drawing/2014/main" id="{D303449B-B198-4EE0-913B-BB2424BB8B37}"/>
+              </a:ext>
+            </a:extLst>
+          </p:cNvPr>
+          <p:cNvCxnSpPr/>
+          <p:nvPr/>
+        </p:nvCxnSpPr>
+        <p:spPr>
+          <a:xfrm>
+            <a:off x="2202402" y="458237"/>
+            <a:ext cx="8127218" cy="0"/>
+          </a:xfrm>
+          <a:prstGeom prst="line">
+            <a:avLst/>
+          </a:prstGeom>
+          <a:ln w="76200"/>
+        </p:spPr>
+        <p:style>
+          <a:lnRef idx="1">
+            <a:schemeClr val="accent1"/>
+          </a:lnRef>
+          <a:fillRef idx="0">
+            <a:schemeClr val="accent1"/>
+          </a:fillRef>
+          <a:effectRef idx="0">
+            <a:schemeClr val="accent1"/>
+          </a:effectRef>
+          <a:fontRef idx="minor">
+            <a:schemeClr val="tx1"/>
+          </a:fontRef>
+        </p:style>
+      </p:cxnSp>
+    </p:spTree>
+    <p:extLst>
+      <p:ext uri="{BB962C8B-B14F-4D97-AF65-F5344CB8AC3E}">
+        <p14:creationId xmlns:p14="http://schemas.microsoft.com/office/powerpoint/2010/main" val="1841596121"/>
+      </p:ext>
+    </p:extLst>
+  </p:cSld>
+  <p:clrMapOvr>
+    <a:masterClrMapping/>
+  </p:clrMapOvr>
+</p:sld>
+</file>
+
+<file path=ppt/slides/slide7.xml><?xml version="1.0" encoding="utf-8"?>
+<p:sld xmlns:a="http://schemas.openxmlformats.org/drawingml/2006/main" xmlns:r="http://schemas.openxmlformats.org/officeDocument/2006/relationships" xmlns:p="http://schemas.openxmlformats.org/presentationml/2006/main">
+  <p:cSld>
+    <p:spTree>
+      <p:nvGrpSpPr>
+        <p:cNvPr id="1" name=""/>
+        <p:cNvGrpSpPr/>
+        <p:nvPr/>
+      </p:nvGrpSpPr>
+      <p:grpSpPr>
+        <a:xfrm>
+          <a:off x="0" y="0"/>
+          <a:ext cx="0" cy="0"/>
+          <a:chOff x="0" y="0"/>
+          <a:chExt cx="0" cy="0"/>
+        </a:xfrm>
+      </p:grpSpPr>
+      <p:pic>
+        <p:nvPicPr>
+          <p:cNvPr id="59" name="Picture 58">
+            <a:extLst>
+              <a:ext uri="{FF2B5EF4-FFF2-40B4-BE49-F238E27FC236}">
+                <a16:creationId xmlns:a16="http://schemas.microsoft.com/office/drawing/2014/main" id="{4A9FE90B-5F18-45E2-9A51-5BF34E077F54}"/>
+              </a:ext>
+            </a:extLst>
+          </p:cNvPr>
+          <p:cNvPicPr>
+            <a:picLocks noChangeAspect="1"/>
+          </p:cNvPicPr>
+          <p:nvPr/>
+        </p:nvPicPr>
+        <p:blipFill>
+          <a:blip r:embed="rId2"/>
+          <a:stretch>
+            <a:fillRect/>
+          </a:stretch>
+        </p:blipFill>
+        <p:spPr>
+          <a:xfrm>
+            <a:off x="504657" y="1639012"/>
+            <a:ext cx="2563916" cy="5038190"/>
           </a:xfrm>
           <a:prstGeom prst="rect">
             <a:avLst/>
@@ -6432,10 +7465,40 @@
       </p:pic>
       <p:pic>
         <p:nvPicPr>
-          <p:cNvPr id="5" name="Picture 4">
-            <a:extLst>
-              <a:ext uri="{FF2B5EF4-FFF2-40B4-BE49-F238E27FC236}">
-                <a16:creationId xmlns:a16="http://schemas.microsoft.com/office/drawing/2014/main" id="{988D9A2A-D87F-4B0E-81AE-38F2AAC4CE1D}"/>
+          <p:cNvPr id="3" name="Picture 2">
+            <a:extLst>
+              <a:ext uri="{FF2B5EF4-FFF2-40B4-BE49-F238E27FC236}">
+                <a16:creationId xmlns:a16="http://schemas.microsoft.com/office/drawing/2014/main" id="{64C807C7-016F-42B4-8DD1-F185349ABCC8}"/>
+              </a:ext>
+            </a:extLst>
+          </p:cNvPr>
+          <p:cNvPicPr>
+            <a:picLocks noChangeAspect="1"/>
+          </p:cNvPicPr>
+          <p:nvPr/>
+        </p:nvPicPr>
+        <p:blipFill>
+          <a:blip r:embed="rId3"/>
+          <a:stretch>
+            <a:fillRect/>
+          </a:stretch>
+        </p:blipFill>
+        <p:spPr>
+          <a:xfrm>
+            <a:off x="3415322" y="1639014"/>
+            <a:ext cx="2545348" cy="5052323"/>
+          </a:xfrm>
+          <a:prstGeom prst="rect">
+            <a:avLst/>
+          </a:prstGeom>
+        </p:spPr>
+      </p:pic>
+      <p:pic>
+        <p:nvPicPr>
+          <p:cNvPr id="4" name="Picture 3">
+            <a:extLst>
+              <a:ext uri="{FF2B5EF4-FFF2-40B4-BE49-F238E27FC236}">
+                <a16:creationId xmlns:a16="http://schemas.microsoft.com/office/drawing/2014/main" id="{70565E3B-A28C-4E20-B2DC-599EFB4D8134}"/>
               </a:ext>
             </a:extLst>
           </p:cNvPr>
@@ -6452,14 +7515,2146 @@
         </p:blipFill>
         <p:spPr>
           <a:xfrm>
-            <a:off x="1582254" y="936306"/>
-            <a:ext cx="2749299" cy="2831047"/>
+            <a:off x="6307419" y="1639014"/>
+            <a:ext cx="2532540" cy="5052322"/>
           </a:xfrm>
           <a:prstGeom prst="rect">
             <a:avLst/>
           </a:prstGeom>
         </p:spPr>
       </p:pic>
+      <p:sp>
+        <p:nvSpPr>
+          <p:cNvPr id="8" name="TextBox 7">
+            <a:extLst>
+              <a:ext uri="{FF2B5EF4-FFF2-40B4-BE49-F238E27FC236}">
+                <a16:creationId xmlns:a16="http://schemas.microsoft.com/office/drawing/2014/main" id="{54739FDC-EDB9-4DAE-A9F2-9B0AB3568C85}"/>
+              </a:ext>
+            </a:extLst>
+          </p:cNvPr>
+          <p:cNvSpPr txBox="1"/>
+          <p:nvPr/>
+        </p:nvSpPr>
+        <p:spPr>
+          <a:xfrm>
+            <a:off x="1964872" y="151660"/>
+            <a:ext cx="7715834" cy="954107"/>
+          </a:xfrm>
+          <a:prstGeom prst="rect">
+            <a:avLst/>
+          </a:prstGeom>
+          <a:noFill/>
+        </p:spPr>
+        <p:txBody>
+          <a:bodyPr wrap="square" rtlCol="0">
+            <a:spAutoFit/>
+          </a:bodyPr>
+          <a:lstStyle/>
+          <a:p>
+            <a:pPr algn="ctr"/>
+            <a:r>
+              <a:rPr lang="en-AU" sz="2800" dirty="0"/>
+              <a:t>WEBSITE | Mobile View</a:t>
+            </a:r>
+          </a:p>
+          <a:p>
+            <a:pPr algn="ctr"/>
+            <a:endParaRPr lang="en-AU" sz="2800" dirty="0"/>
+          </a:p>
+        </p:txBody>
+      </p:sp>
+      <p:cxnSp>
+        <p:nvCxnSpPr>
+          <p:cNvPr id="6" name="Straight Connector 5">
+            <a:extLst>
+              <a:ext uri="{FF2B5EF4-FFF2-40B4-BE49-F238E27FC236}">
+                <a16:creationId xmlns:a16="http://schemas.microsoft.com/office/drawing/2014/main" id="{D3E171DA-9FB9-4E0F-B794-3D998AAE4A2E}"/>
+              </a:ext>
+            </a:extLst>
+          </p:cNvPr>
+          <p:cNvCxnSpPr/>
+          <p:nvPr/>
+        </p:nvCxnSpPr>
+        <p:spPr>
+          <a:xfrm>
+            <a:off x="2177235" y="689885"/>
+            <a:ext cx="8127218" cy="0"/>
+          </a:xfrm>
+          <a:prstGeom prst="line">
+            <a:avLst/>
+          </a:prstGeom>
+          <a:ln w="76200"/>
+        </p:spPr>
+        <p:style>
+          <a:lnRef idx="1">
+            <a:schemeClr val="accent1"/>
+          </a:lnRef>
+          <a:fillRef idx="0">
+            <a:schemeClr val="accent1"/>
+          </a:fillRef>
+          <a:effectRef idx="0">
+            <a:schemeClr val="accent1"/>
+          </a:effectRef>
+          <a:fontRef idx="minor">
+            <a:schemeClr val="tx1"/>
+          </a:fontRef>
+        </p:style>
+      </p:cxnSp>
+      <p:pic>
+        <p:nvPicPr>
+          <p:cNvPr id="10" name="Picture 9">
+            <a:extLst>
+              <a:ext uri="{FF2B5EF4-FFF2-40B4-BE49-F238E27FC236}">
+                <a16:creationId xmlns:a16="http://schemas.microsoft.com/office/drawing/2014/main" id="{1B837AA6-F601-4DF0-B904-2CDE28155CF6}"/>
+              </a:ext>
+            </a:extLst>
+          </p:cNvPr>
+          <p:cNvPicPr>
+            <a:picLocks noChangeAspect="1"/>
+          </p:cNvPicPr>
+          <p:nvPr/>
+        </p:nvPicPr>
+        <p:blipFill>
+          <a:blip r:embed="rId5"/>
+          <a:stretch>
+            <a:fillRect/>
+          </a:stretch>
+        </p:blipFill>
+        <p:spPr>
+          <a:xfrm>
+            <a:off x="9186708" y="1639012"/>
+            <a:ext cx="2545348" cy="5052323"/>
+          </a:xfrm>
+          <a:prstGeom prst="rect">
+            <a:avLst/>
+          </a:prstGeom>
+        </p:spPr>
+      </p:pic>
+      <p:cxnSp>
+        <p:nvCxnSpPr>
+          <p:cNvPr id="18" name="Straight Arrow Connector 17">
+            <a:extLst>
+              <a:ext uri="{FF2B5EF4-FFF2-40B4-BE49-F238E27FC236}">
+                <a16:creationId xmlns:a16="http://schemas.microsoft.com/office/drawing/2014/main" id="{822E6AC5-DE1A-479E-9491-C0726DB32E01}"/>
+              </a:ext>
+            </a:extLst>
+          </p:cNvPr>
+          <p:cNvCxnSpPr>
+            <a:cxnSpLocks/>
+            <a:stCxn id="51" idx="2"/>
+          </p:cNvCxnSpPr>
+          <p:nvPr/>
+        </p:nvCxnSpPr>
+        <p:spPr>
+          <a:xfrm>
+            <a:off x="1051059" y="1451128"/>
+            <a:ext cx="462207" cy="260234"/>
+          </a:xfrm>
+          <a:prstGeom prst="straightConnector1">
+            <a:avLst/>
+          </a:prstGeom>
+          <a:ln w="38100">
+            <a:tailEnd type="triangle"/>
+          </a:ln>
+        </p:spPr>
+        <p:style>
+          <a:lnRef idx="1">
+            <a:schemeClr val="accent1"/>
+          </a:lnRef>
+          <a:fillRef idx="0">
+            <a:schemeClr val="accent1"/>
+          </a:fillRef>
+          <a:effectRef idx="0">
+            <a:schemeClr val="accent1"/>
+          </a:effectRef>
+          <a:fontRef idx="minor">
+            <a:schemeClr val="tx1"/>
+          </a:fontRef>
+        </p:style>
+      </p:cxnSp>
+      <p:cxnSp>
+        <p:nvCxnSpPr>
+          <p:cNvPr id="20" name="Straight Arrow Connector 19">
+            <a:extLst>
+              <a:ext uri="{FF2B5EF4-FFF2-40B4-BE49-F238E27FC236}">
+                <a16:creationId xmlns:a16="http://schemas.microsoft.com/office/drawing/2014/main" id="{89E0AB48-70EC-4099-9ACD-968DBC684723}"/>
+              </a:ext>
+            </a:extLst>
+          </p:cNvPr>
+          <p:cNvCxnSpPr>
+            <a:cxnSpLocks/>
+            <a:stCxn id="51" idx="2"/>
+          </p:cNvCxnSpPr>
+          <p:nvPr/>
+        </p:nvCxnSpPr>
+        <p:spPr>
+          <a:xfrm flipH="1">
+            <a:off x="792611" y="1451128"/>
+            <a:ext cx="258448" cy="891511"/>
+          </a:xfrm>
+          <a:prstGeom prst="straightConnector1">
+            <a:avLst/>
+          </a:prstGeom>
+          <a:ln w="38100">
+            <a:tailEnd type="triangle"/>
+          </a:ln>
+        </p:spPr>
+        <p:style>
+          <a:lnRef idx="1">
+            <a:schemeClr val="accent1"/>
+          </a:lnRef>
+          <a:fillRef idx="0">
+            <a:schemeClr val="accent1"/>
+          </a:fillRef>
+          <a:effectRef idx="0">
+            <a:schemeClr val="accent1"/>
+          </a:effectRef>
+          <a:fontRef idx="minor">
+            <a:schemeClr val="tx1"/>
+          </a:fontRef>
+        </p:style>
+      </p:cxnSp>
+      <p:cxnSp>
+        <p:nvCxnSpPr>
+          <p:cNvPr id="22" name="Straight Arrow Connector 21">
+            <a:extLst>
+              <a:ext uri="{FF2B5EF4-FFF2-40B4-BE49-F238E27FC236}">
+                <a16:creationId xmlns:a16="http://schemas.microsoft.com/office/drawing/2014/main" id="{47EB0A2F-61A9-420A-95B0-923AB075D967}"/>
+              </a:ext>
+            </a:extLst>
+          </p:cNvPr>
+          <p:cNvCxnSpPr>
+            <a:cxnSpLocks/>
+          </p:cNvCxnSpPr>
+          <p:nvPr/>
+        </p:nvCxnSpPr>
+        <p:spPr>
+          <a:xfrm>
+            <a:off x="3356527" y="1291635"/>
+            <a:ext cx="228518" cy="2265198"/>
+          </a:xfrm>
+          <a:prstGeom prst="straightConnector1">
+            <a:avLst/>
+          </a:prstGeom>
+          <a:ln w="38100">
+            <a:tailEnd type="triangle"/>
+          </a:ln>
+        </p:spPr>
+        <p:style>
+          <a:lnRef idx="1">
+            <a:schemeClr val="accent1"/>
+          </a:lnRef>
+          <a:fillRef idx="0">
+            <a:schemeClr val="accent1"/>
+          </a:fillRef>
+          <a:effectRef idx="0">
+            <a:schemeClr val="accent1"/>
+          </a:effectRef>
+          <a:fontRef idx="minor">
+            <a:schemeClr val="tx1"/>
+          </a:fontRef>
+        </p:style>
+      </p:cxnSp>
+      <p:cxnSp>
+        <p:nvCxnSpPr>
+          <p:cNvPr id="25" name="Straight Arrow Connector 24">
+            <a:extLst>
+              <a:ext uri="{FF2B5EF4-FFF2-40B4-BE49-F238E27FC236}">
+                <a16:creationId xmlns:a16="http://schemas.microsoft.com/office/drawing/2014/main" id="{7F76D470-4C38-454F-ACB2-91BB7A268E4B}"/>
+              </a:ext>
+            </a:extLst>
+          </p:cNvPr>
+          <p:cNvCxnSpPr>
+            <a:cxnSpLocks/>
+            <a:stCxn id="39" idx="2"/>
+          </p:cNvCxnSpPr>
+          <p:nvPr/>
+        </p:nvCxnSpPr>
+        <p:spPr>
+          <a:xfrm flipH="1">
+            <a:off x="5459555" y="1475755"/>
+            <a:ext cx="451626" cy="1960818"/>
+          </a:xfrm>
+          <a:prstGeom prst="straightConnector1">
+            <a:avLst/>
+          </a:prstGeom>
+          <a:ln w="38100">
+            <a:tailEnd type="triangle"/>
+          </a:ln>
+        </p:spPr>
+        <p:style>
+          <a:lnRef idx="1">
+            <a:schemeClr val="accent1"/>
+          </a:lnRef>
+          <a:fillRef idx="0">
+            <a:schemeClr val="accent1"/>
+          </a:fillRef>
+          <a:effectRef idx="0">
+            <a:schemeClr val="accent1"/>
+          </a:effectRef>
+          <a:fontRef idx="minor">
+            <a:schemeClr val="tx1"/>
+          </a:fontRef>
+        </p:style>
+      </p:cxnSp>
+      <p:cxnSp>
+        <p:nvCxnSpPr>
+          <p:cNvPr id="28" name="Straight Arrow Connector 27">
+            <a:extLst>
+              <a:ext uri="{FF2B5EF4-FFF2-40B4-BE49-F238E27FC236}">
+                <a16:creationId xmlns:a16="http://schemas.microsoft.com/office/drawing/2014/main" id="{4E93A949-34A8-456D-8148-D8ACDDC660AA}"/>
+              </a:ext>
+            </a:extLst>
+          </p:cNvPr>
+          <p:cNvCxnSpPr>
+            <a:cxnSpLocks/>
+            <a:stCxn id="39" idx="2"/>
+          </p:cNvCxnSpPr>
+          <p:nvPr/>
+        </p:nvCxnSpPr>
+        <p:spPr>
+          <a:xfrm>
+            <a:off x="5911181" y="1475755"/>
+            <a:ext cx="594902" cy="1695284"/>
+          </a:xfrm>
+          <a:prstGeom prst="straightConnector1">
+            <a:avLst/>
+          </a:prstGeom>
+          <a:ln w="38100">
+            <a:tailEnd type="triangle"/>
+          </a:ln>
+        </p:spPr>
+        <p:style>
+          <a:lnRef idx="1">
+            <a:schemeClr val="accent1"/>
+          </a:lnRef>
+          <a:fillRef idx="0">
+            <a:schemeClr val="accent1"/>
+          </a:fillRef>
+          <a:effectRef idx="0">
+            <a:schemeClr val="accent1"/>
+          </a:effectRef>
+          <a:fontRef idx="minor">
+            <a:schemeClr val="tx1"/>
+          </a:fontRef>
+        </p:style>
+      </p:cxnSp>
+      <p:cxnSp>
+        <p:nvCxnSpPr>
+          <p:cNvPr id="32" name="Straight Arrow Connector 31">
+            <a:extLst>
+              <a:ext uri="{FF2B5EF4-FFF2-40B4-BE49-F238E27FC236}">
+                <a16:creationId xmlns:a16="http://schemas.microsoft.com/office/drawing/2014/main" id="{ADF702E1-8AC1-48BB-9582-F471EE300194}"/>
+              </a:ext>
+            </a:extLst>
+          </p:cNvPr>
+          <p:cNvCxnSpPr>
+            <a:cxnSpLocks/>
+            <a:stCxn id="34" idx="2"/>
+          </p:cNvCxnSpPr>
+          <p:nvPr/>
+        </p:nvCxnSpPr>
+        <p:spPr>
+          <a:xfrm>
+            <a:off x="8257884" y="1475755"/>
+            <a:ext cx="1015513" cy="4148950"/>
+          </a:xfrm>
+          <a:prstGeom prst="straightConnector1">
+            <a:avLst/>
+          </a:prstGeom>
+          <a:ln w="38100">
+            <a:tailEnd type="triangle"/>
+          </a:ln>
+        </p:spPr>
+        <p:style>
+          <a:lnRef idx="1">
+            <a:schemeClr val="accent1"/>
+          </a:lnRef>
+          <a:fillRef idx="0">
+            <a:schemeClr val="accent1"/>
+          </a:fillRef>
+          <a:effectRef idx="0">
+            <a:schemeClr val="accent1"/>
+          </a:effectRef>
+          <a:fontRef idx="minor">
+            <a:schemeClr val="tx1"/>
+          </a:fontRef>
+        </p:style>
+      </p:cxnSp>
+      <p:sp>
+        <p:nvSpPr>
+          <p:cNvPr id="34" name="TextBox 33">
+            <a:extLst>
+              <a:ext uri="{FF2B5EF4-FFF2-40B4-BE49-F238E27FC236}">
+                <a16:creationId xmlns:a16="http://schemas.microsoft.com/office/drawing/2014/main" id="{AE79AD4D-9062-447C-A0D2-645934C096B0}"/>
+              </a:ext>
+            </a:extLst>
+          </p:cNvPr>
+          <p:cNvSpPr txBox="1"/>
+          <p:nvPr/>
+        </p:nvSpPr>
+        <p:spPr>
+          <a:xfrm>
+            <a:off x="7097308" y="829424"/>
+            <a:ext cx="2321152" cy="646331"/>
+          </a:xfrm>
+          <a:prstGeom prst="rect">
+            <a:avLst/>
+          </a:prstGeom>
+          <a:noFill/>
+        </p:spPr>
+        <p:txBody>
+          <a:bodyPr wrap="square" rtlCol="0">
+            <a:spAutoFit/>
+          </a:bodyPr>
+          <a:lstStyle/>
+          <a:p>
+            <a:pPr algn="ctr"/>
+            <a:r>
+              <a:rPr lang="en-AU" sz="1200" dirty="0"/>
+              <a:t>Links to access social media to</a:t>
+            </a:r>
+          </a:p>
+          <a:p>
+            <a:pPr algn="ctr"/>
+            <a:r>
+              <a:rPr lang="en-AU" sz="1200" dirty="0"/>
+              <a:t> increase connectivity with the audience</a:t>
+            </a:r>
+          </a:p>
+        </p:txBody>
+      </p:sp>
+      <p:cxnSp>
+        <p:nvCxnSpPr>
+          <p:cNvPr id="35" name="Straight Arrow Connector 34">
+            <a:extLst>
+              <a:ext uri="{FF2B5EF4-FFF2-40B4-BE49-F238E27FC236}">
+                <a16:creationId xmlns:a16="http://schemas.microsoft.com/office/drawing/2014/main" id="{235FD186-028C-4959-99ED-2B67B28C93CA}"/>
+              </a:ext>
+            </a:extLst>
+          </p:cNvPr>
+          <p:cNvCxnSpPr>
+            <a:cxnSpLocks/>
+            <a:stCxn id="38" idx="2"/>
+          </p:cNvCxnSpPr>
+          <p:nvPr/>
+        </p:nvCxnSpPr>
+        <p:spPr>
+          <a:xfrm>
+            <a:off x="10712813" y="1476301"/>
+            <a:ext cx="236064" cy="2270082"/>
+          </a:xfrm>
+          <a:prstGeom prst="straightConnector1">
+            <a:avLst/>
+          </a:prstGeom>
+          <a:ln w="38100">
+            <a:tailEnd type="triangle"/>
+          </a:ln>
+        </p:spPr>
+        <p:style>
+          <a:lnRef idx="1">
+            <a:schemeClr val="accent1"/>
+          </a:lnRef>
+          <a:fillRef idx="0">
+            <a:schemeClr val="accent1"/>
+          </a:fillRef>
+          <a:effectRef idx="0">
+            <a:schemeClr val="accent1"/>
+          </a:effectRef>
+          <a:fontRef idx="minor">
+            <a:schemeClr val="tx1"/>
+          </a:fontRef>
+        </p:style>
+      </p:cxnSp>
+      <p:sp>
+        <p:nvSpPr>
+          <p:cNvPr id="38" name="TextBox 37">
+            <a:extLst>
+              <a:ext uri="{FF2B5EF4-FFF2-40B4-BE49-F238E27FC236}">
+                <a16:creationId xmlns:a16="http://schemas.microsoft.com/office/drawing/2014/main" id="{FD42CFDE-F79C-451B-BB9D-B2A17BAB3AE1}"/>
+              </a:ext>
+            </a:extLst>
+          </p:cNvPr>
+          <p:cNvSpPr txBox="1"/>
+          <p:nvPr/>
+        </p:nvSpPr>
+        <p:spPr>
+          <a:xfrm>
+            <a:off x="9360719" y="829970"/>
+            <a:ext cx="2704188" cy="646331"/>
+          </a:xfrm>
+          <a:prstGeom prst="rect">
+            <a:avLst/>
+          </a:prstGeom>
+          <a:noFill/>
+        </p:spPr>
+        <p:txBody>
+          <a:bodyPr wrap="square" rtlCol="0">
+            <a:spAutoFit/>
+          </a:bodyPr>
+          <a:lstStyle/>
+          <a:p>
+            <a:pPr algn="ctr"/>
+            <a:r>
+              <a:rPr lang="en-AU" sz="1200" dirty="0"/>
+              <a:t>Form to send a private message as another way for the audience to connect with me</a:t>
+            </a:r>
+          </a:p>
+        </p:txBody>
+      </p:sp>
+      <p:sp>
+        <p:nvSpPr>
+          <p:cNvPr id="39" name="TextBox 38">
+            <a:extLst>
+              <a:ext uri="{FF2B5EF4-FFF2-40B4-BE49-F238E27FC236}">
+                <a16:creationId xmlns:a16="http://schemas.microsoft.com/office/drawing/2014/main" id="{27D67E7D-AD3A-4707-8729-A49A1CCBAA63}"/>
+              </a:ext>
+            </a:extLst>
+          </p:cNvPr>
+          <p:cNvSpPr txBox="1"/>
+          <p:nvPr/>
+        </p:nvSpPr>
+        <p:spPr>
+          <a:xfrm>
+            <a:off x="4651349" y="829424"/>
+            <a:ext cx="2519664" cy="646331"/>
+          </a:xfrm>
+          <a:prstGeom prst="rect">
+            <a:avLst/>
+          </a:prstGeom>
+          <a:noFill/>
+        </p:spPr>
+        <p:txBody>
+          <a:bodyPr wrap="square" rtlCol="0">
+            <a:spAutoFit/>
+          </a:bodyPr>
+          <a:lstStyle/>
+          <a:p>
+            <a:pPr algn="ctr"/>
+            <a:r>
+              <a:rPr lang="en-AU" sz="1200" dirty="0"/>
+              <a:t>Background colour and borders </a:t>
+            </a:r>
+          </a:p>
+          <a:p>
+            <a:pPr algn="ctr"/>
+            <a:r>
+              <a:rPr lang="en-AU" sz="1200" dirty="0"/>
+              <a:t>to help the audience differentiate content</a:t>
+            </a:r>
+          </a:p>
+        </p:txBody>
+      </p:sp>
+      <p:sp>
+        <p:nvSpPr>
+          <p:cNvPr id="42" name="TextBox 41">
+            <a:extLst>
+              <a:ext uri="{FF2B5EF4-FFF2-40B4-BE49-F238E27FC236}">
+                <a16:creationId xmlns:a16="http://schemas.microsoft.com/office/drawing/2014/main" id="{7098448C-4BF0-4EC9-A8D5-3900E379FFA0}"/>
+              </a:ext>
+            </a:extLst>
+          </p:cNvPr>
+          <p:cNvSpPr txBox="1"/>
+          <p:nvPr/>
+        </p:nvSpPr>
+        <p:spPr>
+          <a:xfrm>
+            <a:off x="1966953" y="829970"/>
+            <a:ext cx="2797176" cy="461665"/>
+          </a:xfrm>
+          <a:prstGeom prst="rect">
+            <a:avLst/>
+          </a:prstGeom>
+          <a:noFill/>
+        </p:spPr>
+        <p:txBody>
+          <a:bodyPr wrap="none" rtlCol="0">
+            <a:spAutoFit/>
+          </a:bodyPr>
+          <a:lstStyle/>
+          <a:p>
+            <a:pPr algn="ctr"/>
+            <a:r>
+              <a:rPr lang="en-AU" sz="1200" dirty="0"/>
+              <a:t>Text aligned to left and gaps to break </a:t>
+            </a:r>
+          </a:p>
+          <a:p>
+            <a:pPr algn="ctr"/>
+            <a:r>
+              <a:rPr lang="en-AU" sz="1200" dirty="0"/>
+              <a:t>up paragraphs for easy reading </a:t>
+            </a:r>
+          </a:p>
+        </p:txBody>
+      </p:sp>
+      <p:cxnSp>
+        <p:nvCxnSpPr>
+          <p:cNvPr id="43" name="Straight Arrow Connector 42">
+            <a:extLst>
+              <a:ext uri="{FF2B5EF4-FFF2-40B4-BE49-F238E27FC236}">
+                <a16:creationId xmlns:a16="http://schemas.microsoft.com/office/drawing/2014/main" id="{4E223432-9062-4B2A-B373-F0F5CD45997C}"/>
+              </a:ext>
+            </a:extLst>
+          </p:cNvPr>
+          <p:cNvCxnSpPr>
+            <a:cxnSpLocks/>
+            <a:stCxn id="42" idx="2"/>
+          </p:cNvCxnSpPr>
+          <p:nvPr/>
+        </p:nvCxnSpPr>
+        <p:spPr>
+          <a:xfrm>
+            <a:off x="3365541" y="1291635"/>
+            <a:ext cx="1312077" cy="4234612"/>
+          </a:xfrm>
+          <a:prstGeom prst="straightConnector1">
+            <a:avLst/>
+          </a:prstGeom>
+          <a:ln w="38100">
+            <a:tailEnd type="triangle"/>
+          </a:ln>
+        </p:spPr>
+        <p:style>
+          <a:lnRef idx="1">
+            <a:schemeClr val="accent1"/>
+          </a:lnRef>
+          <a:fillRef idx="0">
+            <a:schemeClr val="accent1"/>
+          </a:fillRef>
+          <a:effectRef idx="0">
+            <a:schemeClr val="accent1"/>
+          </a:effectRef>
+          <a:fontRef idx="minor">
+            <a:schemeClr val="tx1"/>
+          </a:fontRef>
+        </p:style>
+      </p:cxnSp>
+      <p:sp>
+        <p:nvSpPr>
+          <p:cNvPr id="51" name="TextBox 50">
+            <a:extLst>
+              <a:ext uri="{FF2B5EF4-FFF2-40B4-BE49-F238E27FC236}">
+                <a16:creationId xmlns:a16="http://schemas.microsoft.com/office/drawing/2014/main" id="{BAAE460E-D0F4-4480-9E3E-18E1ADCB6FAB}"/>
+              </a:ext>
+            </a:extLst>
+          </p:cNvPr>
+          <p:cNvSpPr txBox="1"/>
+          <p:nvPr/>
+        </p:nvSpPr>
+        <p:spPr>
+          <a:xfrm>
+            <a:off x="96216" y="804797"/>
+            <a:ext cx="1909686" cy="646331"/>
+          </a:xfrm>
+          <a:prstGeom prst="rect">
+            <a:avLst/>
+          </a:prstGeom>
+          <a:noFill/>
+        </p:spPr>
+        <p:txBody>
+          <a:bodyPr wrap="square" rtlCol="0">
+            <a:spAutoFit/>
+          </a:bodyPr>
+          <a:lstStyle/>
+          <a:p>
+            <a:pPr algn="ctr"/>
+            <a:r>
+              <a:rPr lang="en-AU" sz="1200" dirty="0"/>
+              <a:t>Title and Image for the audience to identify my page over others</a:t>
+            </a:r>
+          </a:p>
+        </p:txBody>
+      </p:sp>
+    </p:spTree>
+    <p:extLst>
+      <p:ext uri="{BB962C8B-B14F-4D97-AF65-F5344CB8AC3E}">
+        <p14:creationId xmlns:p14="http://schemas.microsoft.com/office/powerpoint/2010/main" val="1930449683"/>
+      </p:ext>
+    </p:extLst>
+  </p:cSld>
+  <p:clrMapOvr>
+    <a:masterClrMapping/>
+  </p:clrMapOvr>
+</p:sld>
+</file>
+
+<file path=ppt/slides/slide8.xml><?xml version="1.0" encoding="utf-8"?>
+<p:sld xmlns:a="http://schemas.openxmlformats.org/drawingml/2006/main" xmlns:r="http://schemas.openxmlformats.org/officeDocument/2006/relationships" xmlns:p="http://schemas.openxmlformats.org/presentationml/2006/main">
+  <p:cSld>
+    <p:spTree>
+      <p:nvGrpSpPr>
+        <p:cNvPr id="1" name=""/>
+        <p:cNvGrpSpPr/>
+        <p:nvPr/>
+      </p:nvGrpSpPr>
+      <p:grpSpPr>
+        <a:xfrm>
+          <a:off x="0" y="0"/>
+          <a:ext cx="0" cy="0"/>
+          <a:chOff x="0" y="0"/>
+          <a:chExt cx="0" cy="0"/>
+        </a:xfrm>
+      </p:grpSpPr>
+      <p:pic>
+        <p:nvPicPr>
+          <p:cNvPr id="8" name="Picture 7">
+            <a:extLst>
+              <a:ext uri="{FF2B5EF4-FFF2-40B4-BE49-F238E27FC236}">
+                <a16:creationId xmlns:a16="http://schemas.microsoft.com/office/drawing/2014/main" id="{A2809D01-9B4A-4F55-A1A0-56628FFFCCC7}"/>
+              </a:ext>
+            </a:extLst>
+          </p:cNvPr>
+          <p:cNvPicPr>
+            <a:picLocks noChangeAspect="1"/>
+          </p:cNvPicPr>
+          <p:nvPr/>
+        </p:nvPicPr>
+        <p:blipFill>
+          <a:blip r:embed="rId2"/>
+          <a:stretch>
+            <a:fillRect/>
+          </a:stretch>
+        </p:blipFill>
+        <p:spPr>
+          <a:xfrm>
+            <a:off x="2119871" y="668678"/>
+            <a:ext cx="3946263" cy="2854476"/>
+          </a:xfrm>
+          <a:prstGeom prst="rect">
+            <a:avLst/>
+          </a:prstGeom>
+        </p:spPr>
+      </p:pic>
+      <p:sp>
+        <p:nvSpPr>
+          <p:cNvPr id="2" name="Rectangle 1">
+            <a:extLst>
+              <a:ext uri="{FF2B5EF4-FFF2-40B4-BE49-F238E27FC236}">
+                <a16:creationId xmlns:a16="http://schemas.microsoft.com/office/drawing/2014/main" id="{024115E3-FC26-4983-A935-06F6329EF481}"/>
+              </a:ext>
+            </a:extLst>
+          </p:cNvPr>
+          <p:cNvSpPr/>
+          <p:nvPr/>
+        </p:nvSpPr>
+        <p:spPr>
+          <a:xfrm>
+            <a:off x="933450" y="16471"/>
+            <a:ext cx="10325099" cy="954107"/>
+          </a:xfrm>
+          <a:prstGeom prst="rect">
+            <a:avLst/>
+          </a:prstGeom>
+        </p:spPr>
+        <p:txBody>
+          <a:bodyPr wrap="square">
+            <a:spAutoFit/>
+          </a:bodyPr>
+          <a:lstStyle/>
+          <a:p>
+            <a:pPr algn="ctr"/>
+            <a:r>
+              <a:rPr lang="en-AU" sz="2800" dirty="0"/>
+              <a:t>WEBSITE | Tablet View</a:t>
+            </a:r>
+          </a:p>
+          <a:p>
+            <a:pPr algn="ctr"/>
+            <a:endParaRPr lang="en-AU" sz="2800" dirty="0"/>
+          </a:p>
+        </p:txBody>
+      </p:sp>
+      <p:cxnSp>
+        <p:nvCxnSpPr>
+          <p:cNvPr id="7" name="Straight Connector 6">
+            <a:extLst>
+              <a:ext uri="{FF2B5EF4-FFF2-40B4-BE49-F238E27FC236}">
+                <a16:creationId xmlns:a16="http://schemas.microsoft.com/office/drawing/2014/main" id="{E59DE2D8-B64E-4567-93EC-C08195D19BD6}"/>
+              </a:ext>
+            </a:extLst>
+          </p:cNvPr>
+          <p:cNvCxnSpPr/>
+          <p:nvPr/>
+        </p:nvCxnSpPr>
+        <p:spPr>
+          <a:xfrm>
+            <a:off x="2210791" y="539691"/>
+            <a:ext cx="8127218" cy="0"/>
+          </a:xfrm>
+          <a:prstGeom prst="line">
+            <a:avLst/>
+          </a:prstGeom>
+          <a:ln w="76200"/>
+        </p:spPr>
+        <p:style>
+          <a:lnRef idx="1">
+            <a:schemeClr val="accent1"/>
+          </a:lnRef>
+          <a:fillRef idx="0">
+            <a:schemeClr val="accent1"/>
+          </a:fillRef>
+          <a:effectRef idx="0">
+            <a:schemeClr val="accent1"/>
+          </a:effectRef>
+          <a:fontRef idx="minor">
+            <a:schemeClr val="tx1"/>
+          </a:fontRef>
+        </p:style>
+      </p:cxnSp>
+      <p:cxnSp>
+        <p:nvCxnSpPr>
+          <p:cNvPr id="9" name="Straight Arrow Connector 8">
+            <a:extLst>
+              <a:ext uri="{FF2B5EF4-FFF2-40B4-BE49-F238E27FC236}">
+                <a16:creationId xmlns:a16="http://schemas.microsoft.com/office/drawing/2014/main" id="{DFB80FA3-1849-4796-BB6F-246AB8AD9024}"/>
+              </a:ext>
+            </a:extLst>
+          </p:cNvPr>
+          <p:cNvCxnSpPr>
+            <a:cxnSpLocks/>
+            <a:stCxn id="11" idx="3"/>
+          </p:cNvCxnSpPr>
+          <p:nvPr/>
+        </p:nvCxnSpPr>
+        <p:spPr>
+          <a:xfrm flipV="1">
+            <a:off x="1739317" y="3363997"/>
+            <a:ext cx="1247164" cy="92328"/>
+          </a:xfrm>
+          <a:prstGeom prst="straightConnector1">
+            <a:avLst/>
+          </a:prstGeom>
+          <a:ln w="38100">
+            <a:tailEnd type="triangle"/>
+          </a:ln>
+        </p:spPr>
+        <p:style>
+          <a:lnRef idx="1">
+            <a:schemeClr val="accent1"/>
+          </a:lnRef>
+          <a:fillRef idx="0">
+            <a:schemeClr val="accent1"/>
+          </a:fillRef>
+          <a:effectRef idx="0">
+            <a:schemeClr val="accent1"/>
+          </a:effectRef>
+          <a:fontRef idx="minor">
+            <a:schemeClr val="tx1"/>
+          </a:fontRef>
+        </p:style>
+      </p:cxnSp>
+      <p:sp>
+        <p:nvSpPr>
+          <p:cNvPr id="11" name="TextBox 10">
+            <a:extLst>
+              <a:ext uri="{FF2B5EF4-FFF2-40B4-BE49-F238E27FC236}">
+                <a16:creationId xmlns:a16="http://schemas.microsoft.com/office/drawing/2014/main" id="{18458722-1F46-495A-B538-3FDBF7BB6FB1}"/>
+              </a:ext>
+            </a:extLst>
+          </p:cNvPr>
+          <p:cNvSpPr txBox="1"/>
+          <p:nvPr/>
+        </p:nvSpPr>
+        <p:spPr>
+          <a:xfrm>
+            <a:off x="216514" y="3133159"/>
+            <a:ext cx="1522803" cy="646331"/>
+          </a:xfrm>
+          <a:prstGeom prst="rect">
+            <a:avLst/>
+          </a:prstGeom>
+          <a:noFill/>
+        </p:spPr>
+        <p:txBody>
+          <a:bodyPr wrap="square" rtlCol="0">
+            <a:spAutoFit/>
+          </a:bodyPr>
+          <a:lstStyle/>
+          <a:p>
+            <a:pPr algn="ctr"/>
+            <a:r>
+              <a:rPr lang="en-AU" sz="1200" dirty="0"/>
+              <a:t>Footer with </a:t>
+            </a:r>
+          </a:p>
+          <a:p>
+            <a:pPr algn="ctr"/>
+            <a:r>
+              <a:rPr lang="en-AU" sz="1200" dirty="0"/>
+              <a:t>Copyright info to protect my content</a:t>
+            </a:r>
+          </a:p>
+        </p:txBody>
+      </p:sp>
+      <p:pic>
+        <p:nvPicPr>
+          <p:cNvPr id="12" name="Picture 11">
+            <a:extLst>
+              <a:ext uri="{FF2B5EF4-FFF2-40B4-BE49-F238E27FC236}">
+                <a16:creationId xmlns:a16="http://schemas.microsoft.com/office/drawing/2014/main" id="{79189C0A-829B-4B8D-B5D5-8A8D513E75DF}"/>
+              </a:ext>
+            </a:extLst>
+          </p:cNvPr>
+          <p:cNvPicPr>
+            <a:picLocks noChangeAspect="1"/>
+          </p:cNvPicPr>
+          <p:nvPr/>
+        </p:nvPicPr>
+        <p:blipFill>
+          <a:blip r:embed="rId3"/>
+          <a:stretch>
+            <a:fillRect/>
+          </a:stretch>
+        </p:blipFill>
+        <p:spPr>
+          <a:xfrm>
+            <a:off x="6254242" y="659530"/>
+            <a:ext cx="3946263" cy="2863624"/>
+          </a:xfrm>
+          <a:prstGeom prst="rect">
+            <a:avLst/>
+          </a:prstGeom>
+        </p:spPr>
+      </p:pic>
+      <p:cxnSp>
+        <p:nvCxnSpPr>
+          <p:cNvPr id="14" name="Straight Arrow Connector 13">
+            <a:extLst>
+              <a:ext uri="{FF2B5EF4-FFF2-40B4-BE49-F238E27FC236}">
+                <a16:creationId xmlns:a16="http://schemas.microsoft.com/office/drawing/2014/main" id="{C1EC8F7B-C49B-4DC9-B5AF-56485D27A757}"/>
+              </a:ext>
+            </a:extLst>
+          </p:cNvPr>
+          <p:cNvCxnSpPr>
+            <a:cxnSpLocks/>
+            <a:stCxn id="17" idx="1"/>
+          </p:cNvCxnSpPr>
+          <p:nvPr/>
+        </p:nvCxnSpPr>
+        <p:spPr>
+          <a:xfrm flipH="1">
+            <a:off x="8919619" y="3119485"/>
+            <a:ext cx="1533064" cy="309515"/>
+          </a:xfrm>
+          <a:prstGeom prst="straightConnector1">
+            <a:avLst/>
+          </a:prstGeom>
+          <a:ln w="38100">
+            <a:tailEnd type="triangle"/>
+          </a:ln>
+        </p:spPr>
+        <p:style>
+          <a:lnRef idx="1">
+            <a:schemeClr val="accent1"/>
+          </a:lnRef>
+          <a:fillRef idx="0">
+            <a:schemeClr val="accent1"/>
+          </a:fillRef>
+          <a:effectRef idx="0">
+            <a:schemeClr val="accent1"/>
+          </a:effectRef>
+          <a:fontRef idx="minor">
+            <a:schemeClr val="tx1"/>
+          </a:fontRef>
+        </p:style>
+      </p:cxnSp>
+      <p:sp>
+        <p:nvSpPr>
+          <p:cNvPr id="17" name="TextBox 16">
+            <a:extLst>
+              <a:ext uri="{FF2B5EF4-FFF2-40B4-BE49-F238E27FC236}">
+                <a16:creationId xmlns:a16="http://schemas.microsoft.com/office/drawing/2014/main" id="{85593D55-8B19-4EF5-9FD2-82378C2B23F8}"/>
+              </a:ext>
+            </a:extLst>
+          </p:cNvPr>
+          <p:cNvSpPr txBox="1"/>
+          <p:nvPr/>
+        </p:nvSpPr>
+        <p:spPr>
+          <a:xfrm>
+            <a:off x="10452683" y="2796319"/>
+            <a:ext cx="1522803" cy="646331"/>
+          </a:xfrm>
+          <a:prstGeom prst="rect">
+            <a:avLst/>
+          </a:prstGeom>
+          <a:noFill/>
+        </p:spPr>
+        <p:txBody>
+          <a:bodyPr wrap="square" rtlCol="0">
+            <a:spAutoFit/>
+          </a:bodyPr>
+          <a:lstStyle/>
+          <a:p>
+            <a:pPr algn="ctr"/>
+            <a:r>
+              <a:rPr lang="en-AU" sz="1200" dirty="0"/>
+              <a:t>Link to top added to pages with more content</a:t>
+            </a:r>
+          </a:p>
+        </p:txBody>
+      </p:sp>
+      <p:pic>
+        <p:nvPicPr>
+          <p:cNvPr id="20" name="Picture 19">
+            <a:extLst>
+              <a:ext uri="{FF2B5EF4-FFF2-40B4-BE49-F238E27FC236}">
+                <a16:creationId xmlns:a16="http://schemas.microsoft.com/office/drawing/2014/main" id="{75681634-83A2-4C62-97ED-C9B96812F584}"/>
+              </a:ext>
+            </a:extLst>
+          </p:cNvPr>
+          <p:cNvPicPr>
+            <a:picLocks noChangeAspect="1"/>
+          </p:cNvPicPr>
+          <p:nvPr/>
+        </p:nvPicPr>
+        <p:blipFill>
+          <a:blip r:embed="rId4"/>
+          <a:stretch>
+            <a:fillRect/>
+          </a:stretch>
+        </p:blipFill>
+        <p:spPr>
+          <a:xfrm>
+            <a:off x="2119870" y="3768497"/>
+            <a:ext cx="3946263" cy="2816677"/>
+          </a:xfrm>
+          <a:prstGeom prst="rect">
+            <a:avLst/>
+          </a:prstGeom>
+        </p:spPr>
+      </p:pic>
+      <p:pic>
+        <p:nvPicPr>
+          <p:cNvPr id="21" name="Picture 20">
+            <a:extLst>
+              <a:ext uri="{FF2B5EF4-FFF2-40B4-BE49-F238E27FC236}">
+                <a16:creationId xmlns:a16="http://schemas.microsoft.com/office/drawing/2014/main" id="{0B65242C-2405-43B3-8FAF-E927C37115EC}"/>
+              </a:ext>
+            </a:extLst>
+          </p:cNvPr>
+          <p:cNvPicPr>
+            <a:picLocks noChangeAspect="1"/>
+          </p:cNvPicPr>
+          <p:nvPr/>
+        </p:nvPicPr>
+        <p:blipFill>
+          <a:blip r:embed="rId5"/>
+          <a:stretch>
+            <a:fillRect/>
+          </a:stretch>
+        </p:blipFill>
+        <p:spPr>
+          <a:xfrm>
+            <a:off x="6254241" y="3753988"/>
+            <a:ext cx="3946263" cy="2824419"/>
+          </a:xfrm>
+          <a:prstGeom prst="rect">
+            <a:avLst/>
+          </a:prstGeom>
+        </p:spPr>
+      </p:pic>
+      <p:cxnSp>
+        <p:nvCxnSpPr>
+          <p:cNvPr id="24" name="Straight Arrow Connector 23">
+            <a:extLst>
+              <a:ext uri="{FF2B5EF4-FFF2-40B4-BE49-F238E27FC236}">
+                <a16:creationId xmlns:a16="http://schemas.microsoft.com/office/drawing/2014/main" id="{1DFCDDF0-47A6-44FB-AE33-B1CAF30C3DB8}"/>
+              </a:ext>
+            </a:extLst>
+          </p:cNvPr>
+          <p:cNvCxnSpPr>
+            <a:cxnSpLocks/>
+            <a:stCxn id="37" idx="3"/>
+          </p:cNvCxnSpPr>
+          <p:nvPr/>
+        </p:nvCxnSpPr>
+        <p:spPr>
+          <a:xfrm flipV="1">
+            <a:off x="1845496" y="5379765"/>
+            <a:ext cx="545366" cy="146812"/>
+          </a:xfrm>
+          <a:prstGeom prst="straightConnector1">
+            <a:avLst/>
+          </a:prstGeom>
+          <a:ln w="38100">
+            <a:tailEnd type="triangle"/>
+          </a:ln>
+        </p:spPr>
+        <p:style>
+          <a:lnRef idx="1">
+            <a:schemeClr val="accent1"/>
+          </a:lnRef>
+          <a:fillRef idx="0">
+            <a:schemeClr val="accent1"/>
+          </a:fillRef>
+          <a:effectRef idx="0">
+            <a:schemeClr val="accent1"/>
+          </a:effectRef>
+          <a:fontRef idx="minor">
+            <a:schemeClr val="tx1"/>
+          </a:fontRef>
+        </p:style>
+      </p:cxnSp>
+      <p:cxnSp>
+        <p:nvCxnSpPr>
+          <p:cNvPr id="26" name="Straight Arrow Connector 25">
+            <a:extLst>
+              <a:ext uri="{FF2B5EF4-FFF2-40B4-BE49-F238E27FC236}">
+                <a16:creationId xmlns:a16="http://schemas.microsoft.com/office/drawing/2014/main" id="{2C0213C6-DAFA-408C-8CAD-0399399AE504}"/>
+              </a:ext>
+            </a:extLst>
+          </p:cNvPr>
+          <p:cNvCxnSpPr>
+            <a:cxnSpLocks/>
+            <a:stCxn id="35" idx="3"/>
+          </p:cNvCxnSpPr>
+          <p:nvPr/>
+        </p:nvCxnSpPr>
+        <p:spPr>
+          <a:xfrm>
+            <a:off x="1746094" y="4555197"/>
+            <a:ext cx="2586624" cy="650895"/>
+          </a:xfrm>
+          <a:prstGeom prst="straightConnector1">
+            <a:avLst/>
+          </a:prstGeom>
+          <a:ln w="38100">
+            <a:tailEnd type="triangle"/>
+          </a:ln>
+        </p:spPr>
+        <p:style>
+          <a:lnRef idx="1">
+            <a:schemeClr val="accent1"/>
+          </a:lnRef>
+          <a:fillRef idx="0">
+            <a:schemeClr val="accent1"/>
+          </a:fillRef>
+          <a:effectRef idx="0">
+            <a:schemeClr val="accent1"/>
+          </a:effectRef>
+          <a:fontRef idx="minor">
+            <a:schemeClr val="tx1"/>
+          </a:fontRef>
+        </p:style>
+      </p:cxnSp>
+      <p:sp>
+        <p:nvSpPr>
+          <p:cNvPr id="35" name="TextBox 34">
+            <a:extLst>
+              <a:ext uri="{FF2B5EF4-FFF2-40B4-BE49-F238E27FC236}">
+                <a16:creationId xmlns:a16="http://schemas.microsoft.com/office/drawing/2014/main" id="{CFAE613E-5ACB-49EB-BBA2-CEAB845D2CBF}"/>
+              </a:ext>
+            </a:extLst>
+          </p:cNvPr>
+          <p:cNvSpPr txBox="1"/>
+          <p:nvPr/>
+        </p:nvSpPr>
+        <p:spPr>
+          <a:xfrm>
+            <a:off x="216514" y="4047365"/>
+            <a:ext cx="1529580" cy="1015663"/>
+          </a:xfrm>
+          <a:prstGeom prst="rect">
+            <a:avLst/>
+          </a:prstGeom>
+          <a:noFill/>
+        </p:spPr>
+        <p:txBody>
+          <a:bodyPr wrap="square" rtlCol="0">
+            <a:spAutoFit/>
+          </a:bodyPr>
+          <a:lstStyle/>
+          <a:p>
+            <a:pPr algn="ctr"/>
+            <a:r>
+              <a:rPr lang="en-AU" sz="1200" dirty="0"/>
+              <a:t>Links to external social media </a:t>
+            </a:r>
+          </a:p>
+          <a:p>
+            <a:pPr algn="ctr"/>
+            <a:r>
+              <a:rPr lang="en-AU" sz="1200" dirty="0"/>
+              <a:t>site  via blog for increased connectivity</a:t>
+            </a:r>
+          </a:p>
+        </p:txBody>
+      </p:sp>
+      <p:sp>
+        <p:nvSpPr>
+          <p:cNvPr id="37" name="TextBox 36">
+            <a:extLst>
+              <a:ext uri="{FF2B5EF4-FFF2-40B4-BE49-F238E27FC236}">
+                <a16:creationId xmlns:a16="http://schemas.microsoft.com/office/drawing/2014/main" id="{314AD129-548F-4A97-9D98-32B3B9BF0F04}"/>
+              </a:ext>
+            </a:extLst>
+          </p:cNvPr>
+          <p:cNvSpPr txBox="1"/>
+          <p:nvPr/>
+        </p:nvSpPr>
+        <p:spPr>
+          <a:xfrm>
+            <a:off x="216513" y="5295744"/>
+            <a:ext cx="1628983" cy="461665"/>
+          </a:xfrm>
+          <a:prstGeom prst="rect">
+            <a:avLst/>
+          </a:prstGeom>
+          <a:noFill/>
+        </p:spPr>
+        <p:txBody>
+          <a:bodyPr wrap="square" rtlCol="0">
+            <a:spAutoFit/>
+          </a:bodyPr>
+          <a:lstStyle/>
+          <a:p>
+            <a:pPr algn="ctr"/>
+            <a:r>
+              <a:rPr lang="en-AU" sz="1200" dirty="0"/>
+              <a:t>Captions to give </a:t>
+            </a:r>
+          </a:p>
+          <a:p>
+            <a:pPr algn="ctr"/>
+            <a:r>
+              <a:rPr lang="en-AU" sz="1200" dirty="0"/>
+              <a:t>meaning to a picture</a:t>
+            </a:r>
+          </a:p>
+        </p:txBody>
+      </p:sp>
+      <p:cxnSp>
+        <p:nvCxnSpPr>
+          <p:cNvPr id="39" name="Straight Arrow Connector 38">
+            <a:extLst>
+              <a:ext uri="{FF2B5EF4-FFF2-40B4-BE49-F238E27FC236}">
+                <a16:creationId xmlns:a16="http://schemas.microsoft.com/office/drawing/2014/main" id="{47B9FEC1-936E-4424-B239-B7E5615423D2}"/>
+              </a:ext>
+            </a:extLst>
+          </p:cNvPr>
+          <p:cNvCxnSpPr>
+            <a:cxnSpLocks/>
+          </p:cNvCxnSpPr>
+          <p:nvPr/>
+        </p:nvCxnSpPr>
+        <p:spPr>
+          <a:xfrm flipH="1" flipV="1">
+            <a:off x="9848675" y="5051261"/>
+            <a:ext cx="597232" cy="328504"/>
+          </a:xfrm>
+          <a:prstGeom prst="straightConnector1">
+            <a:avLst/>
+          </a:prstGeom>
+          <a:ln w="38100">
+            <a:tailEnd type="triangle"/>
+          </a:ln>
+        </p:spPr>
+        <p:style>
+          <a:lnRef idx="1">
+            <a:schemeClr val="accent1"/>
+          </a:lnRef>
+          <a:fillRef idx="0">
+            <a:schemeClr val="accent1"/>
+          </a:fillRef>
+          <a:effectRef idx="0">
+            <a:schemeClr val="accent1"/>
+          </a:effectRef>
+          <a:fontRef idx="minor">
+            <a:schemeClr val="tx1"/>
+          </a:fontRef>
+        </p:style>
+      </p:cxnSp>
+      <p:sp>
+        <p:nvSpPr>
+          <p:cNvPr id="42" name="TextBox 41">
+            <a:extLst>
+              <a:ext uri="{FF2B5EF4-FFF2-40B4-BE49-F238E27FC236}">
+                <a16:creationId xmlns:a16="http://schemas.microsoft.com/office/drawing/2014/main" id="{EF2EB934-8B83-4522-A92E-338C6C7F94B0}"/>
+              </a:ext>
+            </a:extLst>
+          </p:cNvPr>
+          <p:cNvSpPr txBox="1"/>
+          <p:nvPr/>
+        </p:nvSpPr>
+        <p:spPr>
+          <a:xfrm>
+            <a:off x="10323757" y="5064911"/>
+            <a:ext cx="1651729" cy="1384995"/>
+          </a:xfrm>
+          <a:prstGeom prst="rect">
+            <a:avLst/>
+          </a:prstGeom>
+          <a:noFill/>
+        </p:spPr>
+        <p:txBody>
+          <a:bodyPr wrap="square" rtlCol="0">
+            <a:spAutoFit/>
+          </a:bodyPr>
+          <a:lstStyle/>
+          <a:p>
+            <a:pPr algn="ctr"/>
+            <a:r>
+              <a:rPr lang="en-AU" sz="1200" dirty="0"/>
+              <a:t>Highlighted background, uppercase and bold text for the audience to identify which page they’re currently on</a:t>
+            </a:r>
+          </a:p>
+        </p:txBody>
+      </p:sp>
+      <p:cxnSp>
+        <p:nvCxnSpPr>
+          <p:cNvPr id="47" name="Straight Arrow Connector 46">
+            <a:extLst>
+              <a:ext uri="{FF2B5EF4-FFF2-40B4-BE49-F238E27FC236}">
+                <a16:creationId xmlns:a16="http://schemas.microsoft.com/office/drawing/2014/main" id="{67C2070E-1FD6-46B2-AFD0-03E5A435661E}"/>
+              </a:ext>
+            </a:extLst>
+          </p:cNvPr>
+          <p:cNvCxnSpPr>
+            <a:cxnSpLocks/>
+            <a:stCxn id="49" idx="3"/>
+          </p:cNvCxnSpPr>
+          <p:nvPr/>
+        </p:nvCxnSpPr>
+        <p:spPr>
+          <a:xfrm flipV="1">
+            <a:off x="1874467" y="5684004"/>
+            <a:ext cx="2112301" cy="616770"/>
+          </a:xfrm>
+          <a:prstGeom prst="straightConnector1">
+            <a:avLst/>
+          </a:prstGeom>
+          <a:ln w="38100">
+            <a:tailEnd type="triangle"/>
+          </a:ln>
+        </p:spPr>
+        <p:style>
+          <a:lnRef idx="1">
+            <a:schemeClr val="accent1"/>
+          </a:lnRef>
+          <a:fillRef idx="0">
+            <a:schemeClr val="accent1"/>
+          </a:fillRef>
+          <a:effectRef idx="0">
+            <a:schemeClr val="accent1"/>
+          </a:effectRef>
+          <a:fontRef idx="minor">
+            <a:schemeClr val="tx1"/>
+          </a:fontRef>
+        </p:style>
+      </p:cxnSp>
+      <p:sp>
+        <p:nvSpPr>
+          <p:cNvPr id="49" name="TextBox 48">
+            <a:extLst>
+              <a:ext uri="{FF2B5EF4-FFF2-40B4-BE49-F238E27FC236}">
+                <a16:creationId xmlns:a16="http://schemas.microsoft.com/office/drawing/2014/main" id="{9421B906-F55C-402A-8835-BB4B724CC44A}"/>
+              </a:ext>
+            </a:extLst>
+          </p:cNvPr>
+          <p:cNvSpPr txBox="1"/>
+          <p:nvPr/>
+        </p:nvSpPr>
+        <p:spPr>
+          <a:xfrm>
+            <a:off x="216513" y="5977608"/>
+            <a:ext cx="1657954" cy="646331"/>
+          </a:xfrm>
+          <a:prstGeom prst="rect">
+            <a:avLst/>
+          </a:prstGeom>
+          <a:noFill/>
+        </p:spPr>
+        <p:txBody>
+          <a:bodyPr wrap="square" rtlCol="0">
+            <a:spAutoFit/>
+          </a:bodyPr>
+          <a:lstStyle/>
+          <a:p>
+            <a:r>
+              <a:rPr lang="en-AU" sz="1200" dirty="0"/>
+              <a:t>Grid view for blogs </a:t>
+            </a:r>
+          </a:p>
+          <a:p>
+            <a:pPr algn="ctr"/>
+            <a:r>
+              <a:rPr lang="en-AU" sz="1200" dirty="0"/>
+              <a:t>with gaps for easy reading for audience</a:t>
+            </a:r>
+          </a:p>
+        </p:txBody>
+      </p:sp>
+      <p:cxnSp>
+        <p:nvCxnSpPr>
+          <p:cNvPr id="52" name="Straight Arrow Connector 51">
+            <a:extLst>
+              <a:ext uri="{FF2B5EF4-FFF2-40B4-BE49-F238E27FC236}">
+                <a16:creationId xmlns:a16="http://schemas.microsoft.com/office/drawing/2014/main" id="{206359D2-0890-459B-9637-45DE8584AE6C}"/>
+              </a:ext>
+            </a:extLst>
+          </p:cNvPr>
+          <p:cNvCxnSpPr>
+            <a:cxnSpLocks/>
+            <a:stCxn id="55" idx="1"/>
+          </p:cNvCxnSpPr>
+          <p:nvPr/>
+        </p:nvCxnSpPr>
+        <p:spPr>
+          <a:xfrm flipH="1">
+            <a:off x="8011577" y="1501494"/>
+            <a:ext cx="2377036" cy="302139"/>
+          </a:xfrm>
+          <a:prstGeom prst="straightConnector1">
+            <a:avLst/>
+          </a:prstGeom>
+          <a:ln w="38100">
+            <a:tailEnd type="triangle"/>
+          </a:ln>
+        </p:spPr>
+        <p:style>
+          <a:lnRef idx="1">
+            <a:schemeClr val="accent1"/>
+          </a:lnRef>
+          <a:fillRef idx="0">
+            <a:schemeClr val="accent1"/>
+          </a:fillRef>
+          <a:effectRef idx="0">
+            <a:schemeClr val="accent1"/>
+          </a:effectRef>
+          <a:fontRef idx="minor">
+            <a:schemeClr val="tx1"/>
+          </a:fontRef>
+        </p:style>
+      </p:cxnSp>
+      <p:sp>
+        <p:nvSpPr>
+          <p:cNvPr id="55" name="TextBox 54">
+            <a:extLst>
+              <a:ext uri="{FF2B5EF4-FFF2-40B4-BE49-F238E27FC236}">
+                <a16:creationId xmlns:a16="http://schemas.microsoft.com/office/drawing/2014/main" id="{BC4BCEE1-4053-45FF-8C0F-DF1D57A52366}"/>
+              </a:ext>
+            </a:extLst>
+          </p:cNvPr>
+          <p:cNvSpPr txBox="1"/>
+          <p:nvPr/>
+        </p:nvSpPr>
+        <p:spPr>
+          <a:xfrm>
+            <a:off x="10388613" y="1201412"/>
+            <a:ext cx="1601125" cy="600164"/>
+          </a:xfrm>
+          <a:prstGeom prst="rect">
+            <a:avLst/>
+          </a:prstGeom>
+          <a:noFill/>
+        </p:spPr>
+        <p:txBody>
+          <a:bodyPr wrap="square" rtlCol="0">
+            <a:spAutoFit/>
+          </a:bodyPr>
+          <a:lstStyle/>
+          <a:p>
+            <a:pPr algn="ctr"/>
+            <a:r>
+              <a:rPr lang="en-AU" sz="1100" dirty="0"/>
+              <a:t>List view to make it easier to read work history</a:t>
+            </a:r>
+          </a:p>
+        </p:txBody>
+      </p:sp>
+      <p:cxnSp>
+        <p:nvCxnSpPr>
+          <p:cNvPr id="61" name="Straight Arrow Connector 60">
+            <a:extLst>
+              <a:ext uri="{FF2B5EF4-FFF2-40B4-BE49-F238E27FC236}">
+                <a16:creationId xmlns:a16="http://schemas.microsoft.com/office/drawing/2014/main" id="{803693CD-3C53-4B95-9ED2-D1BBA66E74C6}"/>
+              </a:ext>
+            </a:extLst>
+          </p:cNvPr>
+          <p:cNvCxnSpPr>
+            <a:cxnSpLocks/>
+            <a:stCxn id="63" idx="3"/>
+          </p:cNvCxnSpPr>
+          <p:nvPr/>
+        </p:nvCxnSpPr>
+        <p:spPr>
+          <a:xfrm flipV="1">
+            <a:off x="1845497" y="790879"/>
+            <a:ext cx="1581118" cy="217248"/>
+          </a:xfrm>
+          <a:prstGeom prst="straightConnector1">
+            <a:avLst/>
+          </a:prstGeom>
+          <a:ln w="38100">
+            <a:tailEnd type="triangle"/>
+          </a:ln>
+        </p:spPr>
+        <p:style>
+          <a:lnRef idx="1">
+            <a:schemeClr val="accent1"/>
+          </a:lnRef>
+          <a:fillRef idx="0">
+            <a:schemeClr val="accent1"/>
+          </a:fillRef>
+          <a:effectRef idx="0">
+            <a:schemeClr val="accent1"/>
+          </a:effectRef>
+          <a:fontRef idx="minor">
+            <a:schemeClr val="tx1"/>
+          </a:fontRef>
+        </p:style>
+      </p:cxnSp>
+      <p:sp>
+        <p:nvSpPr>
+          <p:cNvPr id="63" name="TextBox 62">
+            <a:extLst>
+              <a:ext uri="{FF2B5EF4-FFF2-40B4-BE49-F238E27FC236}">
+                <a16:creationId xmlns:a16="http://schemas.microsoft.com/office/drawing/2014/main" id="{84A2E217-4BB2-4956-B5D1-2197B964C574}"/>
+              </a:ext>
+            </a:extLst>
+          </p:cNvPr>
+          <p:cNvSpPr txBox="1"/>
+          <p:nvPr/>
+        </p:nvSpPr>
+        <p:spPr>
+          <a:xfrm>
+            <a:off x="216514" y="684961"/>
+            <a:ext cx="1628983" cy="646331"/>
+          </a:xfrm>
+          <a:prstGeom prst="rect">
+            <a:avLst/>
+          </a:prstGeom>
+          <a:noFill/>
+        </p:spPr>
+        <p:txBody>
+          <a:bodyPr wrap="square" rtlCol="0">
+            <a:spAutoFit/>
+          </a:bodyPr>
+          <a:lstStyle/>
+          <a:p>
+            <a:pPr algn="ctr"/>
+            <a:r>
+              <a:rPr lang="en-AU" sz="1200" dirty="0"/>
+              <a:t>Page heading to </a:t>
+            </a:r>
+          </a:p>
+          <a:p>
+            <a:pPr algn="ctr"/>
+            <a:r>
+              <a:rPr lang="en-AU" sz="1200" dirty="0"/>
+              <a:t>emphasise what the </a:t>
+            </a:r>
+          </a:p>
+          <a:p>
+            <a:pPr algn="ctr"/>
+            <a:r>
+              <a:rPr lang="en-AU" sz="1200" dirty="0"/>
+              <a:t>content is about</a:t>
+            </a:r>
+          </a:p>
+        </p:txBody>
+      </p:sp>
+    </p:spTree>
+    <p:extLst>
+      <p:ext uri="{BB962C8B-B14F-4D97-AF65-F5344CB8AC3E}">
+        <p14:creationId xmlns:p14="http://schemas.microsoft.com/office/powerpoint/2010/main" val="4073871259"/>
+      </p:ext>
+    </p:extLst>
+  </p:cSld>
+  <p:clrMapOvr>
+    <a:masterClrMapping/>
+  </p:clrMapOvr>
+</p:sld>
+</file>
+
+<file path=ppt/slides/slide9.xml><?xml version="1.0" encoding="utf-8"?>
+<p:sld xmlns:a="http://schemas.openxmlformats.org/drawingml/2006/main" xmlns:r="http://schemas.openxmlformats.org/officeDocument/2006/relationships" xmlns:p="http://schemas.openxmlformats.org/presentationml/2006/main">
+  <p:cSld>
+    <p:spTree>
+      <p:nvGrpSpPr>
+        <p:cNvPr id="1" name=""/>
+        <p:cNvGrpSpPr/>
+        <p:nvPr/>
+      </p:nvGrpSpPr>
+      <p:grpSpPr>
+        <a:xfrm>
+          <a:off x="0" y="0"/>
+          <a:ext cx="0" cy="0"/>
+          <a:chOff x="0" y="0"/>
+          <a:chExt cx="0" cy="0"/>
+        </a:xfrm>
+      </p:grpSpPr>
+      <p:sp>
+        <p:nvSpPr>
+          <p:cNvPr id="2" name="Rectangle 1">
+            <a:extLst>
+              <a:ext uri="{FF2B5EF4-FFF2-40B4-BE49-F238E27FC236}">
+                <a16:creationId xmlns:a16="http://schemas.microsoft.com/office/drawing/2014/main" id="{82D26F52-81ED-4752-A590-8FF6700695DF}"/>
+              </a:ext>
+            </a:extLst>
+          </p:cNvPr>
+          <p:cNvSpPr/>
+          <p:nvPr/>
+        </p:nvSpPr>
+        <p:spPr>
+          <a:xfrm>
+            <a:off x="3722436" y="90321"/>
+            <a:ext cx="4356514" cy="369332"/>
+          </a:xfrm>
+          <a:prstGeom prst="rect">
+            <a:avLst/>
+          </a:prstGeom>
+        </p:spPr>
+        <p:txBody>
+          <a:bodyPr wrap="none">
+            <a:spAutoFit/>
+          </a:bodyPr>
+          <a:lstStyle/>
+          <a:p>
+            <a:pPr algn="ctr"/>
+            <a:r>
+              <a:rPr lang="en-AU" dirty="0"/>
+              <a:t>Michael Dart | Portfolio | DESKTOP VIEW</a:t>
+            </a:r>
+          </a:p>
+        </p:txBody>
+      </p:sp>
+      <p:pic>
+        <p:nvPicPr>
+          <p:cNvPr id="4" name="Picture 3">
+            <a:extLst>
+              <a:ext uri="{FF2B5EF4-FFF2-40B4-BE49-F238E27FC236}">
+                <a16:creationId xmlns:a16="http://schemas.microsoft.com/office/drawing/2014/main" id="{E0271F77-A91F-44BD-976E-F2CE6EB5231D}"/>
+              </a:ext>
+            </a:extLst>
+          </p:cNvPr>
+          <p:cNvPicPr>
+            <a:picLocks noChangeAspect="1"/>
+          </p:cNvPicPr>
+          <p:nvPr/>
+        </p:nvPicPr>
+        <p:blipFill>
+          <a:blip r:embed="rId2"/>
+          <a:stretch>
+            <a:fillRect/>
+          </a:stretch>
+        </p:blipFill>
+        <p:spPr>
+          <a:xfrm>
+            <a:off x="953256" y="1284516"/>
+            <a:ext cx="4828245" cy="1956799"/>
+          </a:xfrm>
+          <a:prstGeom prst="rect">
+            <a:avLst/>
+          </a:prstGeom>
+        </p:spPr>
+      </p:pic>
+      <p:sp>
+        <p:nvSpPr>
+          <p:cNvPr id="11" name="TextBox 10">
+            <a:extLst>
+              <a:ext uri="{FF2B5EF4-FFF2-40B4-BE49-F238E27FC236}">
+                <a16:creationId xmlns:a16="http://schemas.microsoft.com/office/drawing/2014/main" id="{1D78023D-2BBD-4D88-9C6C-C1E3347E31E4}"/>
+              </a:ext>
+            </a:extLst>
+          </p:cNvPr>
+          <p:cNvSpPr txBox="1"/>
+          <p:nvPr/>
+        </p:nvSpPr>
+        <p:spPr>
+          <a:xfrm>
+            <a:off x="6368461" y="1043557"/>
+            <a:ext cx="1525579" cy="1015663"/>
+          </a:xfrm>
+          <a:prstGeom prst="rect">
+            <a:avLst/>
+          </a:prstGeom>
+          <a:noFill/>
+        </p:spPr>
+        <p:txBody>
+          <a:bodyPr wrap="square" rtlCol="0">
+            <a:spAutoFit/>
+          </a:bodyPr>
+          <a:lstStyle/>
+          <a:p>
+            <a:pPr algn="ctr"/>
+            <a:r>
+              <a:rPr lang="en-AU" sz="1200" b="1" dirty="0"/>
+              <a:t>Grid Layout</a:t>
+            </a:r>
+          </a:p>
+          <a:p>
+            <a:pPr algn="ctr"/>
+            <a:r>
+              <a:rPr lang="en-AU" sz="1200" dirty="0"/>
+              <a:t>making easier for the audience to view content on larger screens</a:t>
+            </a:r>
+          </a:p>
+        </p:txBody>
+      </p:sp>
+      <p:sp>
+        <p:nvSpPr>
+          <p:cNvPr id="13" name="TextBox 12">
+            <a:extLst>
+              <a:ext uri="{FF2B5EF4-FFF2-40B4-BE49-F238E27FC236}">
+                <a16:creationId xmlns:a16="http://schemas.microsoft.com/office/drawing/2014/main" id="{FB8ED406-ABC2-44D0-833B-5C048767860F}"/>
+              </a:ext>
+            </a:extLst>
+          </p:cNvPr>
+          <p:cNvSpPr txBox="1"/>
+          <p:nvPr/>
+        </p:nvSpPr>
+        <p:spPr>
+          <a:xfrm>
+            <a:off x="5751622" y="2405094"/>
+            <a:ext cx="2327327" cy="830997"/>
+          </a:xfrm>
+          <a:prstGeom prst="rect">
+            <a:avLst/>
+          </a:prstGeom>
+          <a:noFill/>
+        </p:spPr>
+        <p:txBody>
+          <a:bodyPr wrap="square" rtlCol="0">
+            <a:spAutoFit/>
+          </a:bodyPr>
+          <a:lstStyle/>
+          <a:p>
+            <a:pPr algn="ctr"/>
+            <a:r>
+              <a:rPr lang="en-AU" sz="1200" b="1" dirty="0"/>
+              <a:t>Flex Layout (Columns)</a:t>
+            </a:r>
+          </a:p>
+          <a:p>
+            <a:pPr algn="ctr"/>
+            <a:r>
+              <a:rPr lang="en-AU" sz="1200" dirty="0"/>
+              <a:t>Making the content easy to view for when the audience shrinks the screen size</a:t>
+            </a:r>
+          </a:p>
+        </p:txBody>
+      </p:sp>
+      <p:cxnSp>
+        <p:nvCxnSpPr>
+          <p:cNvPr id="18" name="Straight Connector 17">
+            <a:extLst>
+              <a:ext uri="{FF2B5EF4-FFF2-40B4-BE49-F238E27FC236}">
+                <a16:creationId xmlns:a16="http://schemas.microsoft.com/office/drawing/2014/main" id="{45E0D0C2-B291-416B-9D08-43125C54A599}"/>
+              </a:ext>
+            </a:extLst>
+          </p:cNvPr>
+          <p:cNvCxnSpPr/>
+          <p:nvPr/>
+        </p:nvCxnSpPr>
+        <p:spPr>
+          <a:xfrm>
+            <a:off x="2210791" y="551392"/>
+            <a:ext cx="8127218" cy="0"/>
+          </a:xfrm>
+          <a:prstGeom prst="line">
+            <a:avLst/>
+          </a:prstGeom>
+          <a:ln w="76200"/>
+        </p:spPr>
+        <p:style>
+          <a:lnRef idx="1">
+            <a:schemeClr val="accent1"/>
+          </a:lnRef>
+          <a:fillRef idx="0">
+            <a:schemeClr val="accent1"/>
+          </a:fillRef>
+          <a:effectRef idx="0">
+            <a:schemeClr val="accent1"/>
+          </a:effectRef>
+          <a:fontRef idx="minor">
+            <a:schemeClr val="tx1"/>
+          </a:fontRef>
+        </p:style>
+      </p:cxnSp>
+      <p:cxnSp>
+        <p:nvCxnSpPr>
+          <p:cNvPr id="19" name="Straight Arrow Connector 18">
+            <a:extLst>
+              <a:ext uri="{FF2B5EF4-FFF2-40B4-BE49-F238E27FC236}">
+                <a16:creationId xmlns:a16="http://schemas.microsoft.com/office/drawing/2014/main" id="{A1BE599F-545C-4A6D-9DE4-4D615EC227AE}"/>
+              </a:ext>
+            </a:extLst>
+          </p:cNvPr>
+          <p:cNvCxnSpPr>
+            <a:cxnSpLocks/>
+          </p:cNvCxnSpPr>
+          <p:nvPr/>
+        </p:nvCxnSpPr>
+        <p:spPr>
+          <a:xfrm flipH="1">
+            <a:off x="5320794" y="1652570"/>
+            <a:ext cx="1089707" cy="789960"/>
+          </a:xfrm>
+          <a:prstGeom prst="straightConnector1">
+            <a:avLst/>
+          </a:prstGeom>
+          <a:ln w="38100">
+            <a:tailEnd type="triangle"/>
+          </a:ln>
+        </p:spPr>
+        <p:style>
+          <a:lnRef idx="1">
+            <a:schemeClr val="accent1"/>
+          </a:lnRef>
+          <a:fillRef idx="0">
+            <a:schemeClr val="accent1"/>
+          </a:fillRef>
+          <a:effectRef idx="0">
+            <a:schemeClr val="accent1"/>
+          </a:effectRef>
+          <a:fontRef idx="minor">
+            <a:schemeClr val="tx1"/>
+          </a:fontRef>
+        </p:style>
+      </p:cxnSp>
+      <p:pic>
+        <p:nvPicPr>
+          <p:cNvPr id="25" name="Picture 24">
+            <a:extLst>
+              <a:ext uri="{FF2B5EF4-FFF2-40B4-BE49-F238E27FC236}">
+                <a16:creationId xmlns:a16="http://schemas.microsoft.com/office/drawing/2014/main" id="{AA707B88-706A-400B-8A95-8253A9B977F7}"/>
+              </a:ext>
+            </a:extLst>
+          </p:cNvPr>
+          <p:cNvPicPr>
+            <a:picLocks noChangeAspect="1"/>
+          </p:cNvPicPr>
+          <p:nvPr/>
+        </p:nvPicPr>
+        <p:blipFill>
+          <a:blip r:embed="rId3"/>
+          <a:stretch>
+            <a:fillRect/>
+          </a:stretch>
+        </p:blipFill>
+        <p:spPr>
+          <a:xfrm>
+            <a:off x="8078949" y="1652570"/>
+            <a:ext cx="3745363" cy="3110799"/>
+          </a:xfrm>
+          <a:prstGeom prst="rect">
+            <a:avLst/>
+          </a:prstGeom>
+        </p:spPr>
+      </p:pic>
+      <p:cxnSp>
+        <p:nvCxnSpPr>
+          <p:cNvPr id="22" name="Straight Arrow Connector 21">
+            <a:extLst>
+              <a:ext uri="{FF2B5EF4-FFF2-40B4-BE49-F238E27FC236}">
+                <a16:creationId xmlns:a16="http://schemas.microsoft.com/office/drawing/2014/main" id="{EBFD4271-74F1-4952-8602-432E6DF5E48C}"/>
+              </a:ext>
+            </a:extLst>
+          </p:cNvPr>
+          <p:cNvCxnSpPr>
+            <a:cxnSpLocks/>
+            <a:stCxn id="13" idx="2"/>
+          </p:cNvCxnSpPr>
+          <p:nvPr/>
+        </p:nvCxnSpPr>
+        <p:spPr>
+          <a:xfrm>
+            <a:off x="6915286" y="3236091"/>
+            <a:ext cx="1478162" cy="926962"/>
+          </a:xfrm>
+          <a:prstGeom prst="straightConnector1">
+            <a:avLst/>
+          </a:prstGeom>
+          <a:ln w="38100">
+            <a:tailEnd type="triangle"/>
+          </a:ln>
+        </p:spPr>
+        <p:style>
+          <a:lnRef idx="1">
+            <a:schemeClr val="accent1"/>
+          </a:lnRef>
+          <a:fillRef idx="0">
+            <a:schemeClr val="accent1"/>
+          </a:fillRef>
+          <a:effectRef idx="0">
+            <a:schemeClr val="accent1"/>
+          </a:effectRef>
+          <a:fontRef idx="minor">
+            <a:schemeClr val="tx1"/>
+          </a:fontRef>
+        </p:style>
+      </p:cxnSp>
+      <p:sp>
+        <p:nvSpPr>
+          <p:cNvPr id="27" name="TextBox 26">
+            <a:extLst>
+              <a:ext uri="{FF2B5EF4-FFF2-40B4-BE49-F238E27FC236}">
+                <a16:creationId xmlns:a16="http://schemas.microsoft.com/office/drawing/2014/main" id="{2B55ECF5-83D2-4752-9BC0-0FB05E820B1E}"/>
+              </a:ext>
+            </a:extLst>
+          </p:cNvPr>
+          <p:cNvSpPr txBox="1"/>
+          <p:nvPr/>
+        </p:nvSpPr>
+        <p:spPr>
+          <a:xfrm>
+            <a:off x="6679881" y="5517207"/>
+            <a:ext cx="2988319" cy="461665"/>
+          </a:xfrm>
+          <a:prstGeom prst="rect">
+            <a:avLst/>
+          </a:prstGeom>
+          <a:noFill/>
+        </p:spPr>
+        <p:txBody>
+          <a:bodyPr wrap="none" rtlCol="0">
+            <a:spAutoFit/>
+          </a:bodyPr>
+          <a:lstStyle/>
+          <a:p>
+            <a:pPr algn="ctr"/>
+            <a:r>
+              <a:rPr lang="en-AU" sz="1200" dirty="0"/>
+              <a:t>Placeholder text in form fields </a:t>
+            </a:r>
+          </a:p>
+          <a:p>
+            <a:pPr algn="ctr"/>
+            <a:r>
+              <a:rPr lang="en-AU" sz="1200" dirty="0"/>
+              <a:t>to guide the audience to fill out the form</a:t>
+            </a:r>
+          </a:p>
+        </p:txBody>
+      </p:sp>
+      <p:pic>
+        <p:nvPicPr>
+          <p:cNvPr id="29" name="Picture 28">
+            <a:extLst>
+              <a:ext uri="{FF2B5EF4-FFF2-40B4-BE49-F238E27FC236}">
+                <a16:creationId xmlns:a16="http://schemas.microsoft.com/office/drawing/2014/main" id="{66E5DE54-1B07-44D9-89D9-BA28D6B5537A}"/>
+              </a:ext>
+            </a:extLst>
+          </p:cNvPr>
+          <p:cNvPicPr>
+            <a:picLocks noChangeAspect="1"/>
+          </p:cNvPicPr>
+          <p:nvPr/>
+        </p:nvPicPr>
+        <p:blipFill>
+          <a:blip r:embed="rId4"/>
+          <a:stretch>
+            <a:fillRect/>
+          </a:stretch>
+        </p:blipFill>
+        <p:spPr>
+          <a:xfrm>
+            <a:off x="755575" y="4143954"/>
+            <a:ext cx="5340425" cy="2371907"/>
+          </a:xfrm>
+          <a:prstGeom prst="rect">
+            <a:avLst/>
+          </a:prstGeom>
+        </p:spPr>
+      </p:pic>
+      <p:cxnSp>
+        <p:nvCxnSpPr>
+          <p:cNvPr id="30" name="Straight Arrow Connector 29">
+            <a:extLst>
+              <a:ext uri="{FF2B5EF4-FFF2-40B4-BE49-F238E27FC236}">
+                <a16:creationId xmlns:a16="http://schemas.microsoft.com/office/drawing/2014/main" id="{C9A16D06-0F00-4848-B053-0FB116A19386}"/>
+              </a:ext>
+            </a:extLst>
+          </p:cNvPr>
+          <p:cNvCxnSpPr>
+            <a:cxnSpLocks/>
+            <a:stCxn id="27" idx="1"/>
+          </p:cNvCxnSpPr>
+          <p:nvPr/>
+        </p:nvCxnSpPr>
+        <p:spPr>
+          <a:xfrm flipH="1" flipV="1">
+            <a:off x="4194502" y="5559390"/>
+            <a:ext cx="2485379" cy="188650"/>
+          </a:xfrm>
+          <a:prstGeom prst="straightConnector1">
+            <a:avLst/>
+          </a:prstGeom>
+          <a:ln w="38100">
+            <a:tailEnd type="triangle"/>
+          </a:ln>
+        </p:spPr>
+        <p:style>
+          <a:lnRef idx="1">
+            <a:schemeClr val="accent1"/>
+          </a:lnRef>
+          <a:fillRef idx="0">
+            <a:schemeClr val="accent1"/>
+          </a:fillRef>
+          <a:effectRef idx="0">
+            <a:schemeClr val="accent1"/>
+          </a:effectRef>
+          <a:fontRef idx="minor">
+            <a:schemeClr val="tx1"/>
+          </a:fontRef>
+        </p:style>
+      </p:cxnSp>
+      <p:sp>
+        <p:nvSpPr>
+          <p:cNvPr id="33" name="TextBox 32">
+            <a:extLst>
+              <a:ext uri="{FF2B5EF4-FFF2-40B4-BE49-F238E27FC236}">
+                <a16:creationId xmlns:a16="http://schemas.microsoft.com/office/drawing/2014/main" id="{B0CFEB1C-ED56-4892-9816-916E37032978}"/>
+              </a:ext>
+            </a:extLst>
+          </p:cNvPr>
+          <p:cNvSpPr txBox="1"/>
+          <p:nvPr/>
+        </p:nvSpPr>
+        <p:spPr>
+          <a:xfrm>
+            <a:off x="6915285" y="5045312"/>
+            <a:ext cx="2310954" cy="276999"/>
+          </a:xfrm>
+          <a:prstGeom prst="rect">
+            <a:avLst/>
+          </a:prstGeom>
+          <a:noFill/>
+        </p:spPr>
+        <p:txBody>
+          <a:bodyPr wrap="none" rtlCol="0">
+            <a:spAutoFit/>
+          </a:bodyPr>
+          <a:lstStyle/>
+          <a:p>
+            <a:r>
+              <a:rPr lang="en-AU" sz="1200" dirty="0"/>
+              <a:t>Curved edges for easy viewing</a:t>
+            </a:r>
+          </a:p>
+        </p:txBody>
+      </p:sp>
+      <p:cxnSp>
+        <p:nvCxnSpPr>
+          <p:cNvPr id="36" name="Straight Arrow Connector 35">
+            <a:extLst>
+              <a:ext uri="{FF2B5EF4-FFF2-40B4-BE49-F238E27FC236}">
+                <a16:creationId xmlns:a16="http://schemas.microsoft.com/office/drawing/2014/main" id="{3D1DA3A3-FBB8-44F5-A1CA-48E79CBA9462}"/>
+              </a:ext>
+            </a:extLst>
+          </p:cNvPr>
+          <p:cNvCxnSpPr>
+            <a:cxnSpLocks/>
+            <a:stCxn id="33" idx="1"/>
+          </p:cNvCxnSpPr>
+          <p:nvPr/>
+        </p:nvCxnSpPr>
+        <p:spPr>
+          <a:xfrm flipH="1" flipV="1">
+            <a:off x="5998128" y="4519532"/>
+            <a:ext cx="917157" cy="664280"/>
+          </a:xfrm>
+          <a:prstGeom prst="straightConnector1">
+            <a:avLst/>
+          </a:prstGeom>
+          <a:ln w="38100">
+            <a:tailEnd type="triangle"/>
+          </a:ln>
+        </p:spPr>
+        <p:style>
+          <a:lnRef idx="1">
+            <a:schemeClr val="accent1"/>
+          </a:lnRef>
+          <a:fillRef idx="0">
+            <a:schemeClr val="accent1"/>
+          </a:fillRef>
+          <a:effectRef idx="0">
+            <a:schemeClr val="accent1"/>
+          </a:effectRef>
+          <a:fontRef idx="minor">
+            <a:schemeClr val="tx1"/>
+          </a:fontRef>
+        </p:style>
+      </p:cxnSp>
+      <p:sp>
+        <p:nvSpPr>
+          <p:cNvPr id="42" name="TextBox 41">
+            <a:extLst>
+              <a:ext uri="{FF2B5EF4-FFF2-40B4-BE49-F238E27FC236}">
+                <a16:creationId xmlns:a16="http://schemas.microsoft.com/office/drawing/2014/main" id="{3BB80900-E0F7-4FE5-9941-E21B259CD5BC}"/>
+              </a:ext>
+            </a:extLst>
+          </p:cNvPr>
+          <p:cNvSpPr txBox="1"/>
+          <p:nvPr/>
+        </p:nvSpPr>
+        <p:spPr>
+          <a:xfrm>
+            <a:off x="6853806" y="6123618"/>
+            <a:ext cx="3962688" cy="276999"/>
+          </a:xfrm>
+          <a:prstGeom prst="rect">
+            <a:avLst/>
+          </a:prstGeom>
+          <a:noFill/>
+        </p:spPr>
+        <p:txBody>
+          <a:bodyPr wrap="none" rtlCol="0">
+            <a:spAutoFit/>
+          </a:bodyPr>
+          <a:lstStyle/>
+          <a:p>
+            <a:r>
+              <a:rPr lang="en-AU" sz="1200" dirty="0"/>
+              <a:t>Send button for the audience to send once completed</a:t>
+            </a:r>
+          </a:p>
+        </p:txBody>
+      </p:sp>
+      <p:cxnSp>
+        <p:nvCxnSpPr>
+          <p:cNvPr id="43" name="Straight Arrow Connector 42">
+            <a:extLst>
+              <a:ext uri="{FF2B5EF4-FFF2-40B4-BE49-F238E27FC236}">
+                <a16:creationId xmlns:a16="http://schemas.microsoft.com/office/drawing/2014/main" id="{A247F9A7-2CD6-45DB-9730-A4C136AAAEEC}"/>
+              </a:ext>
+            </a:extLst>
+          </p:cNvPr>
+          <p:cNvCxnSpPr>
+            <a:cxnSpLocks/>
+          </p:cNvCxnSpPr>
+          <p:nvPr/>
+        </p:nvCxnSpPr>
+        <p:spPr>
+          <a:xfrm flipH="1">
+            <a:off x="3722436" y="6260986"/>
+            <a:ext cx="3131370" cy="93464"/>
+          </a:xfrm>
+          <a:prstGeom prst="straightConnector1">
+            <a:avLst/>
+          </a:prstGeom>
+          <a:ln w="38100">
+            <a:tailEnd type="triangle"/>
+          </a:ln>
+        </p:spPr>
+        <p:style>
+          <a:lnRef idx="1">
+            <a:schemeClr val="accent1"/>
+          </a:lnRef>
+          <a:fillRef idx="0">
+            <a:schemeClr val="accent1"/>
+          </a:fillRef>
+          <a:effectRef idx="0">
+            <a:schemeClr val="accent1"/>
+          </a:effectRef>
+          <a:fontRef idx="minor">
+            <a:schemeClr val="tx1"/>
+          </a:fontRef>
+        </p:style>
+      </p:cxnSp>
     </p:spTree>
     <p:extLst>
       <p:ext uri="{BB962C8B-B14F-4D97-AF65-F5344CB8AC3E}">

</xml_diff>

<commit_message>
additional styling to logo box
</commit_message>
<xml_diff>
--- a/Michael-Dart_T1A2 Slidedeck.pptx
+++ b/Michael-Dart_T1A2 Slidedeck.pptx
@@ -7,10 +7,10 @@
   <p:sldIdLst>
     <p:sldId id="256" r:id="rId2"/>
     <p:sldId id="261" r:id="rId3"/>
-    <p:sldId id="264" r:id="rId4"/>
-    <p:sldId id="260" r:id="rId5"/>
-    <p:sldId id="262" r:id="rId6"/>
-    <p:sldId id="263" r:id="rId7"/>
+    <p:sldId id="260" r:id="rId4"/>
+    <p:sldId id="262" r:id="rId5"/>
+    <p:sldId id="263" r:id="rId6"/>
+    <p:sldId id="264" r:id="rId7"/>
     <p:sldId id="257" r:id="rId8"/>
     <p:sldId id="258" r:id="rId9"/>
     <p:sldId id="259" r:id="rId10"/>
@@ -5879,8 +5879,8 @@
         </p:nvSpPr>
         <p:spPr>
           <a:xfrm>
-            <a:off x="3157545" y="3095147"/>
-            <a:ext cx="5876909" cy="1720850"/>
+            <a:off x="1971203" y="3079043"/>
+            <a:ext cx="8249592" cy="1720850"/>
           </a:xfrm>
         </p:spPr>
         <p:txBody>
@@ -5992,8 +5992,8 @@
         </p:nvSpPr>
         <p:spPr>
           <a:xfrm>
-            <a:off x="5317295" y="115241"/>
-            <a:ext cx="1557414" cy="369332"/>
+            <a:off x="3977317" y="6357196"/>
+            <a:ext cx="4484561" cy="369332"/>
           </a:xfrm>
           <a:prstGeom prst="rect">
             <a:avLst/>
@@ -6008,7 +6008,11 @@
             <a:pPr algn="ctr"/>
             <a:r>
               <a:rPr lang="en-AU" dirty="0"/>
-              <a:t>THANK YOU</a:t>
+              <a:t>THANK YOU | </a:t>
+            </a:r>
+            <a:r>
+              <a:rPr lang="en-AU" b="1" dirty="0"/>
+              <a:t>TIME FOR A QUICK DEMO</a:t>
             </a:r>
           </a:p>
         </p:txBody>
@@ -6064,8 +6068,8 @@
         </p:nvSpPr>
         <p:spPr>
           <a:xfrm>
-            <a:off x="2130803" y="1249743"/>
-            <a:ext cx="1867499" cy="400110"/>
+            <a:off x="2210791" y="3924193"/>
+            <a:ext cx="7551363" cy="2123658"/>
           </a:xfrm>
           <a:prstGeom prst="rect">
             <a:avLst/>
@@ -6073,18 +6077,225 @@
           <a:noFill/>
         </p:spPr>
         <p:txBody>
-          <a:bodyPr wrap="none" rtlCol="0">
+          <a:bodyPr wrap="square" rtlCol="0">
             <a:spAutoFit/>
           </a:bodyPr>
           <a:lstStyle/>
           <a:p>
-            <a:r>
-              <a:rPr lang="en-AU" sz="2000" dirty="0"/>
-              <a:t>Favourite </a:t>
-            </a:r>
-            <a:r>
-              <a:rPr lang="en-AU" sz="2000" b="1" dirty="0"/>
-              <a:t>Parts</a:t>
+            <a:pPr algn="ctr"/>
+            <a:r>
+              <a:rPr lang="en-AU" sz="2000" b="1" u="sng" dirty="0"/>
+              <a:t>FAVOURITE PARTS</a:t>
+            </a:r>
+          </a:p>
+          <a:p>
+            <a:r>
+              <a:rPr lang="en-AU" sz="1600" b="1" dirty="0"/>
+              <a:t>Wireframes </a:t>
+            </a:r>
+          </a:p>
+          <a:p>
+            <a:r>
+              <a:rPr lang="en-AU" sz="1600" dirty="0"/>
+              <a:t>I enjoyed planning out the pages across the different devices</a:t>
+            </a:r>
+          </a:p>
+          <a:p>
+            <a:endParaRPr lang="en-AU" sz="1600" dirty="0"/>
+          </a:p>
+          <a:p>
+            <a:r>
+              <a:rPr lang="en-AU" sz="1600" b="1" dirty="0"/>
+              <a:t>Header Title and Image</a:t>
+            </a:r>
+          </a:p>
+          <a:p>
+            <a:endParaRPr lang="en-AU" sz="1600" b="1" dirty="0"/>
+          </a:p>
+          <a:p>
+            <a:r>
+              <a:rPr lang="en-AU" sz="1600" dirty="0"/>
+              <a:t>Navbar</a:t>
+            </a:r>
+          </a:p>
+          <a:p>
+            <a:r>
+              <a:rPr lang="en-AU" sz="1600" dirty="0"/>
+              <a:t>Social Media Logo Bar</a:t>
+            </a:r>
+          </a:p>
+        </p:txBody>
+      </p:sp>
+      <p:cxnSp>
+        <p:nvCxnSpPr>
+          <p:cNvPr id="7" name="Straight Connector 6">
+            <a:extLst>
+              <a:ext uri="{FF2B5EF4-FFF2-40B4-BE49-F238E27FC236}">
+                <a16:creationId xmlns:a16="http://schemas.microsoft.com/office/drawing/2014/main" id="{175BD7D7-98C3-4A5E-BD48-B32D42B919E6}"/>
+              </a:ext>
+            </a:extLst>
+          </p:cNvPr>
+          <p:cNvCxnSpPr/>
+          <p:nvPr/>
+        </p:nvCxnSpPr>
+        <p:spPr>
+          <a:xfrm>
+            <a:off x="2155986" y="6290548"/>
+            <a:ext cx="8127218" cy="0"/>
+          </a:xfrm>
+          <a:prstGeom prst="line">
+            <a:avLst/>
+          </a:prstGeom>
+          <a:ln w="76200"/>
+        </p:spPr>
+        <p:style>
+          <a:lnRef idx="1">
+            <a:schemeClr val="accent1"/>
+          </a:lnRef>
+          <a:fillRef idx="0">
+            <a:schemeClr val="accent1"/>
+          </a:fillRef>
+          <a:effectRef idx="0">
+            <a:schemeClr val="accent1"/>
+          </a:effectRef>
+          <a:fontRef idx="minor">
+            <a:schemeClr val="tx1"/>
+          </a:fontRef>
+        </p:style>
+      </p:cxnSp>
+      <p:sp>
+        <p:nvSpPr>
+          <p:cNvPr id="8" name="TextBox 7">
+            <a:extLst>
+              <a:ext uri="{FF2B5EF4-FFF2-40B4-BE49-F238E27FC236}">
+                <a16:creationId xmlns:a16="http://schemas.microsoft.com/office/drawing/2014/main" id="{183FDED3-85FB-4919-B572-31BF0671B9F3}"/>
+              </a:ext>
+            </a:extLst>
+          </p:cNvPr>
+          <p:cNvSpPr txBox="1"/>
+          <p:nvPr/>
+        </p:nvSpPr>
+        <p:spPr>
+          <a:xfrm>
+            <a:off x="2210792" y="753793"/>
+            <a:ext cx="8127218" cy="2985433"/>
+          </a:xfrm>
+          <a:prstGeom prst="rect">
+            <a:avLst/>
+          </a:prstGeom>
+          <a:noFill/>
+        </p:spPr>
+        <p:txBody>
+          <a:bodyPr wrap="square" rtlCol="0">
+            <a:spAutoFit/>
+          </a:bodyPr>
+          <a:lstStyle/>
+          <a:p>
+            <a:pPr algn="ctr"/>
+            <a:r>
+              <a:rPr lang="en-AU" sz="2000" b="1" u="sng" dirty="0"/>
+              <a:t>CHALLENGES</a:t>
+            </a:r>
+          </a:p>
+          <a:p>
+            <a:r>
+              <a:rPr lang="en-AU" sz="1400" b="1" dirty="0"/>
+              <a:t>Flexbox</a:t>
+            </a:r>
+            <a:r>
+              <a:rPr lang="en-AU" sz="1400" dirty="0"/>
+              <a:t> </a:t>
+            </a:r>
+          </a:p>
+          <a:p>
+            <a:r>
+              <a:rPr lang="en-AU" sz="1400" dirty="0"/>
+              <a:t>Getting the components to behave how I wanted them to for when the screen was adjusted to a smaller size</a:t>
+            </a:r>
+          </a:p>
+          <a:p>
+            <a:endParaRPr lang="en-AU" sz="1400" dirty="0"/>
+          </a:p>
+          <a:p>
+            <a:r>
+              <a:rPr lang="en-AU" sz="1400" b="1" dirty="0"/>
+              <a:t>Responsive Design </a:t>
+            </a:r>
+          </a:p>
+          <a:p>
+            <a:r>
+              <a:rPr lang="en-AU" sz="1400" b="1" dirty="0"/>
+              <a:t>I</a:t>
+            </a:r>
+            <a:r>
+              <a:rPr lang="en-AU" sz="1400" dirty="0"/>
+              <a:t>ssues with text and images resizing when scaling up to larger devices</a:t>
+            </a:r>
+          </a:p>
+          <a:p>
+            <a:endParaRPr lang="en-AU" sz="1400" b="1" dirty="0"/>
+          </a:p>
+          <a:p>
+            <a:r>
+              <a:rPr lang="en-AU" sz="1400" b="1" dirty="0"/>
+              <a:t>Navbar</a:t>
+            </a:r>
+          </a:p>
+          <a:p>
+            <a:r>
+              <a:rPr lang="en-AU" sz="1400" dirty="0"/>
+              <a:t>Hover would only appear over text and not the whole Nav item for longer/multi-lined titles</a:t>
+            </a:r>
+          </a:p>
+          <a:p>
+            <a:endParaRPr lang="en-AU" sz="1400" b="1" dirty="0"/>
+          </a:p>
+          <a:p>
+            <a:r>
+              <a:rPr lang="en-AU" sz="1400" b="1" dirty="0"/>
+              <a:t>Social Media Logo Bar</a:t>
+            </a:r>
+          </a:p>
+          <a:p>
+            <a:r>
+              <a:rPr lang="en-AU" sz="1400" dirty="0"/>
+              <a:t>Getting Flex Box to flex into a column on smaller screens.</a:t>
+            </a:r>
+            <a:endParaRPr lang="en-AU" sz="1400" b="1" dirty="0"/>
+          </a:p>
+        </p:txBody>
+      </p:sp>
+      <p:sp>
+        <p:nvSpPr>
+          <p:cNvPr id="10" name="Rectangle 9">
+            <a:extLst>
+              <a:ext uri="{FF2B5EF4-FFF2-40B4-BE49-F238E27FC236}">
+                <a16:creationId xmlns:a16="http://schemas.microsoft.com/office/drawing/2014/main" id="{5EEADB05-2A06-496C-A264-1E16462F4FDD}"/>
+              </a:ext>
+            </a:extLst>
+          </p:cNvPr>
+          <p:cNvSpPr/>
+          <p:nvPr/>
+        </p:nvSpPr>
+        <p:spPr>
+          <a:xfrm>
+            <a:off x="5598189" y="182060"/>
+            <a:ext cx="1352422" cy="369332"/>
+          </a:xfrm>
+          <a:prstGeom prst="rect">
+            <a:avLst/>
+          </a:prstGeom>
+        </p:spPr>
+        <p:txBody>
+          <a:bodyPr wrap="none">
+            <a:spAutoFit/>
+          </a:bodyPr>
+          <a:lstStyle/>
+          <a:p>
+            <a:pPr algn="ctr"/>
+            <a:r>
+              <a:rPr lang="en-AU" dirty="0"/>
+              <a:t>OVERVIEW</a:t>
             </a:r>
           </a:p>
         </p:txBody>
@@ -6221,6 +6432,82 @@
           </a:prstGeom>
         </p:spPr>
       </p:pic>
+      <p:sp>
+        <p:nvSpPr>
+          <p:cNvPr id="11" name="TextBox 10">
+            <a:extLst>
+              <a:ext uri="{FF2B5EF4-FFF2-40B4-BE49-F238E27FC236}">
+                <a16:creationId xmlns:a16="http://schemas.microsoft.com/office/drawing/2014/main" id="{51CC5B7B-7D0B-4D52-A044-FE52E3E393D5}"/>
+              </a:ext>
+            </a:extLst>
+          </p:cNvPr>
+          <p:cNvSpPr txBox="1"/>
+          <p:nvPr/>
+        </p:nvSpPr>
+        <p:spPr>
+          <a:xfrm>
+            <a:off x="828618" y="1807945"/>
+            <a:ext cx="2034540" cy="1015663"/>
+          </a:xfrm>
+          <a:prstGeom prst="rect">
+            <a:avLst/>
+          </a:prstGeom>
+          <a:noFill/>
+        </p:spPr>
+        <p:txBody>
+          <a:bodyPr wrap="square" rtlCol="0">
+            <a:spAutoFit/>
+          </a:bodyPr>
+          <a:lstStyle/>
+          <a:p>
+            <a:r>
+              <a:rPr lang="en-AU" sz="1200" dirty="0"/>
+              <a:t>Pages are linked to each other allowing the audience to navigate to any part of the site from the active page</a:t>
+            </a:r>
+          </a:p>
+        </p:txBody>
+      </p:sp>
+      <p:cxnSp>
+        <p:nvCxnSpPr>
+          <p:cNvPr id="12" name="Straight Arrow Connector 11">
+            <a:extLst>
+              <a:ext uri="{FF2B5EF4-FFF2-40B4-BE49-F238E27FC236}">
+                <a16:creationId xmlns:a16="http://schemas.microsoft.com/office/drawing/2014/main" id="{8364FF1D-6150-4CD7-AC73-0BC52AF6498F}"/>
+              </a:ext>
+            </a:extLst>
+          </p:cNvPr>
+          <p:cNvCxnSpPr>
+            <a:cxnSpLocks/>
+          </p:cNvCxnSpPr>
+          <p:nvPr/>
+        </p:nvCxnSpPr>
+        <p:spPr>
+          <a:xfrm>
+            <a:off x="2611078" y="2315776"/>
+            <a:ext cx="3484922" cy="625544"/>
+          </a:xfrm>
+          <a:prstGeom prst="straightConnector1">
+            <a:avLst/>
+          </a:prstGeom>
+          <a:ln w="38100">
+            <a:tailEnd type="triangle"/>
+          </a:ln>
+        </p:spPr>
+        <p:style>
+          <a:lnRef idx="1">
+            <a:schemeClr val="accent1"/>
+          </a:lnRef>
+          <a:fillRef idx="0">
+            <a:schemeClr val="accent1"/>
+          </a:fillRef>
+          <a:effectRef idx="0">
+            <a:schemeClr val="accent1"/>
+          </a:effectRef>
+          <a:fontRef idx="minor">
+            <a:schemeClr val="tx1"/>
+          </a:fontRef>
+        </p:style>
+      </p:cxnSp>
     </p:spTree>
     <p:extLst>
       <p:ext uri="{BB962C8B-B14F-4D97-AF65-F5344CB8AC3E}">
@@ -6251,184 +6538,42 @@
           <a:chExt cx="0" cy="0"/>
         </a:xfrm>
       </p:grpSpPr>
-      <p:sp>
-        <p:nvSpPr>
-          <p:cNvPr id="23" name="Rectangle: Rounded Corners 22">
-            <a:extLst>
-              <a:ext uri="{FF2B5EF4-FFF2-40B4-BE49-F238E27FC236}">
-                <a16:creationId xmlns:a16="http://schemas.microsoft.com/office/drawing/2014/main" id="{915CDFCD-E62C-4A81-83BD-8ADCB03B986F}"/>
-              </a:ext>
-            </a:extLst>
-          </p:cNvPr>
-          <p:cNvSpPr/>
+      <p:pic>
+        <p:nvPicPr>
+          <p:cNvPr id="5" name="Picture 4">
+            <a:extLst>
+              <a:ext uri="{FF2B5EF4-FFF2-40B4-BE49-F238E27FC236}">
+                <a16:creationId xmlns:a16="http://schemas.microsoft.com/office/drawing/2014/main" id="{2A9356DC-56B6-45D2-A4D4-520C100C729B}"/>
+              </a:ext>
+            </a:extLst>
+          </p:cNvPr>
+          <p:cNvPicPr>
+            <a:picLocks noChangeAspect="1"/>
+          </p:cNvPicPr>
           <p:nvPr/>
-        </p:nvSpPr>
-        <p:spPr>
-          <a:xfrm>
-            <a:off x="6098772" y="4627692"/>
-            <a:ext cx="5340032" cy="1877437"/>
-          </a:xfrm>
-          <a:prstGeom prst="roundRect">
-            <a:avLst/>
-          </a:prstGeom>
-        </p:spPr>
-        <p:style>
-          <a:lnRef idx="2">
-            <a:schemeClr val="accent1">
-              <a:shade val="50000"/>
-            </a:schemeClr>
-          </a:lnRef>
-          <a:fillRef idx="1">
-            <a:schemeClr val="accent1"/>
-          </a:fillRef>
-          <a:effectRef idx="0">
-            <a:schemeClr val="accent1"/>
-          </a:effectRef>
-          <a:fontRef idx="minor">
-            <a:schemeClr val="lt1"/>
-          </a:fontRef>
-        </p:style>
-        <p:txBody>
-          <a:bodyPr rtlCol="0" anchor="ctr"/>
-          <a:lstStyle/>
-          <a:p>
-            <a:pPr algn="ctr"/>
-            <a:endParaRPr lang="en-AU" dirty="0"/>
-          </a:p>
-        </p:txBody>
-      </p:sp>
-      <p:sp>
-        <p:nvSpPr>
-          <p:cNvPr id="18" name="Rectangle: Rounded Corners 17">
-            <a:extLst>
-              <a:ext uri="{FF2B5EF4-FFF2-40B4-BE49-F238E27FC236}">
-                <a16:creationId xmlns:a16="http://schemas.microsoft.com/office/drawing/2014/main" id="{E65B2E9D-6E84-4B8D-8365-D4EFBC5A7F36}"/>
-              </a:ext>
-            </a:extLst>
-          </p:cNvPr>
-          <p:cNvSpPr/>
-          <p:nvPr/>
-        </p:nvSpPr>
-        <p:spPr>
-          <a:xfrm>
-            <a:off x="910205" y="812827"/>
-            <a:ext cx="4834635" cy="1342020"/>
-          </a:xfrm>
-          <a:prstGeom prst="roundRect">
-            <a:avLst/>
-          </a:prstGeom>
-        </p:spPr>
-        <p:style>
-          <a:lnRef idx="2">
-            <a:schemeClr val="accent1">
-              <a:shade val="50000"/>
-            </a:schemeClr>
-          </a:lnRef>
-          <a:fillRef idx="1">
-            <a:schemeClr val="accent1"/>
-          </a:fillRef>
-          <a:effectRef idx="0">
-            <a:schemeClr val="accent1"/>
-          </a:effectRef>
-          <a:fontRef idx="minor">
-            <a:schemeClr val="lt1"/>
-          </a:fontRef>
-        </p:style>
-        <p:txBody>
-          <a:bodyPr rtlCol="0" anchor="ctr"/>
-          <a:lstStyle/>
-          <a:p>
-            <a:pPr algn="ctr"/>
-            <a:endParaRPr lang="en-AU" dirty="0"/>
-          </a:p>
-        </p:txBody>
-      </p:sp>
-      <p:sp>
-        <p:nvSpPr>
-          <p:cNvPr id="3" name="Rectangle 2">
-            <a:extLst>
-              <a:ext uri="{FF2B5EF4-FFF2-40B4-BE49-F238E27FC236}">
-                <a16:creationId xmlns:a16="http://schemas.microsoft.com/office/drawing/2014/main" id="{8B2E0707-5912-451D-A530-B076A5571FC4}"/>
-              </a:ext>
-            </a:extLst>
-          </p:cNvPr>
-          <p:cNvSpPr/>
-          <p:nvPr/>
-        </p:nvSpPr>
-        <p:spPr>
-          <a:xfrm>
-            <a:off x="453031" y="813183"/>
-            <a:ext cx="5640198" cy="1261884"/>
+        </p:nvPicPr>
+        <p:blipFill>
+          <a:blip r:embed="rId2"/>
+          <a:stretch>
+            <a:fillRect/>
+          </a:stretch>
+        </p:blipFill>
+        <p:spPr>
+          <a:xfrm>
+            <a:off x="1329277" y="1249491"/>
+            <a:ext cx="9533446" cy="4359018"/>
           </a:xfrm>
           <a:prstGeom prst="rect">
             <a:avLst/>
           </a:prstGeom>
         </p:spPr>
-        <p:txBody>
-          <a:bodyPr wrap="square">
-            <a:spAutoFit/>
-          </a:bodyPr>
-          <a:lstStyle/>
-          <a:p>
-            <a:pPr algn="ctr"/>
-            <a:r>
-              <a:rPr lang="en-AU" sz="2000" b="1" u="sng" dirty="0"/>
-              <a:t>Simplified Layout</a:t>
-            </a:r>
-            <a:endParaRPr lang="en-AU" sz="2000" u="sng" dirty="0"/>
-          </a:p>
-          <a:p>
-            <a:pPr algn="ctr"/>
-            <a:r>
-              <a:rPr lang="en-AU" sz="1400" b="1" dirty="0"/>
-              <a:t>Header</a:t>
-            </a:r>
-            <a:r>
-              <a:rPr lang="en-AU" sz="1200" dirty="0"/>
-              <a:t> – with text and image</a:t>
-            </a:r>
-          </a:p>
-          <a:p>
-            <a:pPr algn="ctr"/>
-            <a:r>
-              <a:rPr lang="en-AU" sz="1400" b="1" dirty="0"/>
-              <a:t>Nav Bar </a:t>
-            </a:r>
-            <a:r>
-              <a:rPr lang="en-AU" sz="1200" dirty="0"/>
-              <a:t>– to access other pages easily</a:t>
-            </a:r>
-          </a:p>
-          <a:p>
-            <a:pPr algn="ctr"/>
-            <a:r>
-              <a:rPr lang="en-AU" sz="1400" b="1" dirty="0"/>
-              <a:t>Body</a:t>
-            </a:r>
-            <a:r>
-              <a:rPr lang="en-AU" sz="1200" dirty="0"/>
-              <a:t> – Grid or Block layout </a:t>
-            </a:r>
-          </a:p>
-          <a:p>
-            <a:pPr algn="ctr"/>
-            <a:r>
-              <a:rPr lang="en-AU" sz="1400" b="1" dirty="0"/>
-              <a:t>Footer</a:t>
-            </a:r>
-            <a:r>
-              <a:rPr lang="en-AU" sz="1200" dirty="0"/>
-              <a:t> – Copyright Information and link to Sitemap</a:t>
-            </a:r>
-          </a:p>
-        </p:txBody>
-      </p:sp>
+      </p:pic>
       <p:cxnSp>
         <p:nvCxnSpPr>
-          <p:cNvPr id="4" name="Straight Connector 3">
-            <a:extLst>
-              <a:ext uri="{FF2B5EF4-FFF2-40B4-BE49-F238E27FC236}">
-                <a16:creationId xmlns:a16="http://schemas.microsoft.com/office/drawing/2014/main" id="{F9C17560-7532-44C1-9480-0706AC4FA72B}"/>
+          <p:cNvPr id="7" name="Straight Connector 6">
+            <a:extLst>
+              <a:ext uri="{FF2B5EF4-FFF2-40B4-BE49-F238E27FC236}">
+                <a16:creationId xmlns:a16="http://schemas.microsoft.com/office/drawing/2014/main" id="{3C4FC3E2-6323-4932-B486-B2DC9E7F160D}"/>
               </a:ext>
             </a:extLst>
           </p:cNvPr>
@@ -6462,10 +6607,10 @@
       </p:cxnSp>
       <p:sp>
         <p:nvSpPr>
-          <p:cNvPr id="6" name="TextBox 5">
-            <a:extLst>
-              <a:ext uri="{FF2B5EF4-FFF2-40B4-BE49-F238E27FC236}">
-                <a16:creationId xmlns:a16="http://schemas.microsoft.com/office/drawing/2014/main" id="{B03CB523-A13D-4788-9710-602F5EBC54E8}"/>
+          <p:cNvPr id="8" name="TextBox 7">
+            <a:extLst>
+              <a:ext uri="{FF2B5EF4-FFF2-40B4-BE49-F238E27FC236}">
+                <a16:creationId xmlns:a16="http://schemas.microsoft.com/office/drawing/2014/main" id="{AA7FC98E-C3BE-4563-A0A6-CEDC84E4B66D}"/>
               </a:ext>
             </a:extLst>
           </p:cNvPr>
@@ -6474,8 +6619,8 @@
         </p:nvSpPr>
         <p:spPr>
           <a:xfrm>
-            <a:off x="4577892" y="135298"/>
-            <a:ext cx="3036216" cy="369332"/>
+            <a:off x="4496940" y="170359"/>
+            <a:ext cx="3087384" cy="369332"/>
           </a:xfrm>
           <a:prstGeom prst="rect">
             <a:avLst/>
@@ -6490,499 +6635,15 @@
           <a:p>
             <a:r>
               <a:rPr lang="en-AU" dirty="0"/>
-              <a:t>THE LAYOUT AND DESIGN</a:t>
-            </a:r>
-          </a:p>
-        </p:txBody>
-      </p:sp>
-      <p:sp>
-        <p:nvSpPr>
-          <p:cNvPr id="9" name="TextBox 8">
-            <a:extLst>
-              <a:ext uri="{FF2B5EF4-FFF2-40B4-BE49-F238E27FC236}">
-                <a16:creationId xmlns:a16="http://schemas.microsoft.com/office/drawing/2014/main" id="{6D786BA2-7789-4641-A9B4-1EB0637126F0}"/>
-              </a:ext>
-            </a:extLst>
-          </p:cNvPr>
-          <p:cNvSpPr txBox="1"/>
-          <p:nvPr/>
-        </p:nvSpPr>
-        <p:spPr>
-          <a:xfrm>
-            <a:off x="910205" y="2396670"/>
-            <a:ext cx="4834635" cy="3908762"/>
-          </a:xfrm>
-          <a:prstGeom prst="rect">
-            <a:avLst/>
-          </a:prstGeom>
-          <a:noFill/>
-        </p:spPr>
-        <p:txBody>
-          <a:bodyPr wrap="square" rtlCol="0">
-            <a:spAutoFit/>
-          </a:bodyPr>
-          <a:lstStyle/>
-          <a:p>
-            <a:pPr algn="ctr"/>
-            <a:r>
-              <a:rPr lang="en-AU" sz="2000" b="1" u="sng" dirty="0"/>
-              <a:t>Design</a:t>
-            </a:r>
-          </a:p>
-          <a:p>
-            <a:pPr algn="ctr"/>
-            <a:r>
-              <a:rPr lang="en-AU" sz="1400" b="1" dirty="0"/>
-              <a:t>Uniformed Layout </a:t>
-            </a:r>
-            <a:r>
-              <a:rPr lang="en-AU" sz="1200" dirty="0"/>
-              <a:t>– Header, Nav Bar and Footer are visible across all pages</a:t>
-            </a:r>
-          </a:p>
-          <a:p>
-            <a:pPr algn="ctr"/>
-            <a:endParaRPr lang="en-AU" sz="1200" dirty="0"/>
-          </a:p>
-          <a:p>
-            <a:pPr algn="ctr"/>
-            <a:r>
-              <a:rPr lang="en-AU" sz="1400" b="1" dirty="0"/>
-              <a:t>Navbar </a:t>
-            </a:r>
-            <a:r>
-              <a:rPr lang="en-AU" sz="1200" b="1" dirty="0"/>
-              <a:t>– </a:t>
-            </a:r>
-            <a:r>
-              <a:rPr lang="en-AU" sz="1200" dirty="0"/>
-              <a:t>Active Page identified with a different colour, font-weight and uppercase</a:t>
-            </a:r>
-          </a:p>
-          <a:p>
-            <a:pPr algn="ctr"/>
-            <a:endParaRPr lang="en-AU" sz="1200" b="1" dirty="0"/>
-          </a:p>
-          <a:p>
-            <a:pPr algn="ctr"/>
-            <a:r>
-              <a:rPr lang="en-AU" sz="1200" dirty="0"/>
-              <a:t>Hover feature to show the user what is being selected</a:t>
-            </a:r>
-          </a:p>
-          <a:p>
-            <a:pPr algn="ctr"/>
-            <a:endParaRPr lang="en-AU" sz="1200" dirty="0"/>
-          </a:p>
-          <a:p>
-            <a:pPr algn="ctr"/>
-            <a:r>
-              <a:rPr lang="en-AU" sz="1400" b="1" dirty="0"/>
-              <a:t>Body</a:t>
-            </a:r>
-            <a:r>
-              <a:rPr lang="en-AU" sz="1400" dirty="0"/>
-              <a:t> </a:t>
-            </a:r>
-            <a:r>
-              <a:rPr lang="en-AU" sz="1200" dirty="0"/>
-              <a:t>– lots of blank areas for a spacious feel</a:t>
-            </a:r>
-          </a:p>
-          <a:p>
-            <a:pPr algn="ctr"/>
-            <a:endParaRPr lang="en-AU" sz="1200" b="1" dirty="0"/>
-          </a:p>
-          <a:p>
-            <a:pPr algn="ctr"/>
-            <a:r>
-              <a:rPr lang="en-AU" sz="1400" b="1" dirty="0"/>
-              <a:t>Scroll Bar </a:t>
-            </a:r>
-            <a:r>
-              <a:rPr lang="en-AU" sz="1200" dirty="0"/>
-              <a:t>– for the About Me and Blog pages to scroll through content easily</a:t>
-            </a:r>
-            <a:endParaRPr lang="en-AU" sz="1200" b="1" dirty="0"/>
-          </a:p>
-          <a:p>
-            <a:pPr algn="ctr"/>
-            <a:endParaRPr lang="en-AU" sz="1200" dirty="0"/>
-          </a:p>
-          <a:p>
-            <a:pPr algn="ctr"/>
-            <a:r>
-              <a:rPr lang="en-AU" sz="1400" b="1" dirty="0"/>
-              <a:t>Curved Edges </a:t>
-            </a:r>
-            <a:r>
-              <a:rPr lang="en-AU" sz="1200" dirty="0"/>
-              <a:t>– easier on the eyes</a:t>
-            </a:r>
-          </a:p>
-          <a:p>
-            <a:pPr algn="ctr"/>
-            <a:endParaRPr lang="en-AU" sz="1200" dirty="0"/>
-          </a:p>
-          <a:p>
-            <a:pPr algn="ctr"/>
-            <a:r>
-              <a:rPr lang="en-AU" sz="1400" b="1" dirty="0"/>
-              <a:t>Form and Social Media Links </a:t>
-            </a:r>
-            <a:r>
-              <a:rPr lang="en-AU" sz="1200" dirty="0"/>
-              <a:t>– to connect with users</a:t>
-            </a:r>
-          </a:p>
-          <a:p>
-            <a:pPr algn="ctr"/>
-            <a:endParaRPr lang="en-AU" sz="1200" dirty="0"/>
-          </a:p>
-          <a:p>
-            <a:pPr algn="ctr"/>
-            <a:r>
-              <a:rPr lang="en-AU" sz="1400" b="1" dirty="0"/>
-              <a:t>Sitemap</a:t>
-            </a:r>
-            <a:r>
-              <a:rPr lang="en-AU" sz="1200" dirty="0"/>
-              <a:t> – to show users the layout of the website</a:t>
-            </a:r>
-          </a:p>
-        </p:txBody>
-      </p:sp>
-      <p:sp>
-        <p:nvSpPr>
-          <p:cNvPr id="10" name="TextBox 9">
-            <a:extLst>
-              <a:ext uri="{FF2B5EF4-FFF2-40B4-BE49-F238E27FC236}">
-                <a16:creationId xmlns:a16="http://schemas.microsoft.com/office/drawing/2014/main" id="{2A511ECC-04C0-44A3-81A8-C92A54591045}"/>
-              </a:ext>
-            </a:extLst>
-          </p:cNvPr>
-          <p:cNvSpPr txBox="1"/>
-          <p:nvPr/>
-        </p:nvSpPr>
-        <p:spPr>
-          <a:xfrm>
-            <a:off x="6093229" y="783548"/>
-            <a:ext cx="5342805" cy="3508653"/>
-          </a:xfrm>
-          <a:prstGeom prst="rect">
-            <a:avLst/>
-          </a:prstGeom>
-          <a:noFill/>
-        </p:spPr>
-        <p:txBody>
-          <a:bodyPr wrap="square" rtlCol="0">
-            <a:spAutoFit/>
-          </a:bodyPr>
-          <a:lstStyle/>
-          <a:p>
-            <a:pPr algn="ctr"/>
-            <a:r>
-              <a:rPr lang="en-AU" sz="2000" b="1" u="sng" dirty="0"/>
-              <a:t>Changes</a:t>
-            </a:r>
-          </a:p>
-          <a:p>
-            <a:pPr algn="ctr"/>
-            <a:r>
-              <a:rPr lang="en-AU" sz="1400" b="1" dirty="0"/>
-              <a:t>Navbar</a:t>
-            </a:r>
-            <a:endParaRPr lang="en-AU" sz="1200" b="1" dirty="0"/>
-          </a:p>
-          <a:p>
-            <a:pPr algn="ctr"/>
-            <a:r>
-              <a:rPr lang="en-AU" sz="1200" dirty="0"/>
-              <a:t>Active page identified with bold text. </a:t>
-            </a:r>
-          </a:p>
-          <a:p>
-            <a:pPr algn="ctr"/>
-            <a:r>
-              <a:rPr lang="en-AU" sz="1200" dirty="0"/>
-              <a:t>With smaller page titles it made the hover colour </a:t>
-            </a:r>
-          </a:p>
-          <a:p>
-            <a:pPr algn="ctr"/>
-            <a:r>
-              <a:rPr lang="en-AU" sz="1200" dirty="0"/>
-              <a:t>only display over text instead of whole nav item as longer page titles were on two lines. Changed the font weight as a fix.</a:t>
-            </a:r>
-          </a:p>
-          <a:p>
-            <a:pPr algn="ctr"/>
-            <a:endParaRPr lang="en-AU" sz="1200" b="1" u="sng" dirty="0"/>
-          </a:p>
-          <a:p>
-            <a:pPr algn="ctr"/>
-            <a:r>
-              <a:rPr lang="en-AU" sz="1400" b="1" dirty="0"/>
-              <a:t>Scrollbar</a:t>
-            </a:r>
-            <a:endParaRPr lang="en-AU" sz="1200" b="1" dirty="0"/>
-          </a:p>
-          <a:p>
-            <a:pPr algn="ctr"/>
-            <a:r>
-              <a:rPr lang="en-AU" sz="1200" b="1" dirty="0"/>
-              <a:t>O</a:t>
-            </a:r>
-            <a:r>
-              <a:rPr lang="en-AU" sz="1200" dirty="0"/>
-              <a:t>nly planned for two pages to keep header and nav bar fixed but felt it was not necessary. Replaced with a “Back to Top” link in Footer</a:t>
-            </a:r>
-          </a:p>
-          <a:p>
-            <a:pPr algn="ctr"/>
-            <a:endParaRPr lang="en-AU" sz="1400" dirty="0"/>
-          </a:p>
-          <a:p>
-            <a:pPr algn="ctr"/>
-            <a:r>
-              <a:rPr lang="en-AU" sz="1400" b="1" dirty="0"/>
-              <a:t>Grid</a:t>
-            </a:r>
-            <a:r>
-              <a:rPr lang="en-AU" sz="1400" dirty="0"/>
-              <a:t> </a:t>
-            </a:r>
-          </a:p>
-          <a:p>
-            <a:pPr algn="ctr"/>
-            <a:r>
-              <a:rPr lang="en-AU" sz="1400" dirty="0"/>
-              <a:t>I</a:t>
-            </a:r>
-            <a:r>
-              <a:rPr lang="en-AU" sz="1200" dirty="0"/>
-              <a:t>nstead of using just flexbox, I used the Grid to control my “blog titles” so that they can wrap easily into a column in smaller screens</a:t>
-            </a:r>
-          </a:p>
-          <a:p>
-            <a:pPr algn="ctr"/>
-            <a:endParaRPr lang="en-AU" sz="1200" dirty="0"/>
-          </a:p>
-          <a:p>
-            <a:pPr algn="ctr"/>
-            <a:r>
-              <a:rPr lang="en-AU" sz="1200" b="1" dirty="0"/>
-              <a:t>Sitemap</a:t>
-            </a:r>
-            <a:r>
-              <a:rPr lang="en-AU" sz="1200" dirty="0"/>
-              <a:t> </a:t>
-            </a:r>
-          </a:p>
-          <a:p>
-            <a:pPr algn="ctr"/>
-            <a:r>
-              <a:rPr lang="en-AU" sz="1200" dirty="0"/>
-              <a:t>Removed sitemap from page as it wasn’t necessary for a 4 page site</a:t>
-            </a:r>
-            <a:endParaRPr lang="en-AU" sz="1400" dirty="0"/>
-          </a:p>
-        </p:txBody>
-      </p:sp>
-      <p:sp>
-        <p:nvSpPr>
-          <p:cNvPr id="20" name="Rectangle: Rounded Corners 19">
-            <a:extLst>
-              <a:ext uri="{FF2B5EF4-FFF2-40B4-BE49-F238E27FC236}">
-                <a16:creationId xmlns:a16="http://schemas.microsoft.com/office/drawing/2014/main" id="{B34F8FFC-C687-4FDD-9C9F-3B8EEC223D59}"/>
-              </a:ext>
-            </a:extLst>
-          </p:cNvPr>
-          <p:cNvSpPr/>
-          <p:nvPr/>
-        </p:nvSpPr>
-        <p:spPr>
-          <a:xfrm>
-            <a:off x="910205" y="2412682"/>
-            <a:ext cx="4834635" cy="4092448"/>
-          </a:xfrm>
-          <a:prstGeom prst="roundRect">
-            <a:avLst/>
-          </a:prstGeom>
-          <a:noFill/>
-          <a:ln w="38100"/>
-        </p:spPr>
-        <p:style>
-          <a:lnRef idx="2">
-            <a:schemeClr val="accent1">
-              <a:shade val="50000"/>
-            </a:schemeClr>
-          </a:lnRef>
-          <a:fillRef idx="1">
-            <a:schemeClr val="accent1"/>
-          </a:fillRef>
-          <a:effectRef idx="0">
-            <a:schemeClr val="accent1"/>
-          </a:effectRef>
-          <a:fontRef idx="minor">
-            <a:schemeClr val="lt1"/>
-          </a:fontRef>
-        </p:style>
-        <p:txBody>
-          <a:bodyPr rtlCol="0" anchor="ctr"/>
-          <a:lstStyle/>
-          <a:p>
-            <a:pPr algn="ctr"/>
-            <a:endParaRPr lang="en-AU"/>
-          </a:p>
-        </p:txBody>
-      </p:sp>
-      <p:sp>
-        <p:nvSpPr>
-          <p:cNvPr id="21" name="Rectangle: Rounded Corners 20">
-            <a:extLst>
-              <a:ext uri="{FF2B5EF4-FFF2-40B4-BE49-F238E27FC236}">
-                <a16:creationId xmlns:a16="http://schemas.microsoft.com/office/drawing/2014/main" id="{F4E0B4CC-693C-4D53-95CA-1AFA3D5F8AC1}"/>
-              </a:ext>
-            </a:extLst>
-          </p:cNvPr>
-          <p:cNvSpPr/>
-          <p:nvPr/>
-        </p:nvSpPr>
-        <p:spPr>
-          <a:xfrm>
-            <a:off x="6098772" y="814161"/>
-            <a:ext cx="5340032" cy="3573281"/>
-          </a:xfrm>
-          <a:prstGeom prst="roundRect">
-            <a:avLst/>
-          </a:prstGeom>
-          <a:noFill/>
-          <a:ln w="38100"/>
-        </p:spPr>
-        <p:style>
-          <a:lnRef idx="2">
-            <a:schemeClr val="accent1">
-              <a:shade val="50000"/>
-            </a:schemeClr>
-          </a:lnRef>
-          <a:fillRef idx="1">
-            <a:schemeClr val="accent1"/>
-          </a:fillRef>
-          <a:effectRef idx="0">
-            <a:schemeClr val="accent1"/>
-          </a:effectRef>
-          <a:fontRef idx="minor">
-            <a:schemeClr val="lt1"/>
-          </a:fontRef>
-        </p:style>
-        <p:txBody>
-          <a:bodyPr rtlCol="0" anchor="ctr"/>
-          <a:lstStyle/>
-          <a:p>
-            <a:pPr algn="ctr"/>
-            <a:endParaRPr lang="en-AU"/>
-          </a:p>
-        </p:txBody>
-      </p:sp>
-      <p:sp>
-        <p:nvSpPr>
-          <p:cNvPr id="22" name="TextBox 21">
-            <a:extLst>
-              <a:ext uri="{FF2B5EF4-FFF2-40B4-BE49-F238E27FC236}">
-                <a16:creationId xmlns:a16="http://schemas.microsoft.com/office/drawing/2014/main" id="{CC2B4D98-AA81-4A81-920A-D75630E5C154}"/>
-              </a:ext>
-            </a:extLst>
-          </p:cNvPr>
-          <p:cNvSpPr txBox="1"/>
-          <p:nvPr/>
-        </p:nvSpPr>
-        <p:spPr>
-          <a:xfrm>
-            <a:off x="6247468" y="4627692"/>
-            <a:ext cx="5188566" cy="1877437"/>
-          </a:xfrm>
-          <a:prstGeom prst="rect">
-            <a:avLst/>
-          </a:prstGeom>
-          <a:noFill/>
-        </p:spPr>
-        <p:txBody>
-          <a:bodyPr wrap="square" rtlCol="0">
-            <a:spAutoFit/>
-          </a:bodyPr>
-          <a:lstStyle/>
-          <a:p>
-            <a:pPr algn="ctr"/>
-            <a:r>
-              <a:rPr lang="en-AU" sz="2000" b="1" u="sng" dirty="0"/>
-              <a:t>Additions</a:t>
-            </a:r>
-          </a:p>
-          <a:p>
-            <a:pPr algn="ctr"/>
-            <a:r>
-              <a:rPr lang="en-AU" sz="1400" b="1" dirty="0"/>
-              <a:t>Backgrounds and Borders </a:t>
-            </a:r>
-            <a:r>
-              <a:rPr lang="en-AU" sz="1400" dirty="0"/>
-              <a:t> - </a:t>
-            </a:r>
-            <a:r>
-              <a:rPr lang="en-AU" sz="1200" dirty="0"/>
-              <a:t>To help differentiate content within some of the pages</a:t>
-            </a:r>
-          </a:p>
-          <a:p>
-            <a:pPr algn="ctr"/>
-            <a:endParaRPr lang="en-AU" sz="1400" dirty="0"/>
-          </a:p>
-          <a:p>
-            <a:pPr algn="ctr"/>
-            <a:r>
-              <a:rPr lang="en-AU" sz="1400" b="1" dirty="0"/>
-              <a:t>Captions - </a:t>
-            </a:r>
-            <a:r>
-              <a:rPr lang="en-AU" sz="1200" dirty="0"/>
-              <a:t>To explain the pictures</a:t>
-            </a:r>
-          </a:p>
-          <a:p>
-            <a:pPr algn="ctr"/>
-            <a:endParaRPr lang="en-AU" sz="1400" b="1" dirty="0"/>
-          </a:p>
-          <a:p>
-            <a:pPr algn="ctr"/>
-            <a:r>
-              <a:rPr lang="en-AU" sz="1400" b="1" dirty="0"/>
-              <a:t>Link to another page </a:t>
-            </a:r>
-            <a:r>
-              <a:rPr lang="en-AU" sz="1600" b="1" dirty="0"/>
-              <a:t>-</a:t>
-            </a:r>
-            <a:r>
-              <a:rPr lang="en-AU" sz="1600" dirty="0"/>
-              <a:t> </a:t>
-            </a:r>
-            <a:r>
-              <a:rPr lang="en-AU" sz="1200" dirty="0"/>
-              <a:t>To connect the user with my social media direct from a blog</a:t>
-            </a:r>
-            <a:r>
-              <a:rPr lang="en-AU" sz="1200" b="1" dirty="0"/>
-              <a:t> </a:t>
-            </a:r>
-            <a:endParaRPr lang="en-AU" b="1" u="sng" dirty="0"/>
+              <a:t>WIREFRAMES | Mobile View</a:t>
+            </a:r>
           </a:p>
         </p:txBody>
       </p:sp>
     </p:spTree>
     <p:extLst>
       <p:ext uri="{BB962C8B-B14F-4D97-AF65-F5344CB8AC3E}">
-        <p14:creationId xmlns:p14="http://schemas.microsoft.com/office/powerpoint/2010/main" val="2425051922"/>
+        <p14:creationId xmlns:p14="http://schemas.microsoft.com/office/powerpoint/2010/main" val="4096088193"/>
       </p:ext>
     </p:extLst>
   </p:cSld>
@@ -7009,12 +6670,83 @@
           <a:chExt cx="0" cy="0"/>
         </a:xfrm>
       </p:grpSpPr>
+      <p:cxnSp>
+        <p:nvCxnSpPr>
+          <p:cNvPr id="5" name="Straight Connector 4">
+            <a:extLst>
+              <a:ext uri="{FF2B5EF4-FFF2-40B4-BE49-F238E27FC236}">
+                <a16:creationId xmlns:a16="http://schemas.microsoft.com/office/drawing/2014/main" id="{E76222CB-12F4-460F-BDB7-75C57CD96B97}"/>
+              </a:ext>
+            </a:extLst>
+          </p:cNvPr>
+          <p:cNvCxnSpPr/>
+          <p:nvPr/>
+        </p:nvCxnSpPr>
+        <p:spPr>
+          <a:xfrm>
+            <a:off x="2210791" y="539691"/>
+            <a:ext cx="8127218" cy="0"/>
+          </a:xfrm>
+          <a:prstGeom prst="line">
+            <a:avLst/>
+          </a:prstGeom>
+          <a:ln w="76200"/>
+        </p:spPr>
+        <p:style>
+          <a:lnRef idx="1">
+            <a:schemeClr val="accent1"/>
+          </a:lnRef>
+          <a:fillRef idx="0">
+            <a:schemeClr val="accent1"/>
+          </a:fillRef>
+          <a:effectRef idx="0">
+            <a:schemeClr val="accent1"/>
+          </a:effectRef>
+          <a:fontRef idx="minor">
+            <a:schemeClr val="tx1"/>
+          </a:fontRef>
+        </p:style>
+      </p:cxnSp>
+      <p:sp>
+        <p:nvSpPr>
+          <p:cNvPr id="6" name="Rectangle 5">
+            <a:extLst>
+              <a:ext uri="{FF2B5EF4-FFF2-40B4-BE49-F238E27FC236}">
+                <a16:creationId xmlns:a16="http://schemas.microsoft.com/office/drawing/2014/main" id="{45FE33E0-8162-4CC8-913D-82069730F3D6}"/>
+              </a:ext>
+            </a:extLst>
+          </p:cNvPr>
+          <p:cNvSpPr/>
+          <p:nvPr/>
+        </p:nvSpPr>
+        <p:spPr>
+          <a:xfrm>
+            <a:off x="4552308" y="170359"/>
+            <a:ext cx="2981137" cy="369332"/>
+          </a:xfrm>
+          <a:prstGeom prst="rect">
+            <a:avLst/>
+          </a:prstGeom>
+        </p:spPr>
+        <p:txBody>
+          <a:bodyPr wrap="none">
+            <a:spAutoFit/>
+          </a:bodyPr>
+          <a:lstStyle/>
+          <a:p>
+            <a:r>
+              <a:rPr lang="en-AU" dirty="0"/>
+              <a:t>WIREFRAMES | Tablet View</a:t>
+            </a:r>
+          </a:p>
+        </p:txBody>
+      </p:sp>
       <p:pic>
         <p:nvPicPr>
-          <p:cNvPr id="5" name="Picture 4">
-            <a:extLst>
-              <a:ext uri="{FF2B5EF4-FFF2-40B4-BE49-F238E27FC236}">
-                <a16:creationId xmlns:a16="http://schemas.microsoft.com/office/drawing/2014/main" id="{2A9356DC-56B6-45D2-A4D4-520C100C729B}"/>
+          <p:cNvPr id="10" name="Picture 9">
+            <a:extLst>
+              <a:ext uri="{FF2B5EF4-FFF2-40B4-BE49-F238E27FC236}">
+                <a16:creationId xmlns:a16="http://schemas.microsoft.com/office/drawing/2014/main" id="{6FF47C53-851A-46AC-9B4D-6ECD99040C61}"/>
               </a:ext>
             </a:extLst>
           </p:cNvPr>
@@ -7031,90 +6763,18 @@
         </p:blipFill>
         <p:spPr>
           <a:xfrm>
-            <a:off x="1329277" y="1442555"/>
-            <a:ext cx="9533446" cy="4359018"/>
+            <a:off x="577957" y="1196158"/>
+            <a:ext cx="11164463" cy="4191363"/>
           </a:xfrm>
           <a:prstGeom prst="rect">
             <a:avLst/>
           </a:prstGeom>
         </p:spPr>
       </p:pic>
-      <p:cxnSp>
-        <p:nvCxnSpPr>
-          <p:cNvPr id="7" name="Straight Connector 6">
-            <a:extLst>
-              <a:ext uri="{FF2B5EF4-FFF2-40B4-BE49-F238E27FC236}">
-                <a16:creationId xmlns:a16="http://schemas.microsoft.com/office/drawing/2014/main" id="{3C4FC3E2-6323-4932-B486-B2DC9E7F160D}"/>
-              </a:ext>
-            </a:extLst>
-          </p:cNvPr>
-          <p:cNvCxnSpPr/>
-          <p:nvPr/>
-        </p:nvCxnSpPr>
-        <p:spPr>
-          <a:xfrm>
-            <a:off x="2210791" y="539691"/>
-            <a:ext cx="8127218" cy="0"/>
-          </a:xfrm>
-          <a:prstGeom prst="line">
-            <a:avLst/>
-          </a:prstGeom>
-          <a:ln w="76200"/>
-        </p:spPr>
-        <p:style>
-          <a:lnRef idx="1">
-            <a:schemeClr val="accent1"/>
-          </a:lnRef>
-          <a:fillRef idx="0">
-            <a:schemeClr val="accent1"/>
-          </a:fillRef>
-          <a:effectRef idx="0">
-            <a:schemeClr val="accent1"/>
-          </a:effectRef>
-          <a:fontRef idx="minor">
-            <a:schemeClr val="tx1"/>
-          </a:fontRef>
-        </p:style>
-      </p:cxnSp>
-      <p:sp>
-        <p:nvSpPr>
-          <p:cNvPr id="8" name="TextBox 7">
-            <a:extLst>
-              <a:ext uri="{FF2B5EF4-FFF2-40B4-BE49-F238E27FC236}">
-                <a16:creationId xmlns:a16="http://schemas.microsoft.com/office/drawing/2014/main" id="{AA7FC98E-C3BE-4563-A0A6-CEDC84E4B66D}"/>
-              </a:ext>
-            </a:extLst>
-          </p:cNvPr>
-          <p:cNvSpPr txBox="1"/>
-          <p:nvPr/>
-        </p:nvSpPr>
-        <p:spPr>
-          <a:xfrm>
-            <a:off x="4496940" y="170359"/>
-            <a:ext cx="3087384" cy="369332"/>
-          </a:xfrm>
-          <a:prstGeom prst="rect">
-            <a:avLst/>
-          </a:prstGeom>
-          <a:noFill/>
-        </p:spPr>
-        <p:txBody>
-          <a:bodyPr wrap="none" rtlCol="0">
-            <a:spAutoFit/>
-          </a:bodyPr>
-          <a:lstStyle/>
-          <a:p>
-            <a:r>
-              <a:rPr lang="en-AU" dirty="0"/>
-              <a:t>WIREFRAMES | Mobile View</a:t>
-            </a:r>
-          </a:p>
-        </p:txBody>
-      </p:sp>
     </p:spTree>
     <p:extLst>
       <p:ext uri="{BB962C8B-B14F-4D97-AF65-F5344CB8AC3E}">
-        <p14:creationId xmlns:p14="http://schemas.microsoft.com/office/powerpoint/2010/main" val="4096088193"/>
+        <p14:creationId xmlns:p14="http://schemas.microsoft.com/office/powerpoint/2010/main" val="2145596754"/>
       </p:ext>
     </p:extLst>
   </p:cSld>
@@ -7141,83 +6801,12 @@
           <a:chExt cx="0" cy="0"/>
         </a:xfrm>
       </p:grpSpPr>
-      <p:cxnSp>
-        <p:nvCxnSpPr>
-          <p:cNvPr id="5" name="Straight Connector 4">
-            <a:extLst>
-              <a:ext uri="{FF2B5EF4-FFF2-40B4-BE49-F238E27FC236}">
-                <a16:creationId xmlns:a16="http://schemas.microsoft.com/office/drawing/2014/main" id="{E76222CB-12F4-460F-BDB7-75C57CD96B97}"/>
-              </a:ext>
-            </a:extLst>
-          </p:cNvPr>
-          <p:cNvCxnSpPr/>
-          <p:nvPr/>
-        </p:nvCxnSpPr>
-        <p:spPr>
-          <a:xfrm>
-            <a:off x="2210791" y="539691"/>
-            <a:ext cx="8127218" cy="0"/>
-          </a:xfrm>
-          <a:prstGeom prst="line">
-            <a:avLst/>
-          </a:prstGeom>
-          <a:ln w="76200"/>
-        </p:spPr>
-        <p:style>
-          <a:lnRef idx="1">
-            <a:schemeClr val="accent1"/>
-          </a:lnRef>
-          <a:fillRef idx="0">
-            <a:schemeClr val="accent1"/>
-          </a:fillRef>
-          <a:effectRef idx="0">
-            <a:schemeClr val="accent1"/>
-          </a:effectRef>
-          <a:fontRef idx="minor">
-            <a:schemeClr val="tx1"/>
-          </a:fontRef>
-        </p:style>
-      </p:cxnSp>
-      <p:sp>
-        <p:nvSpPr>
-          <p:cNvPr id="6" name="Rectangle 5">
-            <a:extLst>
-              <a:ext uri="{FF2B5EF4-FFF2-40B4-BE49-F238E27FC236}">
-                <a16:creationId xmlns:a16="http://schemas.microsoft.com/office/drawing/2014/main" id="{45FE33E0-8162-4CC8-913D-82069730F3D6}"/>
-              </a:ext>
-            </a:extLst>
-          </p:cNvPr>
-          <p:cNvSpPr/>
-          <p:nvPr/>
-        </p:nvSpPr>
-        <p:spPr>
-          <a:xfrm>
-            <a:off x="4552308" y="170359"/>
-            <a:ext cx="2981137" cy="369332"/>
-          </a:xfrm>
-          <a:prstGeom prst="rect">
-            <a:avLst/>
-          </a:prstGeom>
-        </p:spPr>
-        <p:txBody>
-          <a:bodyPr wrap="none">
-            <a:spAutoFit/>
-          </a:bodyPr>
-          <a:lstStyle/>
-          <a:p>
-            <a:r>
-              <a:rPr lang="en-AU" dirty="0"/>
-              <a:t>WIREFRAMES | Tablet View</a:t>
-            </a:r>
-          </a:p>
-        </p:txBody>
-      </p:sp>
       <p:pic>
         <p:nvPicPr>
-          <p:cNvPr id="10" name="Picture 9">
-            <a:extLst>
-              <a:ext uri="{FF2B5EF4-FFF2-40B4-BE49-F238E27FC236}">
-                <a16:creationId xmlns:a16="http://schemas.microsoft.com/office/drawing/2014/main" id="{6FF47C53-851A-46AC-9B4D-6ECD99040C61}"/>
+          <p:cNvPr id="2" name="Picture 1">
+            <a:extLst>
+              <a:ext uri="{FF2B5EF4-FFF2-40B4-BE49-F238E27FC236}">
+                <a16:creationId xmlns:a16="http://schemas.microsoft.com/office/drawing/2014/main" id="{2FE06A2F-9819-4B69-B0C8-432152D699C4}"/>
               </a:ext>
             </a:extLst>
           </p:cNvPr>
@@ -7234,18 +6823,119 @@
         </p:blipFill>
         <p:spPr>
           <a:xfrm>
-            <a:off x="577956" y="1333318"/>
-            <a:ext cx="11392887" cy="4191363"/>
+            <a:off x="2622115" y="701263"/>
+            <a:ext cx="7295000" cy="2727737"/>
           </a:xfrm>
           <a:prstGeom prst="rect">
             <a:avLst/>
           </a:prstGeom>
         </p:spPr>
       </p:pic>
+      <p:pic>
+        <p:nvPicPr>
+          <p:cNvPr id="3" name="Picture 2">
+            <a:extLst>
+              <a:ext uri="{FF2B5EF4-FFF2-40B4-BE49-F238E27FC236}">
+                <a16:creationId xmlns:a16="http://schemas.microsoft.com/office/drawing/2014/main" id="{B9D6082E-1BCE-4CE1-9010-ED3BBA8085FC}"/>
+              </a:ext>
+            </a:extLst>
+          </p:cNvPr>
+          <p:cNvPicPr>
+            <a:picLocks noChangeAspect="1"/>
+          </p:cNvPicPr>
+          <p:nvPr/>
+        </p:nvPicPr>
+        <p:blipFill>
+          <a:blip r:embed="rId3"/>
+          <a:stretch>
+            <a:fillRect/>
+          </a:stretch>
+        </p:blipFill>
+        <p:spPr>
+          <a:xfrm>
+            <a:off x="2622115" y="3805851"/>
+            <a:ext cx="7295000" cy="2593912"/>
+          </a:xfrm>
+          <a:prstGeom prst="rect">
+            <a:avLst/>
+          </a:prstGeom>
+        </p:spPr>
+      </p:pic>
+      <p:sp>
+        <p:nvSpPr>
+          <p:cNvPr id="5" name="Rectangle 4">
+            <a:extLst>
+              <a:ext uri="{FF2B5EF4-FFF2-40B4-BE49-F238E27FC236}">
+                <a16:creationId xmlns:a16="http://schemas.microsoft.com/office/drawing/2014/main" id="{0E21CF56-B18D-4674-B953-0F4690DE8A0B}"/>
+              </a:ext>
+            </a:extLst>
+          </p:cNvPr>
+          <p:cNvSpPr/>
+          <p:nvPr/>
+        </p:nvSpPr>
+        <p:spPr>
+          <a:xfrm>
+            <a:off x="4647376" y="88905"/>
+            <a:ext cx="3233257" cy="369332"/>
+          </a:xfrm>
+          <a:prstGeom prst="rect">
+            <a:avLst/>
+          </a:prstGeom>
+        </p:spPr>
+        <p:txBody>
+          <a:bodyPr wrap="none">
+            <a:spAutoFit/>
+          </a:bodyPr>
+          <a:lstStyle/>
+          <a:p>
+            <a:r>
+              <a:rPr lang="en-AU" dirty="0"/>
+              <a:t>WIREFRAMES | Desktop View</a:t>
+            </a:r>
+          </a:p>
+        </p:txBody>
+      </p:sp>
+      <p:cxnSp>
+        <p:nvCxnSpPr>
+          <p:cNvPr id="6" name="Straight Connector 5">
+            <a:extLst>
+              <a:ext uri="{FF2B5EF4-FFF2-40B4-BE49-F238E27FC236}">
+                <a16:creationId xmlns:a16="http://schemas.microsoft.com/office/drawing/2014/main" id="{D303449B-B198-4EE0-913B-BB2424BB8B37}"/>
+              </a:ext>
+            </a:extLst>
+          </p:cNvPr>
+          <p:cNvCxnSpPr/>
+          <p:nvPr/>
+        </p:nvCxnSpPr>
+        <p:spPr>
+          <a:xfrm>
+            <a:off x="2202402" y="458237"/>
+            <a:ext cx="8127218" cy="0"/>
+          </a:xfrm>
+          <a:prstGeom prst="line">
+            <a:avLst/>
+          </a:prstGeom>
+          <a:ln w="76200"/>
+        </p:spPr>
+        <p:style>
+          <a:lnRef idx="1">
+            <a:schemeClr val="accent1"/>
+          </a:lnRef>
+          <a:fillRef idx="0">
+            <a:schemeClr val="accent1"/>
+          </a:fillRef>
+          <a:effectRef idx="0">
+            <a:schemeClr val="accent1"/>
+          </a:effectRef>
+          <a:fontRef idx="minor">
+            <a:schemeClr val="tx1"/>
+          </a:fontRef>
+        </p:style>
+      </p:cxnSp>
     </p:spTree>
     <p:extLst>
       <p:ext uri="{BB962C8B-B14F-4D97-AF65-F5344CB8AC3E}">
-        <p14:creationId xmlns:p14="http://schemas.microsoft.com/office/powerpoint/2010/main" val="2145596754"/>
+        <p14:creationId xmlns:p14="http://schemas.microsoft.com/office/powerpoint/2010/main" val="1841596121"/>
       </p:ext>
     </p:extLst>
   </p:cSld>
@@ -7272,72 +6962,12 @@
           <a:chExt cx="0" cy="0"/>
         </a:xfrm>
       </p:grpSpPr>
-      <p:pic>
-        <p:nvPicPr>
-          <p:cNvPr id="2" name="Picture 1">
-            <a:extLst>
-              <a:ext uri="{FF2B5EF4-FFF2-40B4-BE49-F238E27FC236}">
-                <a16:creationId xmlns:a16="http://schemas.microsoft.com/office/drawing/2014/main" id="{2FE06A2F-9819-4B69-B0C8-432152D699C4}"/>
-              </a:ext>
-            </a:extLst>
-          </p:cNvPr>
-          <p:cNvPicPr>
-            <a:picLocks noChangeAspect="1"/>
-          </p:cNvPicPr>
-          <p:nvPr/>
-        </p:nvPicPr>
-        <p:blipFill>
-          <a:blip r:embed="rId2"/>
-          <a:stretch>
-            <a:fillRect/>
-          </a:stretch>
-        </p:blipFill>
-        <p:spPr>
-          <a:xfrm>
-            <a:off x="2622115" y="701263"/>
-            <a:ext cx="7295000" cy="2727737"/>
-          </a:xfrm>
-          <a:prstGeom prst="rect">
-            <a:avLst/>
-          </a:prstGeom>
-        </p:spPr>
-      </p:pic>
-      <p:pic>
-        <p:nvPicPr>
-          <p:cNvPr id="3" name="Picture 2">
-            <a:extLst>
-              <a:ext uri="{FF2B5EF4-FFF2-40B4-BE49-F238E27FC236}">
-                <a16:creationId xmlns:a16="http://schemas.microsoft.com/office/drawing/2014/main" id="{B9D6082E-1BCE-4CE1-9010-ED3BBA8085FC}"/>
-              </a:ext>
-            </a:extLst>
-          </p:cNvPr>
-          <p:cNvPicPr>
-            <a:picLocks noChangeAspect="1"/>
-          </p:cNvPicPr>
-          <p:nvPr/>
-        </p:nvPicPr>
-        <p:blipFill>
-          <a:blip r:embed="rId3"/>
-          <a:stretch>
-            <a:fillRect/>
-          </a:stretch>
-        </p:blipFill>
-        <p:spPr>
-          <a:xfrm>
-            <a:off x="2622115" y="3805851"/>
-            <a:ext cx="7295000" cy="2593912"/>
-          </a:xfrm>
-          <a:prstGeom prst="rect">
-            <a:avLst/>
-          </a:prstGeom>
-        </p:spPr>
-      </p:pic>
-      <p:sp>
-        <p:nvSpPr>
-          <p:cNvPr id="5" name="Rectangle 4">
-            <a:extLst>
-              <a:ext uri="{FF2B5EF4-FFF2-40B4-BE49-F238E27FC236}">
-                <a16:creationId xmlns:a16="http://schemas.microsoft.com/office/drawing/2014/main" id="{0E21CF56-B18D-4674-B953-0F4690DE8A0B}"/>
+      <p:sp>
+        <p:nvSpPr>
+          <p:cNvPr id="23" name="Rectangle: Rounded Corners 22">
+            <a:extLst>
+              <a:ext uri="{FF2B5EF4-FFF2-40B4-BE49-F238E27FC236}">
+                <a16:creationId xmlns:a16="http://schemas.microsoft.com/office/drawing/2014/main" id="{915CDFCD-E62C-4A81-83BD-8ADCB03B986F}"/>
               </a:ext>
             </a:extLst>
           </p:cNvPr>
@@ -7346,32 +6976,170 @@
         </p:nvSpPr>
         <p:spPr>
           <a:xfrm>
-            <a:off x="4647376" y="88905"/>
-            <a:ext cx="3233257" cy="369332"/>
+            <a:off x="6093229" y="4319692"/>
+            <a:ext cx="5345575" cy="2276484"/>
+          </a:xfrm>
+          <a:prstGeom prst="roundRect">
+            <a:avLst/>
+          </a:prstGeom>
+        </p:spPr>
+        <p:style>
+          <a:lnRef idx="2">
+            <a:schemeClr val="accent1">
+              <a:shade val="50000"/>
+            </a:schemeClr>
+          </a:lnRef>
+          <a:fillRef idx="1">
+            <a:schemeClr val="accent1"/>
+          </a:fillRef>
+          <a:effectRef idx="0">
+            <a:schemeClr val="accent1"/>
+          </a:effectRef>
+          <a:fontRef idx="minor">
+            <a:schemeClr val="lt1"/>
+          </a:fontRef>
+        </p:style>
+        <p:txBody>
+          <a:bodyPr rtlCol="0" anchor="ctr"/>
+          <a:lstStyle/>
+          <a:p>
+            <a:pPr algn="ctr"/>
+            <a:endParaRPr lang="en-AU" dirty="0"/>
+          </a:p>
+        </p:txBody>
+      </p:sp>
+      <p:sp>
+        <p:nvSpPr>
+          <p:cNvPr id="18" name="Rectangle: Rounded Corners 17">
+            <a:extLst>
+              <a:ext uri="{FF2B5EF4-FFF2-40B4-BE49-F238E27FC236}">
+                <a16:creationId xmlns:a16="http://schemas.microsoft.com/office/drawing/2014/main" id="{E65B2E9D-6E84-4B8D-8365-D4EFBC5A7F36}"/>
+              </a:ext>
+            </a:extLst>
+          </p:cNvPr>
+          <p:cNvSpPr/>
+          <p:nvPr/>
+        </p:nvSpPr>
+        <p:spPr>
+          <a:xfrm>
+            <a:off x="910205" y="812827"/>
+            <a:ext cx="4834635" cy="1342020"/>
+          </a:xfrm>
+          <a:prstGeom prst="roundRect">
+            <a:avLst/>
+          </a:prstGeom>
+        </p:spPr>
+        <p:style>
+          <a:lnRef idx="2">
+            <a:schemeClr val="accent1">
+              <a:shade val="50000"/>
+            </a:schemeClr>
+          </a:lnRef>
+          <a:fillRef idx="1">
+            <a:schemeClr val="accent1"/>
+          </a:fillRef>
+          <a:effectRef idx="0">
+            <a:schemeClr val="accent1"/>
+          </a:effectRef>
+          <a:fontRef idx="minor">
+            <a:schemeClr val="lt1"/>
+          </a:fontRef>
+        </p:style>
+        <p:txBody>
+          <a:bodyPr rtlCol="0" anchor="ctr"/>
+          <a:lstStyle/>
+          <a:p>
+            <a:pPr algn="ctr"/>
+            <a:endParaRPr lang="en-AU" dirty="0"/>
+          </a:p>
+        </p:txBody>
+      </p:sp>
+      <p:sp>
+        <p:nvSpPr>
+          <p:cNvPr id="3" name="Rectangle 2">
+            <a:extLst>
+              <a:ext uri="{FF2B5EF4-FFF2-40B4-BE49-F238E27FC236}">
+                <a16:creationId xmlns:a16="http://schemas.microsoft.com/office/drawing/2014/main" id="{8B2E0707-5912-451D-A530-B076A5571FC4}"/>
+              </a:ext>
+            </a:extLst>
+          </p:cNvPr>
+          <p:cNvSpPr/>
+          <p:nvPr/>
+        </p:nvSpPr>
+        <p:spPr>
+          <a:xfrm>
+            <a:off x="453031" y="813183"/>
+            <a:ext cx="5640198" cy="1261884"/>
           </a:xfrm>
           <a:prstGeom prst="rect">
             <a:avLst/>
           </a:prstGeom>
         </p:spPr>
         <p:txBody>
-          <a:bodyPr wrap="none">
+          <a:bodyPr wrap="square">
             <a:spAutoFit/>
           </a:bodyPr>
           <a:lstStyle/>
           <a:p>
-            <a:r>
-              <a:rPr lang="en-AU" dirty="0"/>
-              <a:t>WIREFRAMES | Desktop View</a:t>
+            <a:pPr algn="ctr"/>
+            <a:r>
+              <a:rPr lang="en-AU" b="1" u="sng" dirty="0"/>
+              <a:t>Simplified Layout</a:t>
+            </a:r>
+            <a:endParaRPr lang="en-AU" u="sng" dirty="0"/>
+          </a:p>
+          <a:p>
+            <a:pPr algn="ctr"/>
+            <a:r>
+              <a:rPr lang="en-AU" sz="1400" b="1" dirty="0"/>
+              <a:t>Header</a:t>
+            </a:r>
+            <a:r>
+              <a:rPr lang="en-AU" sz="1200" dirty="0"/>
+              <a:t> – with text and image</a:t>
+            </a:r>
+          </a:p>
+          <a:p>
+            <a:pPr algn="ctr"/>
+            <a:r>
+              <a:rPr lang="en-AU" sz="1400" b="1" dirty="0"/>
+              <a:t>Nav Bar </a:t>
+            </a:r>
+            <a:r>
+              <a:rPr lang="en-AU" sz="1200" dirty="0"/>
+              <a:t>– to access other pages easily</a:t>
+            </a:r>
+          </a:p>
+          <a:p>
+            <a:pPr algn="ctr"/>
+            <a:r>
+              <a:rPr lang="en-AU" sz="1400" b="1" dirty="0"/>
+              <a:t>Body</a:t>
+            </a:r>
+            <a:r>
+              <a:rPr lang="en-AU" sz="1200" dirty="0"/>
+              <a:t> – Grid or Block layout </a:t>
+            </a:r>
+          </a:p>
+          <a:p>
+            <a:pPr algn="ctr"/>
+            <a:r>
+              <a:rPr lang="en-AU" sz="1400" b="1" dirty="0"/>
+              <a:t>Footer</a:t>
+            </a:r>
+            <a:r>
+              <a:rPr lang="en-AU" sz="1200" dirty="0"/>
+              <a:t> – Copyright Information and link to Sitemap</a:t>
             </a:r>
           </a:p>
         </p:txBody>
       </p:sp>
       <p:cxnSp>
         <p:nvCxnSpPr>
-          <p:cNvPr id="6" name="Straight Connector 5">
-            <a:extLst>
-              <a:ext uri="{FF2B5EF4-FFF2-40B4-BE49-F238E27FC236}">
-                <a16:creationId xmlns:a16="http://schemas.microsoft.com/office/drawing/2014/main" id="{D303449B-B198-4EE0-913B-BB2424BB8B37}"/>
+          <p:cNvPr id="4" name="Straight Connector 3">
+            <a:extLst>
+              <a:ext uri="{FF2B5EF4-FFF2-40B4-BE49-F238E27FC236}">
+                <a16:creationId xmlns:a16="http://schemas.microsoft.com/office/drawing/2014/main" id="{F9C17560-7532-44C1-9480-0706AC4FA72B}"/>
               </a:ext>
             </a:extLst>
           </p:cNvPr>
@@ -7380,7 +7148,7 @@
         </p:nvCxnSpPr>
         <p:spPr>
           <a:xfrm>
-            <a:off x="2202402" y="458237"/>
+            <a:off x="2210791" y="539691"/>
             <a:ext cx="8127218" cy="0"/>
           </a:xfrm>
           <a:prstGeom prst="line">
@@ -7403,10 +7171,534 @@
           </a:fontRef>
         </p:style>
       </p:cxnSp>
+      <p:sp>
+        <p:nvSpPr>
+          <p:cNvPr id="6" name="TextBox 5">
+            <a:extLst>
+              <a:ext uri="{FF2B5EF4-FFF2-40B4-BE49-F238E27FC236}">
+                <a16:creationId xmlns:a16="http://schemas.microsoft.com/office/drawing/2014/main" id="{B03CB523-A13D-4788-9710-602F5EBC54E8}"/>
+              </a:ext>
+            </a:extLst>
+          </p:cNvPr>
+          <p:cNvSpPr txBox="1"/>
+          <p:nvPr/>
+        </p:nvSpPr>
+        <p:spPr>
+          <a:xfrm>
+            <a:off x="4577892" y="135298"/>
+            <a:ext cx="3036216" cy="369332"/>
+          </a:xfrm>
+          <a:prstGeom prst="rect">
+            <a:avLst/>
+          </a:prstGeom>
+          <a:noFill/>
+        </p:spPr>
+        <p:txBody>
+          <a:bodyPr wrap="none" rtlCol="0">
+            <a:spAutoFit/>
+          </a:bodyPr>
+          <a:lstStyle/>
+          <a:p>
+            <a:r>
+              <a:rPr lang="en-AU" dirty="0"/>
+              <a:t>THE LAYOUT AND DESIGN</a:t>
+            </a:r>
+          </a:p>
+        </p:txBody>
+      </p:sp>
+      <p:sp>
+        <p:nvSpPr>
+          <p:cNvPr id="9" name="TextBox 8">
+            <a:extLst>
+              <a:ext uri="{FF2B5EF4-FFF2-40B4-BE49-F238E27FC236}">
+                <a16:creationId xmlns:a16="http://schemas.microsoft.com/office/drawing/2014/main" id="{6D786BA2-7789-4641-A9B4-1EB0637126F0}"/>
+              </a:ext>
+            </a:extLst>
+          </p:cNvPr>
+          <p:cNvSpPr txBox="1"/>
+          <p:nvPr/>
+        </p:nvSpPr>
+        <p:spPr>
+          <a:xfrm>
+            <a:off x="910205" y="2318082"/>
+            <a:ext cx="4834635" cy="4278094"/>
+          </a:xfrm>
+          <a:prstGeom prst="rect">
+            <a:avLst/>
+          </a:prstGeom>
+          <a:noFill/>
+        </p:spPr>
+        <p:txBody>
+          <a:bodyPr wrap="square" rtlCol="0">
+            <a:spAutoFit/>
+          </a:bodyPr>
+          <a:lstStyle/>
+          <a:p>
+            <a:pPr algn="ctr"/>
+            <a:r>
+              <a:rPr lang="en-AU" b="1" u="sng" dirty="0"/>
+              <a:t>Design</a:t>
+            </a:r>
+          </a:p>
+          <a:p>
+            <a:pPr algn="ctr"/>
+            <a:r>
+              <a:rPr lang="en-AU" sz="1200" b="1" dirty="0"/>
+              <a:t>Uniformed Layout </a:t>
+            </a:r>
+            <a:r>
+              <a:rPr lang="en-AU" sz="1200" dirty="0"/>
+              <a:t>– Header, Nav Bar and Footer and same  background colour across all pages.</a:t>
+            </a:r>
+          </a:p>
+          <a:p>
+            <a:pPr algn="ctr"/>
+            <a:endParaRPr lang="en-AU" sz="1200" dirty="0"/>
+          </a:p>
+          <a:p>
+            <a:pPr algn="ctr"/>
+            <a:r>
+              <a:rPr lang="en-AU" sz="1200" b="1" dirty="0"/>
+              <a:t>Navbar – </a:t>
+            </a:r>
+            <a:r>
+              <a:rPr lang="en-AU" sz="1200" dirty="0"/>
+              <a:t>Active Page identified with a different colour, font-weight and uppercase text</a:t>
+            </a:r>
+          </a:p>
+          <a:p>
+            <a:pPr algn="ctr"/>
+            <a:endParaRPr lang="en-AU" sz="1200" b="1" dirty="0"/>
+          </a:p>
+          <a:p>
+            <a:pPr algn="ctr"/>
+            <a:r>
+              <a:rPr lang="en-AU" sz="1200" dirty="0"/>
+              <a:t>Hover feature to identify to the audience </a:t>
+            </a:r>
+          </a:p>
+          <a:p>
+            <a:pPr algn="ctr"/>
+            <a:r>
+              <a:rPr lang="en-AU" sz="1200" dirty="0"/>
+              <a:t>what page they are selecting</a:t>
+            </a:r>
+          </a:p>
+          <a:p>
+            <a:pPr algn="ctr"/>
+            <a:endParaRPr lang="en-AU" sz="1200" dirty="0"/>
+          </a:p>
+          <a:p>
+            <a:pPr algn="ctr"/>
+            <a:r>
+              <a:rPr lang="en-AU" sz="1200" b="1" dirty="0"/>
+              <a:t>Body</a:t>
+            </a:r>
+            <a:r>
+              <a:rPr lang="en-AU" sz="1200" dirty="0"/>
+              <a:t> – lots of blank areas for a spacious feel</a:t>
+            </a:r>
+          </a:p>
+          <a:p>
+            <a:pPr algn="ctr"/>
+            <a:endParaRPr lang="en-AU" sz="1200" b="1" dirty="0"/>
+          </a:p>
+          <a:p>
+            <a:pPr algn="ctr"/>
+            <a:r>
+              <a:rPr lang="en-AU" sz="1200" b="1" dirty="0"/>
+              <a:t>Scroll Bar </a:t>
+            </a:r>
+            <a:r>
+              <a:rPr lang="en-AU" sz="1200" dirty="0"/>
+              <a:t>– for the About Me and Blog pages to scroll through content easily</a:t>
+            </a:r>
+          </a:p>
+          <a:p>
+            <a:pPr algn="ctr"/>
+            <a:endParaRPr lang="en-AU" sz="1200" b="1" dirty="0"/>
+          </a:p>
+          <a:p>
+            <a:pPr algn="ctr"/>
+            <a:r>
+              <a:rPr lang="en-AU" sz="1200" b="1" dirty="0"/>
+              <a:t>Colours – </a:t>
+            </a:r>
+            <a:r>
+              <a:rPr lang="en-AU" sz="1200" dirty="0"/>
+              <a:t>shades of blue and green for a calm feel</a:t>
+            </a:r>
+          </a:p>
+          <a:p>
+            <a:pPr algn="ctr"/>
+            <a:endParaRPr lang="en-AU" sz="1200" dirty="0"/>
+          </a:p>
+          <a:p>
+            <a:pPr algn="ctr"/>
+            <a:r>
+              <a:rPr lang="en-AU" sz="1200" b="1" dirty="0"/>
+              <a:t>Curved Edges </a:t>
+            </a:r>
+            <a:r>
+              <a:rPr lang="en-AU" sz="1200" dirty="0"/>
+              <a:t>– easier on the eyes</a:t>
+            </a:r>
+          </a:p>
+          <a:p>
+            <a:pPr algn="ctr"/>
+            <a:endParaRPr lang="en-AU" sz="1200" dirty="0"/>
+          </a:p>
+          <a:p>
+            <a:pPr algn="ctr"/>
+            <a:r>
+              <a:rPr lang="en-AU" sz="1200" b="1" dirty="0"/>
+              <a:t>Form and Social Media Links </a:t>
+            </a:r>
+            <a:r>
+              <a:rPr lang="en-AU" sz="1200" dirty="0"/>
+              <a:t>– to connect with the audience</a:t>
+            </a:r>
+          </a:p>
+          <a:p>
+            <a:pPr algn="ctr"/>
+            <a:endParaRPr lang="en-AU" sz="1200" dirty="0"/>
+          </a:p>
+          <a:p>
+            <a:pPr algn="ctr"/>
+            <a:r>
+              <a:rPr lang="en-AU" sz="1200" b="1" dirty="0"/>
+              <a:t>Sitemap</a:t>
+            </a:r>
+            <a:r>
+              <a:rPr lang="en-AU" sz="1200" dirty="0"/>
+              <a:t> – to show the audience the website layout</a:t>
+            </a:r>
+          </a:p>
+        </p:txBody>
+      </p:sp>
+      <p:sp>
+        <p:nvSpPr>
+          <p:cNvPr id="10" name="TextBox 9">
+            <a:extLst>
+              <a:ext uri="{FF2B5EF4-FFF2-40B4-BE49-F238E27FC236}">
+                <a16:creationId xmlns:a16="http://schemas.microsoft.com/office/drawing/2014/main" id="{2A511ECC-04C0-44A3-81A8-C92A54591045}"/>
+              </a:ext>
+            </a:extLst>
+          </p:cNvPr>
+          <p:cNvSpPr txBox="1"/>
+          <p:nvPr/>
+        </p:nvSpPr>
+        <p:spPr>
+          <a:xfrm>
+            <a:off x="6093229" y="783548"/>
+            <a:ext cx="5342805" cy="3323987"/>
+          </a:xfrm>
+          <a:prstGeom prst="rect">
+            <a:avLst/>
+          </a:prstGeom>
+          <a:noFill/>
+        </p:spPr>
+        <p:txBody>
+          <a:bodyPr wrap="square" rtlCol="0">
+            <a:spAutoFit/>
+          </a:bodyPr>
+          <a:lstStyle/>
+          <a:p>
+            <a:pPr algn="ctr"/>
+            <a:r>
+              <a:rPr lang="en-AU" b="1" u="sng" dirty="0"/>
+              <a:t>Changes</a:t>
+            </a:r>
+          </a:p>
+          <a:p>
+            <a:pPr algn="ctr"/>
+            <a:r>
+              <a:rPr lang="en-AU" sz="1400" b="1" dirty="0"/>
+              <a:t>Navbar</a:t>
+            </a:r>
+            <a:endParaRPr lang="en-AU" sz="1200" b="1" dirty="0"/>
+          </a:p>
+          <a:p>
+            <a:pPr algn="ctr"/>
+            <a:r>
+              <a:rPr lang="en-AU" sz="1200" dirty="0"/>
+              <a:t>Changed how the active page is identified with a smaller font-weight.</a:t>
+            </a:r>
+          </a:p>
+          <a:p>
+            <a:pPr algn="ctr"/>
+            <a:r>
+              <a:rPr lang="en-AU" sz="1200" dirty="0"/>
+              <a:t>This was to keep the Navbar in one line and also to fix the hover issue that was only highlighting the text rather than the complete nav item.</a:t>
+            </a:r>
+          </a:p>
+          <a:p>
+            <a:pPr algn="ctr"/>
+            <a:endParaRPr lang="en-AU" sz="1200" b="1" u="sng" dirty="0"/>
+          </a:p>
+          <a:p>
+            <a:pPr algn="ctr"/>
+            <a:r>
+              <a:rPr lang="en-AU" sz="1400" b="1" dirty="0"/>
+              <a:t>Scrollbar</a:t>
+            </a:r>
+            <a:endParaRPr lang="en-AU" sz="1200" b="1" dirty="0"/>
+          </a:p>
+          <a:p>
+            <a:pPr algn="ctr"/>
+            <a:r>
+              <a:rPr lang="en-AU" sz="1200" dirty="0"/>
+              <a:t>Only planned for two pages to keep header and nav bar fixed but felt it was not necessary. Replaced with a “Back to Top” link in Footer.</a:t>
+            </a:r>
+          </a:p>
+          <a:p>
+            <a:pPr algn="ctr"/>
+            <a:endParaRPr lang="en-AU" sz="1400" dirty="0"/>
+          </a:p>
+          <a:p>
+            <a:pPr algn="ctr"/>
+            <a:r>
+              <a:rPr lang="en-AU" sz="1400" b="1" dirty="0"/>
+              <a:t>Grid</a:t>
+            </a:r>
+            <a:r>
+              <a:rPr lang="en-AU" sz="1400" dirty="0"/>
+              <a:t> </a:t>
+            </a:r>
+          </a:p>
+          <a:p>
+            <a:pPr algn="ctr"/>
+            <a:r>
+              <a:rPr lang="en-AU" sz="1400" dirty="0"/>
+              <a:t>I</a:t>
+            </a:r>
+            <a:r>
+              <a:rPr lang="en-AU" sz="1200" dirty="0"/>
+              <a:t>nstead of using just flexbox, I used the Grid to control my “blog posts” so that they can wrap easily into a column on smaller screens</a:t>
+            </a:r>
+          </a:p>
+          <a:p>
+            <a:pPr algn="ctr"/>
+            <a:endParaRPr lang="en-AU" sz="1200" dirty="0"/>
+          </a:p>
+          <a:p>
+            <a:pPr algn="ctr"/>
+            <a:r>
+              <a:rPr lang="en-AU" sz="1200" b="1" dirty="0"/>
+              <a:t>Sitemap</a:t>
+            </a:r>
+            <a:r>
+              <a:rPr lang="en-AU" sz="1200" dirty="0"/>
+              <a:t> </a:t>
+            </a:r>
+          </a:p>
+          <a:p>
+            <a:pPr algn="ctr"/>
+            <a:r>
+              <a:rPr lang="en-AU" sz="1200" dirty="0"/>
+              <a:t>Removed sitemap from page as it wasn’t necessary for a 4 page site</a:t>
+            </a:r>
+            <a:endParaRPr lang="en-AU" sz="1400" dirty="0"/>
+          </a:p>
+        </p:txBody>
+      </p:sp>
+      <p:sp>
+        <p:nvSpPr>
+          <p:cNvPr id="20" name="Rectangle: Rounded Corners 19">
+            <a:extLst>
+              <a:ext uri="{FF2B5EF4-FFF2-40B4-BE49-F238E27FC236}">
+                <a16:creationId xmlns:a16="http://schemas.microsoft.com/office/drawing/2014/main" id="{B34F8FFC-C687-4FDD-9C9F-3B8EEC223D59}"/>
+              </a:ext>
+            </a:extLst>
+          </p:cNvPr>
+          <p:cNvSpPr/>
+          <p:nvPr/>
+        </p:nvSpPr>
+        <p:spPr>
+          <a:xfrm>
+            <a:off x="847553" y="2318082"/>
+            <a:ext cx="4834635" cy="4278094"/>
+          </a:xfrm>
+          <a:prstGeom prst="roundRect">
+            <a:avLst/>
+          </a:prstGeom>
+          <a:noFill/>
+          <a:ln w="38100"/>
+        </p:spPr>
+        <p:style>
+          <a:lnRef idx="2">
+            <a:schemeClr val="accent1">
+              <a:shade val="50000"/>
+            </a:schemeClr>
+          </a:lnRef>
+          <a:fillRef idx="1">
+            <a:schemeClr val="accent1"/>
+          </a:fillRef>
+          <a:effectRef idx="0">
+            <a:schemeClr val="accent1"/>
+          </a:effectRef>
+          <a:fontRef idx="minor">
+            <a:schemeClr val="lt1"/>
+          </a:fontRef>
+        </p:style>
+        <p:txBody>
+          <a:bodyPr rtlCol="0" anchor="ctr"/>
+          <a:lstStyle/>
+          <a:p>
+            <a:pPr algn="ctr"/>
+            <a:endParaRPr lang="en-AU"/>
+          </a:p>
+        </p:txBody>
+      </p:sp>
+      <p:sp>
+        <p:nvSpPr>
+          <p:cNvPr id="21" name="Rectangle: Rounded Corners 20">
+            <a:extLst>
+              <a:ext uri="{FF2B5EF4-FFF2-40B4-BE49-F238E27FC236}">
+                <a16:creationId xmlns:a16="http://schemas.microsoft.com/office/drawing/2014/main" id="{F4E0B4CC-693C-4D53-95CA-1AFA3D5F8AC1}"/>
+              </a:ext>
+            </a:extLst>
+          </p:cNvPr>
+          <p:cNvSpPr/>
+          <p:nvPr/>
+        </p:nvSpPr>
+        <p:spPr>
+          <a:xfrm>
+            <a:off x="6098772" y="814162"/>
+            <a:ext cx="5340032" cy="3354708"/>
+          </a:xfrm>
+          <a:prstGeom prst="roundRect">
+            <a:avLst/>
+          </a:prstGeom>
+          <a:noFill/>
+          <a:ln w="38100"/>
+        </p:spPr>
+        <p:style>
+          <a:lnRef idx="2">
+            <a:schemeClr val="accent1">
+              <a:shade val="50000"/>
+            </a:schemeClr>
+          </a:lnRef>
+          <a:fillRef idx="1">
+            <a:schemeClr val="accent1"/>
+          </a:fillRef>
+          <a:effectRef idx="0">
+            <a:schemeClr val="accent1"/>
+          </a:effectRef>
+          <a:fontRef idx="minor">
+            <a:schemeClr val="lt1"/>
+          </a:fontRef>
+        </p:style>
+        <p:txBody>
+          <a:bodyPr rtlCol="0" anchor="ctr"/>
+          <a:lstStyle/>
+          <a:p>
+            <a:pPr algn="ctr"/>
+            <a:endParaRPr lang="en-AU"/>
+          </a:p>
+        </p:txBody>
+      </p:sp>
+      <p:sp>
+        <p:nvSpPr>
+          <p:cNvPr id="22" name="TextBox 21">
+            <a:extLst>
+              <a:ext uri="{FF2B5EF4-FFF2-40B4-BE49-F238E27FC236}">
+                <a16:creationId xmlns:a16="http://schemas.microsoft.com/office/drawing/2014/main" id="{CC2B4D98-AA81-4A81-920A-D75630E5C154}"/>
+              </a:ext>
+            </a:extLst>
+          </p:cNvPr>
+          <p:cNvSpPr txBox="1"/>
+          <p:nvPr/>
+        </p:nvSpPr>
+        <p:spPr>
+          <a:xfrm>
+            <a:off x="6247468" y="4280879"/>
+            <a:ext cx="5188566" cy="2246769"/>
+          </a:xfrm>
+          <a:prstGeom prst="rect">
+            <a:avLst/>
+          </a:prstGeom>
+          <a:noFill/>
+        </p:spPr>
+        <p:txBody>
+          <a:bodyPr wrap="square" rtlCol="0">
+            <a:spAutoFit/>
+          </a:bodyPr>
+          <a:lstStyle/>
+          <a:p>
+            <a:pPr algn="ctr"/>
+            <a:r>
+              <a:rPr lang="en-AU" b="1" u="sng" dirty="0"/>
+              <a:t>Additions</a:t>
+            </a:r>
+          </a:p>
+          <a:p>
+            <a:pPr algn="ctr"/>
+            <a:r>
+              <a:rPr lang="en-AU" sz="1200" b="1" dirty="0"/>
+              <a:t>Header Image – </a:t>
+            </a:r>
+            <a:r>
+              <a:rPr lang="en-AU" sz="1200" dirty="0"/>
+              <a:t>added a header image to connect the audience with the site </a:t>
+            </a:r>
+          </a:p>
+          <a:p>
+            <a:pPr algn="ctr"/>
+            <a:endParaRPr lang="en-AU" sz="1200" u="sng" dirty="0"/>
+          </a:p>
+          <a:p>
+            <a:pPr algn="ctr"/>
+            <a:r>
+              <a:rPr lang="en-AU" sz="1200" b="1" dirty="0"/>
+              <a:t>Backgrounds and Borders </a:t>
+            </a:r>
+            <a:r>
+              <a:rPr lang="en-AU" sz="1200" dirty="0"/>
+              <a:t> -  used colours and borders to help the audience differentiate content within some of the pages</a:t>
+            </a:r>
+          </a:p>
+          <a:p>
+            <a:pPr algn="ctr"/>
+            <a:endParaRPr lang="en-AU" sz="1200" dirty="0"/>
+          </a:p>
+          <a:p>
+            <a:pPr algn="ctr"/>
+            <a:r>
+              <a:rPr lang="en-AU" sz="1200" b="1" dirty="0"/>
+              <a:t>Captions - </a:t>
+            </a:r>
+            <a:r>
+              <a:rPr lang="en-AU" sz="1200" dirty="0"/>
+              <a:t>to explain the pictures</a:t>
+            </a:r>
+          </a:p>
+          <a:p>
+            <a:pPr algn="ctr"/>
+            <a:endParaRPr lang="en-AU" sz="1200" b="1" dirty="0"/>
+          </a:p>
+          <a:p>
+            <a:pPr algn="ctr"/>
+            <a:r>
+              <a:rPr lang="en-AU" sz="1200" b="1" dirty="0"/>
+              <a:t>Link to Social Media page -</a:t>
+            </a:r>
+            <a:r>
+              <a:rPr lang="en-AU" sz="1200" dirty="0"/>
+              <a:t>  connecting the audience direct from my blog to my social media </a:t>
+            </a:r>
+            <a:r>
+              <a:rPr lang="en-AU" sz="1200" b="1" dirty="0"/>
+              <a:t>via a link opening in a new tab</a:t>
+            </a:r>
+            <a:endParaRPr lang="en-AU" sz="1200" b="1" u="sng" dirty="0"/>
+          </a:p>
+        </p:txBody>
+      </p:sp>
     </p:spTree>
     <p:extLst>
       <p:ext uri="{BB962C8B-B14F-4D97-AF65-F5344CB8AC3E}">
-        <p14:creationId xmlns:p14="http://schemas.microsoft.com/office/powerpoint/2010/main" val="1841596121"/>
+        <p14:creationId xmlns:p14="http://schemas.microsoft.com/office/powerpoint/2010/main" val="2425051922"/>
       </p:ext>
     </p:extLst>
   </p:cSld>
@@ -7455,8 +7747,8 @@
         </p:blipFill>
         <p:spPr>
           <a:xfrm>
-            <a:off x="504657" y="1639012"/>
-            <a:ext cx="2563916" cy="5038190"/>
+            <a:off x="552191" y="1896273"/>
+            <a:ext cx="2440189" cy="4710267"/>
           </a:xfrm>
           <a:prstGeom prst="rect">
             <a:avLst/>
@@ -7485,8 +7777,8 @@
         </p:blipFill>
         <p:spPr>
           <a:xfrm>
-            <a:off x="3415322" y="1639014"/>
-            <a:ext cx="2545348" cy="5052323"/>
+            <a:off x="3544928" y="1896273"/>
+            <a:ext cx="2415742" cy="4710267"/>
           </a:xfrm>
           <a:prstGeom prst="rect">
             <a:avLst/>
@@ -7515,8 +7807,8 @@
         </p:blipFill>
         <p:spPr>
           <a:xfrm>
-            <a:off x="6307419" y="1639014"/>
-            <a:ext cx="2532540" cy="5052322"/>
+            <a:off x="6436373" y="1896272"/>
+            <a:ext cx="2403586" cy="4710267"/>
           </a:xfrm>
           <a:prstGeom prst="rect">
             <a:avLst/>
@@ -7622,8 +7914,8 @@
         </p:blipFill>
         <p:spPr>
           <a:xfrm>
-            <a:off x="9186708" y="1639012"/>
-            <a:ext cx="2545348" cy="5052323"/>
+            <a:off x="9315662" y="1896272"/>
+            <a:ext cx="2416394" cy="4710267"/>
           </a:xfrm>
           <a:prstGeom prst="rect">
             <a:avLst/>
@@ -7648,7 +7940,7 @@
         <p:spPr>
           <a:xfrm>
             <a:off x="1051059" y="1451128"/>
-            <a:ext cx="462207" cy="260234"/>
+            <a:ext cx="721226" cy="872269"/>
           </a:xfrm>
           <a:prstGeom prst="straightConnector1">
             <a:avLst/>
@@ -7683,14 +7975,13 @@
           </p:cNvPr>
           <p:cNvCxnSpPr>
             <a:cxnSpLocks/>
-            <a:stCxn id="51" idx="2"/>
           </p:cNvCxnSpPr>
           <p:nvPr/>
         </p:nvCxnSpPr>
         <p:spPr>
-          <a:xfrm flipH="1">
-            <a:off x="792611" y="1451128"/>
-            <a:ext cx="258448" cy="891511"/>
+          <a:xfrm>
+            <a:off x="1051059" y="1453607"/>
+            <a:ext cx="0" cy="512353"/>
           </a:xfrm>
           <a:prstGeom prst="straightConnector1">
             <a:avLst/>
@@ -7725,13 +8016,14 @@
           </p:cNvPr>
           <p:cNvCxnSpPr>
             <a:cxnSpLocks/>
+            <a:stCxn id="42" idx="2"/>
           </p:cNvCxnSpPr>
           <p:nvPr/>
         </p:nvCxnSpPr>
         <p:spPr>
           <a:xfrm>
-            <a:off x="3356527" y="1291635"/>
-            <a:ext cx="228518" cy="2265198"/>
+            <a:off x="3317152" y="1758904"/>
+            <a:ext cx="267893" cy="1797929"/>
           </a:xfrm>
           <a:prstGeom prst="straightConnector1">
             <a:avLst/>
@@ -7815,7 +8107,7 @@
         <p:spPr>
           <a:xfrm>
             <a:off x="5911181" y="1475755"/>
-            <a:ext cx="594902" cy="1695284"/>
+            <a:ext cx="710424" cy="1831325"/>
           </a:xfrm>
           <a:prstGeom prst="straightConnector1">
             <a:avLst/>
@@ -7850,14 +8142,13 @@
           </p:cNvPr>
           <p:cNvCxnSpPr>
             <a:cxnSpLocks/>
-            <a:stCxn id="34" idx="2"/>
           </p:cNvCxnSpPr>
           <p:nvPr/>
         </p:nvCxnSpPr>
         <p:spPr>
           <a:xfrm>
-            <a:off x="8257884" y="1475755"/>
-            <a:ext cx="1015513" cy="4148950"/>
+            <a:off x="8536896" y="1821180"/>
+            <a:ext cx="828255" cy="4069080"/>
           </a:xfrm>
           <a:prstGeom prst="straightConnector1">
             <a:avLst/>
@@ -7881,49 +8172,6 @@
           </a:fontRef>
         </p:style>
       </p:cxnSp>
-      <p:sp>
-        <p:nvSpPr>
-          <p:cNvPr id="34" name="TextBox 33">
-            <a:extLst>
-              <a:ext uri="{FF2B5EF4-FFF2-40B4-BE49-F238E27FC236}">
-                <a16:creationId xmlns:a16="http://schemas.microsoft.com/office/drawing/2014/main" id="{AE79AD4D-9062-447C-A0D2-645934C096B0}"/>
-              </a:ext>
-            </a:extLst>
-          </p:cNvPr>
-          <p:cNvSpPr txBox="1"/>
-          <p:nvPr/>
-        </p:nvSpPr>
-        <p:spPr>
-          <a:xfrm>
-            <a:off x="7097308" y="829424"/>
-            <a:ext cx="2321152" cy="646331"/>
-          </a:xfrm>
-          <a:prstGeom prst="rect">
-            <a:avLst/>
-          </a:prstGeom>
-          <a:noFill/>
-        </p:spPr>
-        <p:txBody>
-          <a:bodyPr wrap="square" rtlCol="0">
-            <a:spAutoFit/>
-          </a:bodyPr>
-          <a:lstStyle/>
-          <a:p>
-            <a:pPr algn="ctr"/>
-            <a:r>
-              <a:rPr lang="en-AU" sz="1200" dirty="0"/>
-              <a:t>Links to access social media to</a:t>
-            </a:r>
-          </a:p>
-          <a:p>
-            <a:pPr algn="ctr"/>
-            <a:r>
-              <a:rPr lang="en-AU" sz="1200" dirty="0"/>
-              <a:t> increase connectivity with the audience</a:t>
-            </a:r>
-          </a:p>
-        </p:txBody>
-      </p:sp>
       <p:cxnSp>
         <p:nvCxnSpPr>
           <p:cNvPr id="35" name="Straight Arrow Connector 34">
@@ -8059,7 +8307,7 @@
         </p:nvSpPr>
         <p:spPr>
           <a:xfrm>
-            <a:off x="1966953" y="829970"/>
+            <a:off x="1918564" y="1297239"/>
             <a:ext cx="2797176" cy="461665"/>
           </a:xfrm>
           <a:prstGeom prst="rect">
@@ -8105,8 +8353,8 @@
         </p:nvCxnSpPr>
         <p:spPr>
           <a:xfrm>
-            <a:off x="3365541" y="1291635"/>
-            <a:ext cx="1312077" cy="4234612"/>
+            <a:off x="3317152" y="1758904"/>
+            <a:ext cx="762099" cy="1797929"/>
           </a:xfrm>
           <a:prstGeom prst="straightConnector1">
             <a:avLst/>
@@ -8162,6 +8410,48 @@
             <a:r>
               <a:rPr lang="en-AU" sz="1200" dirty="0"/>
               <a:t>Title and Image for the audience to identify my page over others</a:t>
+            </a:r>
+          </a:p>
+        </p:txBody>
+      </p:sp>
+      <p:sp>
+        <p:nvSpPr>
+          <p:cNvPr id="85" name="Rectangle 84">
+            <a:extLst>
+              <a:ext uri="{FF2B5EF4-FFF2-40B4-BE49-F238E27FC236}">
+                <a16:creationId xmlns:a16="http://schemas.microsoft.com/office/drawing/2014/main" id="{1A6A5DA7-AE2D-4674-ADB5-41C201208000}"/>
+              </a:ext>
+            </a:extLst>
+          </p:cNvPr>
+          <p:cNvSpPr/>
+          <p:nvPr/>
+        </p:nvSpPr>
+        <p:spPr>
+          <a:xfrm>
+            <a:off x="7126845" y="1171380"/>
+            <a:ext cx="2403587" cy="646331"/>
+          </a:xfrm>
+          <a:prstGeom prst="rect">
+            <a:avLst/>
+          </a:prstGeom>
+        </p:spPr>
+        <p:txBody>
+          <a:bodyPr wrap="square">
+            <a:spAutoFit/>
+          </a:bodyPr>
+          <a:lstStyle/>
+          <a:p>
+            <a:pPr algn="ctr"/>
+            <a:r>
+              <a:rPr lang="en-AU" sz="1200" dirty="0"/>
+              <a:t>Links to access social media to</a:t>
+            </a:r>
+          </a:p>
+          <a:p>
+            <a:pPr algn="ctr"/>
+            <a:r>
+              <a:rPr lang="en-AU" sz="1200" dirty="0"/>
+              <a:t> increase connectivity with the audience</a:t>
             </a:r>
           </a:p>
         </p:txBody>
@@ -8240,7 +8530,7 @@
         </p:nvSpPr>
         <p:spPr>
           <a:xfrm>
-            <a:off x="933450" y="16471"/>
+            <a:off x="1111850" y="-599"/>
             <a:ext cx="10325099" cy="954107"/>
           </a:xfrm>
           <a:prstGeom prst="rect">
@@ -9632,6 +9922,84 @@
           <a:xfrm flipH="1">
             <a:off x="3722436" y="6260986"/>
             <a:ext cx="3131370" cy="93464"/>
+          </a:xfrm>
+          <a:prstGeom prst="straightConnector1">
+            <a:avLst/>
+          </a:prstGeom>
+          <a:ln w="38100">
+            <a:tailEnd type="triangle"/>
+          </a:ln>
+        </p:spPr>
+        <p:style>
+          <a:lnRef idx="1">
+            <a:schemeClr val="accent1"/>
+          </a:lnRef>
+          <a:fillRef idx="0">
+            <a:schemeClr val="accent1"/>
+          </a:fillRef>
+          <a:effectRef idx="0">
+            <a:schemeClr val="accent1"/>
+          </a:effectRef>
+          <a:fontRef idx="minor">
+            <a:schemeClr val="tx1"/>
+          </a:fontRef>
+        </p:style>
+      </p:cxnSp>
+      <p:sp>
+        <p:nvSpPr>
+          <p:cNvPr id="48" name="TextBox 47">
+            <a:extLst>
+              <a:ext uri="{FF2B5EF4-FFF2-40B4-BE49-F238E27FC236}">
+                <a16:creationId xmlns:a16="http://schemas.microsoft.com/office/drawing/2014/main" id="{EE9361C8-451A-49F4-A598-686336DFA129}"/>
+              </a:ext>
+            </a:extLst>
+          </p:cNvPr>
+          <p:cNvSpPr txBox="1"/>
+          <p:nvPr/>
+        </p:nvSpPr>
+        <p:spPr>
+          <a:xfrm>
+            <a:off x="2858434" y="3378683"/>
+            <a:ext cx="2578757" cy="646331"/>
+          </a:xfrm>
+          <a:prstGeom prst="rect">
+            <a:avLst/>
+          </a:prstGeom>
+          <a:noFill/>
+        </p:spPr>
+        <p:txBody>
+          <a:bodyPr wrap="square" rtlCol="0">
+            <a:spAutoFit/>
+          </a:bodyPr>
+          <a:lstStyle/>
+          <a:p>
+            <a:pPr algn="ctr"/>
+            <a:r>
+              <a:rPr lang="en-AU" sz="1200" dirty="0"/>
+              <a:t>Padding to keep the text and borders clear of each other to improve the audiences readability</a:t>
+            </a:r>
+          </a:p>
+        </p:txBody>
+      </p:sp>
+      <p:cxnSp>
+        <p:nvCxnSpPr>
+          <p:cNvPr id="49" name="Straight Arrow Connector 48">
+            <a:extLst>
+              <a:ext uri="{FF2B5EF4-FFF2-40B4-BE49-F238E27FC236}">
+                <a16:creationId xmlns:a16="http://schemas.microsoft.com/office/drawing/2014/main" id="{DEE29192-857F-473D-A41A-CFED49A12894}"/>
+              </a:ext>
+            </a:extLst>
+          </p:cNvPr>
+          <p:cNvCxnSpPr>
+            <a:cxnSpLocks/>
+            <a:stCxn id="48" idx="1"/>
+          </p:cNvCxnSpPr>
+          <p:nvPr/>
+        </p:nvCxnSpPr>
+        <p:spPr>
+          <a:xfrm flipH="1" flipV="1">
+            <a:off x="1380340" y="3108961"/>
+            <a:ext cx="1478094" cy="592888"/>
           </a:xfrm>
           <a:prstGeom prst="straightConnector1">
             <a:avLst/>

</xml_diff>

<commit_message>
fix for social media logo in html and css
</commit_message>
<xml_diff>
--- a/Michael-Dart_T1A2 Slidedeck.pptx
+++ b/Michael-Dart_T1A2 Slidedeck.pptx
@@ -280,7 +280,7 @@
           <a:p>
             <a:fld id="{64F0E216-BA48-4F04-AC4F-645AA0DD6AC6}" type="datetimeFigureOut">
               <a:rPr lang="en-US" smtClean="0"/>
-              <a:t>11/12/2020</a:t>
+              <a:t>11/13/2020</a:t>
             </a:fld>
             <a:endParaRPr lang="en-US" dirty="0"/>
           </a:p>
@@ -1328,7 +1328,7 @@
           <a:p>
             <a:fld id="{64F0E216-BA48-4F04-AC4F-645AA0DD6AC6}" type="datetimeFigureOut">
               <a:rPr lang="en-US" smtClean="0"/>
-              <a:t>11/12/2020</a:t>
+              <a:t>11/13/2020</a:t>
             </a:fld>
             <a:endParaRPr lang="en-US"/>
           </a:p>
@@ -1564,7 +1564,7 @@
           <a:p>
             <a:fld id="{64F0E216-BA48-4F04-AC4F-645AA0DD6AC6}" type="datetimeFigureOut">
               <a:rPr lang="en-US" smtClean="0"/>
-              <a:t>11/12/2020</a:t>
+              <a:t>11/13/2020</a:t>
             </a:fld>
             <a:endParaRPr lang="en-US"/>
           </a:p>
@@ -1787,7 +1787,7 @@
           <a:p>
             <a:fld id="{64F0E216-BA48-4F04-AC4F-645AA0DD6AC6}" type="datetimeFigureOut">
               <a:rPr lang="en-US" smtClean="0"/>
-              <a:t>11/12/2020</a:t>
+              <a:t>11/13/2020</a:t>
             </a:fld>
             <a:endParaRPr lang="en-US"/>
           </a:p>
@@ -2089,7 +2089,7 @@
           <a:p>
             <a:fld id="{64F0E216-BA48-4F04-AC4F-645AA0DD6AC6}" type="datetimeFigureOut">
               <a:rPr lang="en-US" smtClean="0"/>
-              <a:t>11/12/2020</a:t>
+              <a:t>11/13/2020</a:t>
             </a:fld>
             <a:endParaRPr lang="en-US"/>
           </a:p>
@@ -3553,7 +3553,7 @@
           <a:p>
             <a:fld id="{64F0E216-BA48-4F04-AC4F-645AA0DD6AC6}" type="datetimeFigureOut">
               <a:rPr lang="en-US" smtClean="0"/>
-              <a:t>11/12/2020</a:t>
+              <a:t>11/13/2020</a:t>
             </a:fld>
             <a:endParaRPr lang="en-US"/>
           </a:p>
@@ -4020,7 +4020,7 @@
           <a:p>
             <a:fld id="{64F0E216-BA48-4F04-AC4F-645AA0DD6AC6}" type="datetimeFigureOut">
               <a:rPr lang="en-US" smtClean="0"/>
-              <a:t>11/12/2020</a:t>
+              <a:t>11/13/2020</a:t>
             </a:fld>
             <a:endParaRPr lang="en-US"/>
           </a:p>
@@ -4195,7 +4195,7 @@
           <a:p>
             <a:fld id="{64F0E216-BA48-4F04-AC4F-645AA0DD6AC6}" type="datetimeFigureOut">
               <a:rPr lang="en-US" smtClean="0"/>
-              <a:t>11/12/2020</a:t>
+              <a:t>11/13/2020</a:t>
             </a:fld>
             <a:endParaRPr lang="en-US"/>
           </a:p>
@@ -4332,7 +4332,7 @@
           <a:p>
             <a:fld id="{64F0E216-BA48-4F04-AC4F-645AA0DD6AC6}" type="datetimeFigureOut">
               <a:rPr lang="en-US" smtClean="0"/>
-              <a:t>11/12/2020</a:t>
+              <a:t>11/13/2020</a:t>
             </a:fld>
             <a:endParaRPr lang="en-US"/>
           </a:p>
@@ -4682,7 +4682,7 @@
           <a:p>
             <a:fld id="{64F0E216-BA48-4F04-AC4F-645AA0DD6AC6}" type="datetimeFigureOut">
               <a:rPr lang="en-US" smtClean="0"/>
-              <a:t>11/12/2020</a:t>
+              <a:t>11/13/2020</a:t>
             </a:fld>
             <a:endParaRPr lang="en-US"/>
           </a:p>
@@ -5003,7 +5003,7 @@
           <a:p>
             <a:fld id="{64F0E216-BA48-4F04-AC4F-645AA0DD6AC6}" type="datetimeFigureOut">
               <a:rPr lang="en-US" smtClean="0"/>
-              <a:t>11/12/2020</a:t>
+              <a:t>11/13/2020</a:t>
             </a:fld>
             <a:endParaRPr lang="en-US"/>
           </a:p>
@@ -5265,7 +5265,7 @@
             <a:fld id="{64F0E216-BA48-4F04-AC4F-645AA0DD6AC6}" type="datetimeFigureOut">
               <a:rPr lang="en-US" smtClean="0"/>
               <a:pPr/>
-              <a:t>11/12/2020</a:t>
+              <a:t>11/13/2020</a:t>
             </a:fld>
             <a:endParaRPr lang="en-US" dirty="0"/>
           </a:p>
@@ -6126,12 +6126,149 @@
           </a:p>
         </p:txBody>
       </p:sp>
+      <p:sp>
+        <p:nvSpPr>
+          <p:cNvPr id="8" name="TextBox 7">
+            <a:extLst>
+              <a:ext uri="{FF2B5EF4-FFF2-40B4-BE49-F238E27FC236}">
+                <a16:creationId xmlns:a16="http://schemas.microsoft.com/office/drawing/2014/main" id="{183FDED3-85FB-4919-B572-31BF0671B9F3}"/>
+              </a:ext>
+            </a:extLst>
+          </p:cNvPr>
+          <p:cNvSpPr txBox="1"/>
+          <p:nvPr/>
+        </p:nvSpPr>
+        <p:spPr>
+          <a:xfrm>
+            <a:off x="2210792" y="753793"/>
+            <a:ext cx="8127218" cy="2985433"/>
+          </a:xfrm>
+          <a:prstGeom prst="rect">
+            <a:avLst/>
+          </a:prstGeom>
+          <a:noFill/>
+        </p:spPr>
+        <p:txBody>
+          <a:bodyPr wrap="square" rtlCol="0">
+            <a:spAutoFit/>
+          </a:bodyPr>
+          <a:lstStyle/>
+          <a:p>
+            <a:pPr algn="ctr"/>
+            <a:r>
+              <a:rPr lang="en-AU" sz="2000" b="1" u="sng" dirty="0"/>
+              <a:t>CHALLENGES</a:t>
+            </a:r>
+          </a:p>
+          <a:p>
+            <a:r>
+              <a:rPr lang="en-AU" sz="1400" b="1" dirty="0"/>
+              <a:t>Flexbox</a:t>
+            </a:r>
+            <a:r>
+              <a:rPr lang="en-AU" sz="1400" dirty="0"/>
+              <a:t> </a:t>
+            </a:r>
+          </a:p>
+          <a:p>
+            <a:r>
+              <a:rPr lang="en-AU" sz="1400" dirty="0"/>
+              <a:t>Getting the components to behave how I wanted them to for when the screen was adjusted to a smaller size</a:t>
+            </a:r>
+          </a:p>
+          <a:p>
+            <a:endParaRPr lang="en-AU" sz="1400" dirty="0"/>
+          </a:p>
+          <a:p>
+            <a:r>
+              <a:rPr lang="en-AU" sz="1400" b="1" dirty="0"/>
+              <a:t>Responsive Design </a:t>
+            </a:r>
+          </a:p>
+          <a:p>
+            <a:r>
+              <a:rPr lang="en-AU" sz="1400" b="1" dirty="0"/>
+              <a:t>I</a:t>
+            </a:r>
+            <a:r>
+              <a:rPr lang="en-AU" sz="1400" dirty="0"/>
+              <a:t>ssues with text and images resizing when scaling up to larger devices</a:t>
+            </a:r>
+          </a:p>
+          <a:p>
+            <a:endParaRPr lang="en-AU" sz="1400" b="1" dirty="0"/>
+          </a:p>
+          <a:p>
+            <a:r>
+              <a:rPr lang="en-AU" sz="1400" b="1" dirty="0"/>
+              <a:t>Navbar</a:t>
+            </a:r>
+          </a:p>
+          <a:p>
+            <a:r>
+              <a:rPr lang="en-AU" sz="1400" dirty="0"/>
+              <a:t>Hover would only appear over text and not the whole Nav item for longer/multi-lined titles</a:t>
+            </a:r>
+          </a:p>
+          <a:p>
+            <a:endParaRPr lang="en-AU" sz="1400" b="1" dirty="0"/>
+          </a:p>
+          <a:p>
+            <a:r>
+              <a:rPr lang="en-AU" sz="1400" b="1" dirty="0"/>
+              <a:t>Social Media Logo Bar</a:t>
+            </a:r>
+          </a:p>
+          <a:p>
+            <a:r>
+              <a:rPr lang="en-AU" sz="1400" dirty="0"/>
+              <a:t>Getting Flex Box to flex into a column on smaller screens.</a:t>
+            </a:r>
+            <a:endParaRPr lang="en-AU" sz="1400" b="1" dirty="0"/>
+          </a:p>
+        </p:txBody>
+      </p:sp>
+      <p:sp>
+        <p:nvSpPr>
+          <p:cNvPr id="10" name="Rectangle 9">
+            <a:extLst>
+              <a:ext uri="{FF2B5EF4-FFF2-40B4-BE49-F238E27FC236}">
+                <a16:creationId xmlns:a16="http://schemas.microsoft.com/office/drawing/2014/main" id="{5EEADB05-2A06-496C-A264-1E16462F4FDD}"/>
+              </a:ext>
+            </a:extLst>
+          </p:cNvPr>
+          <p:cNvSpPr/>
+          <p:nvPr/>
+        </p:nvSpPr>
+        <p:spPr>
+          <a:xfrm>
+            <a:off x="5598189" y="182060"/>
+            <a:ext cx="1352422" cy="369332"/>
+          </a:xfrm>
+          <a:prstGeom prst="rect">
+            <a:avLst/>
+          </a:prstGeom>
+        </p:spPr>
+        <p:txBody>
+          <a:bodyPr wrap="none">
+            <a:spAutoFit/>
+          </a:bodyPr>
+          <a:lstStyle/>
+          <a:p>
+            <a:pPr algn="ctr"/>
+            <a:r>
+              <a:rPr lang="en-AU" dirty="0"/>
+              <a:t>OVERVIEW</a:t>
+            </a:r>
+          </a:p>
+        </p:txBody>
+      </p:sp>
       <p:cxnSp>
         <p:nvCxnSpPr>
-          <p:cNvPr id="7" name="Straight Connector 6">
-            <a:extLst>
-              <a:ext uri="{FF2B5EF4-FFF2-40B4-BE49-F238E27FC236}">
-                <a16:creationId xmlns:a16="http://schemas.microsoft.com/office/drawing/2014/main" id="{175BD7D7-98C3-4A5E-BD48-B32D42B919E6}"/>
+          <p:cNvPr id="9" name="Straight Connector 8">
+            <a:extLst>
+              <a:ext uri="{FF2B5EF4-FFF2-40B4-BE49-F238E27FC236}">
+                <a16:creationId xmlns:a16="http://schemas.microsoft.com/office/drawing/2014/main" id="{D4387796-4D83-4B26-88C2-9EB6A345ED85}"/>
               </a:ext>
             </a:extLst>
           </p:cNvPr>
@@ -6140,7 +6277,7 @@
         </p:nvCxnSpPr>
         <p:spPr>
           <a:xfrm>
-            <a:off x="2155986" y="6290548"/>
+            <a:off x="2173801" y="6234581"/>
             <a:ext cx="8127218" cy="0"/>
           </a:xfrm>
           <a:prstGeom prst="line">
@@ -6163,143 +6300,6 @@
           </a:fontRef>
         </p:style>
       </p:cxnSp>
-      <p:sp>
-        <p:nvSpPr>
-          <p:cNvPr id="8" name="TextBox 7">
-            <a:extLst>
-              <a:ext uri="{FF2B5EF4-FFF2-40B4-BE49-F238E27FC236}">
-                <a16:creationId xmlns:a16="http://schemas.microsoft.com/office/drawing/2014/main" id="{183FDED3-85FB-4919-B572-31BF0671B9F3}"/>
-              </a:ext>
-            </a:extLst>
-          </p:cNvPr>
-          <p:cNvSpPr txBox="1"/>
-          <p:nvPr/>
-        </p:nvSpPr>
-        <p:spPr>
-          <a:xfrm>
-            <a:off x="2210792" y="753793"/>
-            <a:ext cx="8127218" cy="2985433"/>
-          </a:xfrm>
-          <a:prstGeom prst="rect">
-            <a:avLst/>
-          </a:prstGeom>
-          <a:noFill/>
-        </p:spPr>
-        <p:txBody>
-          <a:bodyPr wrap="square" rtlCol="0">
-            <a:spAutoFit/>
-          </a:bodyPr>
-          <a:lstStyle/>
-          <a:p>
-            <a:pPr algn="ctr"/>
-            <a:r>
-              <a:rPr lang="en-AU" sz="2000" b="1" u="sng" dirty="0"/>
-              <a:t>CHALLENGES</a:t>
-            </a:r>
-          </a:p>
-          <a:p>
-            <a:r>
-              <a:rPr lang="en-AU" sz="1400" b="1" dirty="0"/>
-              <a:t>Flexbox</a:t>
-            </a:r>
-            <a:r>
-              <a:rPr lang="en-AU" sz="1400" dirty="0"/>
-              <a:t> </a:t>
-            </a:r>
-          </a:p>
-          <a:p>
-            <a:r>
-              <a:rPr lang="en-AU" sz="1400" dirty="0"/>
-              <a:t>Getting the components to behave how I wanted them to for when the screen was adjusted to a smaller size</a:t>
-            </a:r>
-          </a:p>
-          <a:p>
-            <a:endParaRPr lang="en-AU" sz="1400" dirty="0"/>
-          </a:p>
-          <a:p>
-            <a:r>
-              <a:rPr lang="en-AU" sz="1400" b="1" dirty="0"/>
-              <a:t>Responsive Design </a:t>
-            </a:r>
-          </a:p>
-          <a:p>
-            <a:r>
-              <a:rPr lang="en-AU" sz="1400" b="1" dirty="0"/>
-              <a:t>I</a:t>
-            </a:r>
-            <a:r>
-              <a:rPr lang="en-AU" sz="1400" dirty="0"/>
-              <a:t>ssues with text and images resizing when scaling up to larger devices</a:t>
-            </a:r>
-          </a:p>
-          <a:p>
-            <a:endParaRPr lang="en-AU" sz="1400" b="1" dirty="0"/>
-          </a:p>
-          <a:p>
-            <a:r>
-              <a:rPr lang="en-AU" sz="1400" b="1" dirty="0"/>
-              <a:t>Navbar</a:t>
-            </a:r>
-          </a:p>
-          <a:p>
-            <a:r>
-              <a:rPr lang="en-AU" sz="1400" dirty="0"/>
-              <a:t>Hover would only appear over text and not the whole Nav item for longer/multi-lined titles</a:t>
-            </a:r>
-          </a:p>
-          <a:p>
-            <a:endParaRPr lang="en-AU" sz="1400" b="1" dirty="0"/>
-          </a:p>
-          <a:p>
-            <a:r>
-              <a:rPr lang="en-AU" sz="1400" b="1" dirty="0"/>
-              <a:t>Social Media Logo Bar</a:t>
-            </a:r>
-          </a:p>
-          <a:p>
-            <a:r>
-              <a:rPr lang="en-AU" sz="1400" dirty="0"/>
-              <a:t>Getting Flex Box to flex into a column on smaller screens.</a:t>
-            </a:r>
-            <a:endParaRPr lang="en-AU" sz="1400" b="1" dirty="0"/>
-          </a:p>
-        </p:txBody>
-      </p:sp>
-      <p:sp>
-        <p:nvSpPr>
-          <p:cNvPr id="10" name="Rectangle 9">
-            <a:extLst>
-              <a:ext uri="{FF2B5EF4-FFF2-40B4-BE49-F238E27FC236}">
-                <a16:creationId xmlns:a16="http://schemas.microsoft.com/office/drawing/2014/main" id="{5EEADB05-2A06-496C-A264-1E16462F4FDD}"/>
-              </a:ext>
-            </a:extLst>
-          </p:cNvPr>
-          <p:cNvSpPr/>
-          <p:nvPr/>
-        </p:nvSpPr>
-        <p:spPr>
-          <a:xfrm>
-            <a:off x="5598189" y="182060"/>
-            <a:ext cx="1352422" cy="369332"/>
-          </a:xfrm>
-          <a:prstGeom prst="rect">
-            <a:avLst/>
-          </a:prstGeom>
-        </p:spPr>
-        <p:txBody>
-          <a:bodyPr wrap="none">
-            <a:spAutoFit/>
-          </a:bodyPr>
-          <a:lstStyle/>
-          <a:p>
-            <a:pPr algn="ctr"/>
-            <a:r>
-              <a:rPr lang="en-AU" dirty="0"/>
-              <a:t>OVERVIEW</a:t>
-            </a:r>
-          </a:p>
-        </p:txBody>
-      </p:sp>
     </p:spTree>
     <p:extLst>
       <p:ext uri="{BB962C8B-B14F-4D97-AF65-F5344CB8AC3E}">
@@ -6560,7 +6560,7 @@
         </p:blipFill>
         <p:spPr>
           <a:xfrm>
-            <a:off x="1329277" y="1249491"/>
+            <a:off x="1329277" y="909023"/>
             <a:ext cx="9533446" cy="4359018"/>
           </a:xfrm>
           <a:prstGeom prst="rect">
@@ -6976,7 +6976,7 @@
         </p:nvSpPr>
         <p:spPr>
           <a:xfrm>
-            <a:off x="6093229" y="4319692"/>
+            <a:off x="6274400" y="4304565"/>
             <a:ext cx="5345575" cy="2276484"/>
           </a:xfrm>
           <a:prstGeom prst="roundRect">
@@ -7022,8 +7022,8 @@
         </p:nvSpPr>
         <p:spPr>
           <a:xfrm>
-            <a:off x="910205" y="812827"/>
-            <a:ext cx="4834635" cy="1342020"/>
+            <a:off x="493008" y="715674"/>
+            <a:ext cx="5488728" cy="1261884"/>
           </a:xfrm>
           <a:prstGeom prst="roundRect">
             <a:avLst/>
@@ -7068,7 +7068,7 @@
         </p:nvSpPr>
         <p:spPr>
           <a:xfrm>
-            <a:off x="453031" y="813183"/>
+            <a:off x="453031" y="726327"/>
             <a:ext cx="5640198" cy="1261884"/>
           </a:xfrm>
           <a:prstGeom prst="rect">
@@ -7220,8 +7220,8 @@
         </p:nvSpPr>
         <p:spPr>
           <a:xfrm>
-            <a:off x="910205" y="2318082"/>
-            <a:ext cx="4834635" cy="4278094"/>
+            <a:off x="458784" y="2174846"/>
+            <a:ext cx="5605149" cy="4431983"/>
           </a:xfrm>
           <a:prstGeom prst="rect">
             <a:avLst/>
@@ -7248,7 +7248,14 @@
             </a:r>
             <a:r>
               <a:rPr lang="en-AU" sz="1200" dirty="0"/>
-              <a:t>– Header, Nav Bar and Footer and same  background colour across all pages.</a:t>
+              <a:t>– Header, Nav Bar and Footer and same </a:t>
+            </a:r>
+          </a:p>
+          <a:p>
+            <a:pPr algn="ctr"/>
+            <a:r>
+              <a:rPr lang="en-AU" sz="1200" dirty="0"/>
+              <a:t> background colour across all pages.</a:t>
             </a:r>
           </a:p>
           <a:p>
@@ -7301,6 +7308,21 @@
           </a:p>
           <a:p>
             <a:pPr algn="ctr"/>
+            <a:endParaRPr lang="en-AU" sz="1200" dirty="0"/>
+          </a:p>
+          <a:p>
+            <a:pPr algn="ctr"/>
+            <a:r>
+              <a:rPr lang="en-AU" sz="1200" b="1" dirty="0"/>
+              <a:t>Images</a:t>
+            </a:r>
+            <a:r>
+              <a:rPr lang="en-AU" sz="1200" dirty="0"/>
+              <a:t> – to add value to the content</a:t>
+            </a:r>
+          </a:p>
+          <a:p>
+            <a:pPr algn="ctr"/>
             <a:endParaRPr lang="en-AU" sz="1200" b="1" dirty="0"/>
           </a:p>
           <a:p>
@@ -7390,8 +7412,8 @@
         </p:nvSpPr>
         <p:spPr>
           <a:xfrm>
-            <a:off x="6093229" y="783548"/>
-            <a:ext cx="5342805" cy="3323987"/>
+            <a:off x="6210265" y="748292"/>
+            <a:ext cx="5488727" cy="3323987"/>
           </a:xfrm>
           <a:prstGeom prst="rect">
             <a:avLst/>
@@ -7516,8 +7538,8 @@
         </p:nvSpPr>
         <p:spPr>
           <a:xfrm>
-            <a:off x="847553" y="2318082"/>
-            <a:ext cx="4834635" cy="4278094"/>
+            <a:off x="493623" y="2174846"/>
+            <a:ext cx="5488113" cy="4421330"/>
           </a:xfrm>
           <a:prstGeom prst="roundRect">
             <a:avLst/>
@@ -7564,7 +7586,7 @@
         </p:nvSpPr>
         <p:spPr>
           <a:xfrm>
-            <a:off x="6098772" y="814162"/>
+            <a:off x="6274400" y="726327"/>
             <a:ext cx="5340032" cy="3354708"/>
           </a:xfrm>
           <a:prstGeom prst="roundRect">
@@ -7613,7 +7635,7 @@
         <p:spPr>
           <a:xfrm>
             <a:off x="6247468" y="4280879"/>
-            <a:ext cx="5188566" cy="2246769"/>
+            <a:ext cx="5340032" cy="2246769"/>
           </a:xfrm>
           <a:prstGeom prst="rect">
             <a:avLst/>

</xml_diff>

<commit_message>
additional image hover effects, updates to slidedeck
</commit_message>
<xml_diff>
--- a/Michael-Dart_T1A2 Slidedeck.pptx
+++ b/Michael-Dart_T1A2 Slidedeck.pptx
@@ -281,7 +281,7 @@
           <a:p>
             <a:fld id="{64F0E216-BA48-4F04-AC4F-645AA0DD6AC6}" type="datetimeFigureOut">
               <a:rPr lang="en-US" smtClean="0"/>
-              <a:t>11/13/2020</a:t>
+              <a:t>11/14/2020</a:t>
             </a:fld>
             <a:endParaRPr lang="en-US" dirty="0"/>
           </a:p>
@@ -1329,7 +1329,7 @@
           <a:p>
             <a:fld id="{64F0E216-BA48-4F04-AC4F-645AA0DD6AC6}" type="datetimeFigureOut">
               <a:rPr lang="en-US" smtClean="0"/>
-              <a:t>11/13/2020</a:t>
+              <a:t>11/14/2020</a:t>
             </a:fld>
             <a:endParaRPr lang="en-US"/>
           </a:p>
@@ -1565,7 +1565,7 @@
           <a:p>
             <a:fld id="{64F0E216-BA48-4F04-AC4F-645AA0DD6AC6}" type="datetimeFigureOut">
               <a:rPr lang="en-US" smtClean="0"/>
-              <a:t>11/13/2020</a:t>
+              <a:t>11/14/2020</a:t>
             </a:fld>
             <a:endParaRPr lang="en-US"/>
           </a:p>
@@ -1788,7 +1788,7 @@
           <a:p>
             <a:fld id="{64F0E216-BA48-4F04-AC4F-645AA0DD6AC6}" type="datetimeFigureOut">
               <a:rPr lang="en-US" smtClean="0"/>
-              <a:t>11/13/2020</a:t>
+              <a:t>11/14/2020</a:t>
             </a:fld>
             <a:endParaRPr lang="en-US"/>
           </a:p>
@@ -2090,7 +2090,7 @@
           <a:p>
             <a:fld id="{64F0E216-BA48-4F04-AC4F-645AA0DD6AC6}" type="datetimeFigureOut">
               <a:rPr lang="en-US" smtClean="0"/>
-              <a:t>11/13/2020</a:t>
+              <a:t>11/14/2020</a:t>
             </a:fld>
             <a:endParaRPr lang="en-US"/>
           </a:p>
@@ -3554,7 +3554,7 @@
           <a:p>
             <a:fld id="{64F0E216-BA48-4F04-AC4F-645AA0DD6AC6}" type="datetimeFigureOut">
               <a:rPr lang="en-US" smtClean="0"/>
-              <a:t>11/13/2020</a:t>
+              <a:t>11/14/2020</a:t>
             </a:fld>
             <a:endParaRPr lang="en-US"/>
           </a:p>
@@ -4021,7 +4021,7 @@
           <a:p>
             <a:fld id="{64F0E216-BA48-4F04-AC4F-645AA0DD6AC6}" type="datetimeFigureOut">
               <a:rPr lang="en-US" smtClean="0"/>
-              <a:t>11/13/2020</a:t>
+              <a:t>11/14/2020</a:t>
             </a:fld>
             <a:endParaRPr lang="en-US"/>
           </a:p>
@@ -4196,7 +4196,7 @@
           <a:p>
             <a:fld id="{64F0E216-BA48-4F04-AC4F-645AA0DD6AC6}" type="datetimeFigureOut">
               <a:rPr lang="en-US" smtClean="0"/>
-              <a:t>11/13/2020</a:t>
+              <a:t>11/14/2020</a:t>
             </a:fld>
             <a:endParaRPr lang="en-US"/>
           </a:p>
@@ -4333,7 +4333,7 @@
           <a:p>
             <a:fld id="{64F0E216-BA48-4F04-AC4F-645AA0DD6AC6}" type="datetimeFigureOut">
               <a:rPr lang="en-US" smtClean="0"/>
-              <a:t>11/13/2020</a:t>
+              <a:t>11/14/2020</a:t>
             </a:fld>
             <a:endParaRPr lang="en-US"/>
           </a:p>
@@ -4683,7 +4683,7 @@
           <a:p>
             <a:fld id="{64F0E216-BA48-4F04-AC4F-645AA0DD6AC6}" type="datetimeFigureOut">
               <a:rPr lang="en-US" smtClean="0"/>
-              <a:t>11/13/2020</a:t>
+              <a:t>11/14/2020</a:t>
             </a:fld>
             <a:endParaRPr lang="en-US"/>
           </a:p>
@@ -5004,7 +5004,7 @@
           <a:p>
             <a:fld id="{64F0E216-BA48-4F04-AC4F-645AA0DD6AC6}" type="datetimeFigureOut">
               <a:rPr lang="en-US" smtClean="0"/>
-              <a:t>11/13/2020</a:t>
+              <a:t>11/14/2020</a:t>
             </a:fld>
             <a:endParaRPr lang="en-US"/>
           </a:p>
@@ -5266,7 +5266,7 @@
             <a:fld id="{64F0E216-BA48-4F04-AC4F-645AA0DD6AC6}" type="datetimeFigureOut">
               <a:rPr lang="en-US" smtClean="0"/>
               <a:pPr/>
-              <a:t>11/13/2020</a:t>
+              <a:t>11/14/2020</a:t>
             </a:fld>
             <a:endParaRPr lang="en-US" dirty="0"/>
           </a:p>
@@ -8432,7 +8432,7 @@
           <a:noFill/>
         </p:spPr>
         <p:txBody>
-          <a:bodyPr wrap="square" rtlCol="0">
+          <a:bodyPr wrap="square" numCol="2" rtlCol="0">
             <a:spAutoFit/>
           </a:bodyPr>
           <a:lstStyle/>
@@ -8502,7 +8502,29 @@
               <a:rPr lang="en-AU" sz="1200" b="1" dirty="0"/>
               <a:t>via a link opening in a new tab</a:t>
             </a:r>
+          </a:p>
+          <a:p>
+            <a:pPr algn="ctr"/>
             <a:endParaRPr lang="en-AU" sz="1200" b="1" u="sng" dirty="0"/>
+          </a:p>
+          <a:p>
+            <a:pPr algn="ctr"/>
+            <a:r>
+              <a:rPr lang="en-AU" sz="1200" b="1" dirty="0"/>
+              <a:t>Border Shading</a:t>
+            </a:r>
+          </a:p>
+          <a:p>
+            <a:pPr algn="ctr"/>
+            <a:r>
+              <a:rPr lang="en-AU" sz="1200" dirty="0"/>
+              <a:t>Added border shading to multiple sections and images for a </a:t>
+            </a:r>
+            <a:r>
+              <a:rPr lang="en-AU" sz="1200"/>
+              <a:t>sleek look</a:t>
+            </a:r>
+            <a:endParaRPr lang="en-AU" sz="1200" dirty="0"/>
           </a:p>
         </p:txBody>
       </p:sp>
@@ -9375,13 +9397,15 @@
               </a:ext>
             </a:extLst>
           </p:cNvPr>
-          <p:cNvCxnSpPr/>
+          <p:cNvCxnSpPr>
+            <a:cxnSpLocks/>
+          </p:cNvCxnSpPr>
           <p:nvPr/>
         </p:nvCxnSpPr>
         <p:spPr>
           <a:xfrm>
-            <a:off x="2210791" y="539691"/>
-            <a:ext cx="8127218" cy="0"/>
+            <a:off x="1953087" y="539691"/>
+            <a:ext cx="8384922" cy="0"/>
           </a:xfrm>
           <a:prstGeom prst="line">
             <a:avLst/>

</xml_diff>

<commit_message>
additional animations to header and hover styling on form in contact me page
</commit_message>
<xml_diff>
--- a/Michael-Dart_T1A2 Slidedeck.pptx
+++ b/Michael-Dart_T1A2 Slidedeck.pptx
@@ -10727,8 +10727,8 @@
         </p:nvCxnSpPr>
         <p:spPr>
           <a:xfrm flipH="1" flipV="1">
-            <a:off x="8174326" y="2949724"/>
-            <a:ext cx="2309925" cy="2617443"/>
+            <a:off x="5629013" y="3204148"/>
+            <a:ext cx="4855238" cy="2363019"/>
           </a:xfrm>
           <a:prstGeom prst="straightConnector1">
             <a:avLst/>

</xml_diff>